<commit_message>
Define the TradeAction->cmd,event,indicatorSignal path; Updated the PPT for strategy architecture;
</commit_message>
<xml_diff>
--- a/NT8/Ninjatrader-web.pptx
+++ b/NT8/Ninjatrader-web.pptx
@@ -7,6 +7,7 @@
   <p:sldIdLst>
     <p:sldId id="258" r:id="rId2"/>
     <p:sldId id="260" r:id="rId3"/>
+    <p:sldId id="261" r:id="rId4"/>
   </p:sldIdLst>
   <p:sldSz cx="12192000" cy="6858000"/>
   <p:notesSz cx="6858000" cy="9144000"/>
@@ -260,7 +261,7 @@
           <a:p>
             <a:fld id="{83F1246B-29A4-445C-A64E-6BEFF5AEC172}" type="datetimeFigureOut">
               <a:rPr lang="en-US" smtClean="0"/>
-              <a:t>10/27/2019</a:t>
+              <a:t>1/4/2020</a:t>
             </a:fld>
             <a:endParaRPr lang="en-US"/>
           </a:p>
@@ -458,7 +459,7 @@
           <a:p>
             <a:fld id="{83F1246B-29A4-445C-A64E-6BEFF5AEC172}" type="datetimeFigureOut">
               <a:rPr lang="en-US" smtClean="0"/>
-              <a:t>10/27/2019</a:t>
+              <a:t>1/4/2020</a:t>
             </a:fld>
             <a:endParaRPr lang="en-US"/>
           </a:p>
@@ -666,7 +667,7 @@
           <a:p>
             <a:fld id="{83F1246B-29A4-445C-A64E-6BEFF5AEC172}" type="datetimeFigureOut">
               <a:rPr lang="en-US" smtClean="0"/>
-              <a:t>10/27/2019</a:t>
+              <a:t>1/4/2020</a:t>
             </a:fld>
             <a:endParaRPr lang="en-US"/>
           </a:p>
@@ -864,7 +865,7 @@
           <a:p>
             <a:fld id="{83F1246B-29A4-445C-A64E-6BEFF5AEC172}" type="datetimeFigureOut">
               <a:rPr lang="en-US" smtClean="0"/>
-              <a:t>10/27/2019</a:t>
+              <a:t>1/4/2020</a:t>
             </a:fld>
             <a:endParaRPr lang="en-US"/>
           </a:p>
@@ -1139,7 +1140,7 @@
           <a:p>
             <a:fld id="{83F1246B-29A4-445C-A64E-6BEFF5AEC172}" type="datetimeFigureOut">
               <a:rPr lang="en-US" smtClean="0"/>
-              <a:t>10/27/2019</a:t>
+              <a:t>1/4/2020</a:t>
             </a:fld>
             <a:endParaRPr lang="en-US"/>
           </a:p>
@@ -1404,7 +1405,7 @@
           <a:p>
             <a:fld id="{83F1246B-29A4-445C-A64E-6BEFF5AEC172}" type="datetimeFigureOut">
               <a:rPr lang="en-US" smtClean="0"/>
-              <a:t>10/27/2019</a:t>
+              <a:t>1/4/2020</a:t>
             </a:fld>
             <a:endParaRPr lang="en-US"/>
           </a:p>
@@ -1816,7 +1817,7 @@
           <a:p>
             <a:fld id="{83F1246B-29A4-445C-A64E-6BEFF5AEC172}" type="datetimeFigureOut">
               <a:rPr lang="en-US" smtClean="0"/>
-              <a:t>10/27/2019</a:t>
+              <a:t>1/4/2020</a:t>
             </a:fld>
             <a:endParaRPr lang="en-US"/>
           </a:p>
@@ -1957,7 +1958,7 @@
           <a:p>
             <a:fld id="{83F1246B-29A4-445C-A64E-6BEFF5AEC172}" type="datetimeFigureOut">
               <a:rPr lang="en-US" smtClean="0"/>
-              <a:t>10/27/2019</a:t>
+              <a:t>1/4/2020</a:t>
             </a:fld>
             <a:endParaRPr lang="en-US"/>
           </a:p>
@@ -2070,7 +2071,7 @@
           <a:p>
             <a:fld id="{83F1246B-29A4-445C-A64E-6BEFF5AEC172}" type="datetimeFigureOut">
               <a:rPr lang="en-US" smtClean="0"/>
-              <a:t>10/27/2019</a:t>
+              <a:t>1/4/2020</a:t>
             </a:fld>
             <a:endParaRPr lang="en-US"/>
           </a:p>
@@ -2381,7 +2382,7 @@
           <a:p>
             <a:fld id="{83F1246B-29A4-445C-A64E-6BEFF5AEC172}" type="datetimeFigureOut">
               <a:rPr lang="en-US" smtClean="0"/>
-              <a:t>10/27/2019</a:t>
+              <a:t>1/4/2020</a:t>
             </a:fld>
             <a:endParaRPr lang="en-US"/>
           </a:p>
@@ -2669,7 +2670,7 @@
           <a:p>
             <a:fld id="{83F1246B-29A4-445C-A64E-6BEFF5AEC172}" type="datetimeFigureOut">
               <a:rPr lang="en-US" smtClean="0"/>
-              <a:t>10/27/2019</a:t>
+              <a:t>1/4/2020</a:t>
             </a:fld>
             <a:endParaRPr lang="en-US"/>
           </a:p>
@@ -2910,7 +2911,7 @@
           <a:p>
             <a:fld id="{83F1246B-29A4-445C-A64E-6BEFF5AEC172}" type="datetimeFigureOut">
               <a:rPr lang="en-US" smtClean="0"/>
-              <a:t>10/27/2019</a:t>
+              <a:t>1/4/2020</a:t>
             </a:fld>
             <a:endParaRPr lang="en-US"/>
           </a:p>
@@ -5152,7 +5153,7 @@
         </p:nvSpPr>
         <p:spPr>
           <a:xfrm>
-            <a:off x="6206096" y="2122546"/>
+            <a:off x="6159916" y="2076366"/>
             <a:ext cx="1234901" cy="369332"/>
           </a:xfrm>
           <a:prstGeom prst="rect">
@@ -5247,6 +5248,1692 @@
     <p:extLst>
       <p:ext uri="{BB962C8B-B14F-4D97-AF65-F5344CB8AC3E}">
         <p14:creationId xmlns:p14="http://schemas.microsoft.com/office/powerpoint/2010/main" val="845019036"/>
+      </p:ext>
+    </p:extLst>
+  </p:cSld>
+  <p:clrMapOvr>
+    <a:masterClrMapping/>
+  </p:clrMapOvr>
+</p:sld>
+</file>
+
+<file path=ppt/slides/slide3.xml><?xml version="1.0" encoding="utf-8"?>
+<p:sld xmlns:a="http://schemas.openxmlformats.org/drawingml/2006/main" xmlns:r="http://schemas.openxmlformats.org/officeDocument/2006/relationships" xmlns:p="http://schemas.openxmlformats.org/presentationml/2006/main">
+  <p:cSld>
+    <p:spTree>
+      <p:nvGrpSpPr>
+        <p:cNvPr id="1" name=""/>
+        <p:cNvGrpSpPr/>
+        <p:nvPr/>
+      </p:nvGrpSpPr>
+      <p:grpSpPr>
+        <a:xfrm>
+          <a:off x="0" y="0"/>
+          <a:ext cx="0" cy="0"/>
+          <a:chOff x="0" y="0"/>
+          <a:chExt cx="0" cy="0"/>
+        </a:xfrm>
+      </p:grpSpPr>
+      <p:sp>
+        <p:nvSpPr>
+          <p:cNvPr id="2" name="Title 1">
+            <a:extLst>
+              <a:ext uri="{FF2B5EF4-FFF2-40B4-BE49-F238E27FC236}">
+                <a16:creationId xmlns:a16="http://schemas.microsoft.com/office/drawing/2014/main" id="{BC3BA0E8-4F02-4B96-9391-1D4C0C07CFED}"/>
+              </a:ext>
+            </a:extLst>
+          </p:cNvPr>
+          <p:cNvSpPr>
+            <a:spLocks noGrp="1"/>
+          </p:cNvSpPr>
+          <p:nvPr>
+            <p:ph type="title"/>
+          </p:nvPr>
+        </p:nvSpPr>
+        <p:spPr>
+          <a:xfrm>
+            <a:off x="838200" y="365126"/>
+            <a:ext cx="10515600" cy="840822"/>
+          </a:xfrm>
+        </p:spPr>
+        <p:txBody>
+          <a:bodyPr>
+            <a:normAutofit/>
+          </a:bodyPr>
+          <a:lstStyle/>
+          <a:p>
+            <a:pPr algn="ctr"/>
+            <a:r>
+              <a:rPr lang="en-US" dirty="0"/>
+              <a:t>Strategy Architecture</a:t>
+            </a:r>
+          </a:p>
+        </p:txBody>
+      </p:sp>
+      <p:sp>
+        <p:nvSpPr>
+          <p:cNvPr id="5" name="Rectangle: Rounded Corners 4">
+            <a:extLst>
+              <a:ext uri="{FF2B5EF4-FFF2-40B4-BE49-F238E27FC236}">
+                <a16:creationId xmlns:a16="http://schemas.microsoft.com/office/drawing/2014/main" id="{A81E8A88-9CA3-4F0F-9F5F-22C52FF97089}"/>
+              </a:ext>
+            </a:extLst>
+          </p:cNvPr>
+          <p:cNvSpPr/>
+          <p:nvPr/>
+        </p:nvSpPr>
+        <p:spPr>
+          <a:xfrm>
+            <a:off x="5270812" y="1804735"/>
+            <a:ext cx="1484243" cy="574583"/>
+          </a:xfrm>
+          <a:prstGeom prst="roundRect">
+            <a:avLst/>
+          </a:prstGeom>
+        </p:spPr>
+        <p:style>
+          <a:lnRef idx="2">
+            <a:schemeClr val="accent1">
+              <a:shade val="50000"/>
+            </a:schemeClr>
+          </a:lnRef>
+          <a:fillRef idx="1">
+            <a:schemeClr val="accent1"/>
+          </a:fillRef>
+          <a:effectRef idx="0">
+            <a:schemeClr val="accent1"/>
+          </a:effectRef>
+          <a:fontRef idx="minor">
+            <a:schemeClr val="lt1"/>
+          </a:fontRef>
+        </p:style>
+        <p:txBody>
+          <a:bodyPr rtlCol="0" anchor="ctr"/>
+          <a:lstStyle/>
+          <a:p>
+            <a:pPr algn="ctr"/>
+            <a:r>
+              <a:rPr lang="en-US" sz="1600" dirty="0"/>
+              <a:t>Entry</a:t>
+            </a:r>
+          </a:p>
+        </p:txBody>
+      </p:sp>
+      <p:sp>
+        <p:nvSpPr>
+          <p:cNvPr id="24" name="Rectangle: Rounded Corners 23">
+            <a:extLst>
+              <a:ext uri="{FF2B5EF4-FFF2-40B4-BE49-F238E27FC236}">
+                <a16:creationId xmlns:a16="http://schemas.microsoft.com/office/drawing/2014/main" id="{5E22DE06-B620-438A-8B8E-67EA92684307}"/>
+              </a:ext>
+            </a:extLst>
+          </p:cNvPr>
+          <p:cNvSpPr/>
+          <p:nvPr/>
+        </p:nvSpPr>
+        <p:spPr>
+          <a:xfrm>
+            <a:off x="5270811" y="2565470"/>
+            <a:ext cx="1484243" cy="574583"/>
+          </a:xfrm>
+          <a:prstGeom prst="roundRect">
+            <a:avLst/>
+          </a:prstGeom>
+        </p:spPr>
+        <p:style>
+          <a:lnRef idx="2">
+            <a:schemeClr val="accent1">
+              <a:shade val="50000"/>
+            </a:schemeClr>
+          </a:lnRef>
+          <a:fillRef idx="1">
+            <a:schemeClr val="accent1"/>
+          </a:fillRef>
+          <a:effectRef idx="0">
+            <a:schemeClr val="accent1"/>
+          </a:effectRef>
+          <a:fontRef idx="minor">
+            <a:schemeClr val="lt1"/>
+          </a:fontRef>
+        </p:style>
+        <p:txBody>
+          <a:bodyPr rtlCol="0" anchor="ctr"/>
+          <a:lstStyle/>
+          <a:p>
+            <a:pPr algn="ctr"/>
+            <a:r>
+              <a:rPr lang="en-US" sz="1600" dirty="0" err="1"/>
+              <a:t>StopLoss</a:t>
+            </a:r>
+            <a:endParaRPr lang="en-US" sz="1600" dirty="0"/>
+          </a:p>
+        </p:txBody>
+      </p:sp>
+      <p:sp>
+        <p:nvSpPr>
+          <p:cNvPr id="28" name="Rectangle: Rounded Corners 27">
+            <a:extLst>
+              <a:ext uri="{FF2B5EF4-FFF2-40B4-BE49-F238E27FC236}">
+                <a16:creationId xmlns:a16="http://schemas.microsoft.com/office/drawing/2014/main" id="{90B09BA0-2F84-45BF-8283-A945C381DD3A}"/>
+              </a:ext>
+            </a:extLst>
+          </p:cNvPr>
+          <p:cNvSpPr/>
+          <p:nvPr/>
+        </p:nvSpPr>
+        <p:spPr>
+          <a:xfrm>
+            <a:off x="5270811" y="3335651"/>
+            <a:ext cx="1484243" cy="574583"/>
+          </a:xfrm>
+          <a:prstGeom prst="roundRect">
+            <a:avLst/>
+          </a:prstGeom>
+        </p:spPr>
+        <p:style>
+          <a:lnRef idx="2">
+            <a:schemeClr val="accent1">
+              <a:shade val="50000"/>
+            </a:schemeClr>
+          </a:lnRef>
+          <a:fillRef idx="1">
+            <a:schemeClr val="accent1"/>
+          </a:fillRef>
+          <a:effectRef idx="0">
+            <a:schemeClr val="accent1"/>
+          </a:effectRef>
+          <a:fontRef idx="minor">
+            <a:schemeClr val="lt1"/>
+          </a:fontRef>
+        </p:style>
+        <p:txBody>
+          <a:bodyPr rtlCol="0" anchor="ctr"/>
+          <a:lstStyle/>
+          <a:p>
+            <a:pPr algn="ctr"/>
+            <a:r>
+              <a:rPr lang="en-US" sz="1600" dirty="0" err="1"/>
+              <a:t>ProfitTarget</a:t>
+            </a:r>
+            <a:endParaRPr lang="en-US" sz="1600" dirty="0"/>
+          </a:p>
+        </p:txBody>
+      </p:sp>
+      <p:cxnSp>
+        <p:nvCxnSpPr>
+          <p:cNvPr id="33" name="Straight Arrow Connector 32">
+            <a:extLst>
+              <a:ext uri="{FF2B5EF4-FFF2-40B4-BE49-F238E27FC236}">
+                <a16:creationId xmlns:a16="http://schemas.microsoft.com/office/drawing/2014/main" id="{D9186CC4-C6B4-4206-BAA9-1FEAA38FE754}"/>
+              </a:ext>
+            </a:extLst>
+          </p:cNvPr>
+          <p:cNvCxnSpPr>
+            <a:cxnSpLocks/>
+            <a:stCxn id="37" idx="0"/>
+            <a:endCxn id="73" idx="4"/>
+          </p:cNvCxnSpPr>
+          <p:nvPr/>
+        </p:nvCxnSpPr>
+        <p:spPr>
+          <a:xfrm flipV="1">
+            <a:off x="1661573" y="2081211"/>
+            <a:ext cx="674441" cy="771503"/>
+          </a:xfrm>
+          <a:prstGeom prst="straightConnector1">
+            <a:avLst/>
+          </a:prstGeom>
+          <a:ln>
+            <a:headEnd type="triangle"/>
+            <a:tailEnd type="triangle"/>
+          </a:ln>
+        </p:spPr>
+        <p:style>
+          <a:lnRef idx="1">
+            <a:schemeClr val="accent1"/>
+          </a:lnRef>
+          <a:fillRef idx="0">
+            <a:schemeClr val="accent1"/>
+          </a:fillRef>
+          <a:effectRef idx="0">
+            <a:schemeClr val="accent1"/>
+          </a:effectRef>
+          <a:fontRef idx="minor">
+            <a:schemeClr val="tx1"/>
+          </a:fontRef>
+        </p:style>
+      </p:cxnSp>
+      <p:sp>
+        <p:nvSpPr>
+          <p:cNvPr id="36" name="TextBox 35">
+            <a:extLst>
+              <a:ext uri="{FF2B5EF4-FFF2-40B4-BE49-F238E27FC236}">
+                <a16:creationId xmlns:a16="http://schemas.microsoft.com/office/drawing/2014/main" id="{AD91650E-0A1B-43AC-ABF1-D7E3AF982AE2}"/>
+              </a:ext>
+            </a:extLst>
+          </p:cNvPr>
+          <p:cNvSpPr txBox="1"/>
+          <p:nvPr/>
+        </p:nvSpPr>
+        <p:spPr>
+          <a:xfrm>
+            <a:off x="5291111" y="1385942"/>
+            <a:ext cx="1463943" cy="369332"/>
+          </a:xfrm>
+          <a:prstGeom prst="rect">
+            <a:avLst/>
+          </a:prstGeom>
+          <a:noFill/>
+        </p:spPr>
+        <p:txBody>
+          <a:bodyPr wrap="square" rtlCol="0">
+            <a:spAutoFit/>
+          </a:bodyPr>
+          <a:lstStyle/>
+          <a:p>
+            <a:r>
+              <a:rPr lang="en-US" dirty="0" err="1"/>
+              <a:t>TradeSignals</a:t>
+            </a:r>
+            <a:endParaRPr lang="en-US" dirty="0"/>
+          </a:p>
+        </p:txBody>
+      </p:sp>
+      <p:sp>
+        <p:nvSpPr>
+          <p:cNvPr id="37" name="Rectangle: Rounded Corners 36">
+            <a:extLst>
+              <a:ext uri="{FF2B5EF4-FFF2-40B4-BE49-F238E27FC236}">
+                <a16:creationId xmlns:a16="http://schemas.microsoft.com/office/drawing/2014/main" id="{F9A1B19B-8D9C-43EA-93DD-2D9694F73BF8}"/>
+              </a:ext>
+            </a:extLst>
+          </p:cNvPr>
+          <p:cNvSpPr/>
+          <p:nvPr/>
+        </p:nvSpPr>
+        <p:spPr>
+          <a:xfrm>
+            <a:off x="1142261" y="2852714"/>
+            <a:ext cx="1038624" cy="704257"/>
+          </a:xfrm>
+          <a:prstGeom prst="roundRect">
+            <a:avLst/>
+          </a:prstGeom>
+          <a:solidFill>
+            <a:schemeClr val="accent6">
+              <a:lumMod val="75000"/>
+            </a:schemeClr>
+          </a:solidFill>
+        </p:spPr>
+        <p:style>
+          <a:lnRef idx="2">
+            <a:schemeClr val="accent1">
+              <a:shade val="50000"/>
+            </a:schemeClr>
+          </a:lnRef>
+          <a:fillRef idx="1">
+            <a:schemeClr val="accent1"/>
+          </a:fillRef>
+          <a:effectRef idx="0">
+            <a:schemeClr val="accent1"/>
+          </a:effectRef>
+          <a:fontRef idx="minor">
+            <a:schemeClr val="lt1"/>
+          </a:fontRef>
+        </p:style>
+        <p:txBody>
+          <a:bodyPr rtlCol="0" anchor="ctr"/>
+          <a:lstStyle/>
+          <a:p>
+            <a:pPr algn="ctr"/>
+            <a:r>
+              <a:rPr lang="en-US" dirty="0"/>
+              <a:t>Strategy</a:t>
+            </a:r>
+          </a:p>
+        </p:txBody>
+      </p:sp>
+      <p:sp>
+        <p:nvSpPr>
+          <p:cNvPr id="38" name="Rectangle: Rounded Corners 37">
+            <a:extLst>
+              <a:ext uri="{FF2B5EF4-FFF2-40B4-BE49-F238E27FC236}">
+                <a16:creationId xmlns:a16="http://schemas.microsoft.com/office/drawing/2014/main" id="{F12A870A-76A9-4C8D-BCB7-7344F277CFD7}"/>
+              </a:ext>
+            </a:extLst>
+          </p:cNvPr>
+          <p:cNvSpPr/>
+          <p:nvPr/>
+        </p:nvSpPr>
+        <p:spPr>
+          <a:xfrm>
+            <a:off x="2885368" y="2844325"/>
+            <a:ext cx="1370069" cy="714620"/>
+          </a:xfrm>
+          <a:prstGeom prst="roundRect">
+            <a:avLst/>
+          </a:prstGeom>
+        </p:spPr>
+        <p:style>
+          <a:lnRef idx="2">
+            <a:schemeClr val="accent1">
+              <a:shade val="50000"/>
+            </a:schemeClr>
+          </a:lnRef>
+          <a:fillRef idx="1">
+            <a:schemeClr val="accent1"/>
+          </a:fillRef>
+          <a:effectRef idx="0">
+            <a:schemeClr val="accent1"/>
+          </a:effectRef>
+          <a:fontRef idx="minor">
+            <a:schemeClr val="lt1"/>
+          </a:fontRef>
+        </p:style>
+        <p:txBody>
+          <a:bodyPr rtlCol="0" anchor="ctr"/>
+          <a:lstStyle/>
+          <a:p>
+            <a:pPr algn="ctr"/>
+            <a:r>
+              <a:rPr lang="en-US" sz="1600" dirty="0" err="1"/>
+              <a:t>TradeAction</a:t>
+            </a:r>
+            <a:endParaRPr lang="en-US" sz="1600" dirty="0"/>
+          </a:p>
+        </p:txBody>
+      </p:sp>
+      <p:sp>
+        <p:nvSpPr>
+          <p:cNvPr id="49" name="Rectangle: Rounded Corners 48">
+            <a:extLst>
+              <a:ext uri="{FF2B5EF4-FFF2-40B4-BE49-F238E27FC236}">
+                <a16:creationId xmlns:a16="http://schemas.microsoft.com/office/drawing/2014/main" id="{8C0FC3C5-206D-4CE7-870B-3DF288C040BC}"/>
+              </a:ext>
+            </a:extLst>
+          </p:cNvPr>
+          <p:cNvSpPr/>
+          <p:nvPr/>
+        </p:nvSpPr>
+        <p:spPr>
+          <a:xfrm>
+            <a:off x="10172471" y="4462392"/>
+            <a:ext cx="1484243" cy="574583"/>
+          </a:xfrm>
+          <a:prstGeom prst="roundRect">
+            <a:avLst/>
+          </a:prstGeom>
+        </p:spPr>
+        <p:style>
+          <a:lnRef idx="2">
+            <a:schemeClr val="accent1">
+              <a:shade val="50000"/>
+            </a:schemeClr>
+          </a:lnRef>
+          <a:fillRef idx="1">
+            <a:schemeClr val="accent1"/>
+          </a:fillRef>
+          <a:effectRef idx="0">
+            <a:schemeClr val="accent1"/>
+          </a:effectRef>
+          <a:fontRef idx="minor">
+            <a:schemeClr val="lt1"/>
+          </a:fontRef>
+        </p:style>
+        <p:txBody>
+          <a:bodyPr rtlCol="0" anchor="ctr"/>
+          <a:lstStyle/>
+          <a:p>
+            <a:pPr algn="ctr"/>
+            <a:r>
+              <a:rPr lang="en-US" sz="1600" dirty="0"/>
+              <a:t>Indicator</a:t>
+            </a:r>
+          </a:p>
+          <a:p>
+            <a:pPr algn="ctr"/>
+            <a:r>
+              <a:rPr lang="en-US" sz="1600" dirty="0"/>
+              <a:t>Signals</a:t>
+            </a:r>
+          </a:p>
+        </p:txBody>
+      </p:sp>
+      <p:sp>
+        <p:nvSpPr>
+          <p:cNvPr id="50" name="Rectangle: Rounded Corners 49">
+            <a:extLst>
+              <a:ext uri="{FF2B5EF4-FFF2-40B4-BE49-F238E27FC236}">
+                <a16:creationId xmlns:a16="http://schemas.microsoft.com/office/drawing/2014/main" id="{F2B0387B-A45F-48CD-A80B-5FA52C751288}"/>
+              </a:ext>
+            </a:extLst>
+          </p:cNvPr>
+          <p:cNvSpPr/>
+          <p:nvPr/>
+        </p:nvSpPr>
+        <p:spPr>
+          <a:xfrm>
+            <a:off x="10144763" y="2956884"/>
+            <a:ext cx="1484243" cy="574583"/>
+          </a:xfrm>
+          <a:prstGeom prst="roundRect">
+            <a:avLst/>
+          </a:prstGeom>
+        </p:spPr>
+        <p:style>
+          <a:lnRef idx="2">
+            <a:schemeClr val="accent1">
+              <a:shade val="50000"/>
+            </a:schemeClr>
+          </a:lnRef>
+          <a:fillRef idx="1">
+            <a:schemeClr val="accent1"/>
+          </a:fillRef>
+          <a:effectRef idx="0">
+            <a:schemeClr val="accent1"/>
+          </a:effectRef>
+          <a:fontRef idx="minor">
+            <a:schemeClr val="lt1"/>
+          </a:fontRef>
+        </p:style>
+        <p:txBody>
+          <a:bodyPr rtlCol="0" anchor="ctr"/>
+          <a:lstStyle/>
+          <a:p>
+            <a:pPr algn="ctr"/>
+            <a:r>
+              <a:rPr lang="en-US" sz="1600" dirty="0"/>
+              <a:t>Performance</a:t>
+            </a:r>
+          </a:p>
+          <a:p>
+            <a:pPr algn="ctr"/>
+            <a:r>
+              <a:rPr lang="en-US" sz="1600" dirty="0"/>
+              <a:t>/Rules</a:t>
+            </a:r>
+          </a:p>
+        </p:txBody>
+      </p:sp>
+      <p:sp>
+        <p:nvSpPr>
+          <p:cNvPr id="51" name="Rectangle: Rounded Corners 50">
+            <a:extLst>
+              <a:ext uri="{FF2B5EF4-FFF2-40B4-BE49-F238E27FC236}">
+                <a16:creationId xmlns:a16="http://schemas.microsoft.com/office/drawing/2014/main" id="{2A336638-7115-4FB9-ABD0-6B3E60D52610}"/>
+              </a:ext>
+            </a:extLst>
+          </p:cNvPr>
+          <p:cNvSpPr/>
+          <p:nvPr/>
+        </p:nvSpPr>
+        <p:spPr>
+          <a:xfrm>
+            <a:off x="10125110" y="1496698"/>
+            <a:ext cx="1484243" cy="574583"/>
+          </a:xfrm>
+          <a:prstGeom prst="roundRect">
+            <a:avLst/>
+          </a:prstGeom>
+        </p:spPr>
+        <p:style>
+          <a:lnRef idx="2">
+            <a:schemeClr val="accent1">
+              <a:shade val="50000"/>
+            </a:schemeClr>
+          </a:lnRef>
+          <a:fillRef idx="1">
+            <a:schemeClr val="accent1"/>
+          </a:fillRef>
+          <a:effectRef idx="0">
+            <a:schemeClr val="accent1"/>
+          </a:effectRef>
+          <a:fontRef idx="minor">
+            <a:schemeClr val="lt1"/>
+          </a:fontRef>
+        </p:style>
+        <p:txBody>
+          <a:bodyPr rtlCol="0" anchor="ctr"/>
+          <a:lstStyle/>
+          <a:p>
+            <a:pPr algn="ctr"/>
+            <a:r>
+              <a:rPr lang="en-US" sz="1600" dirty="0"/>
+              <a:t>Commands</a:t>
+            </a:r>
+          </a:p>
+        </p:txBody>
+      </p:sp>
+      <p:sp>
+        <p:nvSpPr>
+          <p:cNvPr id="58" name="Rectangle: Rounded Corners 57">
+            <a:extLst>
+              <a:ext uri="{FF2B5EF4-FFF2-40B4-BE49-F238E27FC236}">
+                <a16:creationId xmlns:a16="http://schemas.microsoft.com/office/drawing/2014/main" id="{AB26037D-154E-4FC3-ADB4-02B15E176F56}"/>
+              </a:ext>
+            </a:extLst>
+          </p:cNvPr>
+          <p:cNvSpPr/>
+          <p:nvPr/>
+        </p:nvSpPr>
+        <p:spPr>
+          <a:xfrm>
+            <a:off x="5270811" y="4133543"/>
+            <a:ext cx="1484243" cy="574583"/>
+          </a:xfrm>
+          <a:prstGeom prst="roundRect">
+            <a:avLst/>
+          </a:prstGeom>
+        </p:spPr>
+        <p:style>
+          <a:lnRef idx="2">
+            <a:schemeClr val="accent1">
+              <a:shade val="50000"/>
+            </a:schemeClr>
+          </a:lnRef>
+          <a:fillRef idx="1">
+            <a:schemeClr val="accent1"/>
+          </a:fillRef>
+          <a:effectRef idx="0">
+            <a:schemeClr val="accent1"/>
+          </a:effectRef>
+          <a:fontRef idx="minor">
+            <a:schemeClr val="lt1"/>
+          </a:fontRef>
+        </p:style>
+        <p:txBody>
+          <a:bodyPr rtlCol="0" anchor="ctr"/>
+          <a:lstStyle/>
+          <a:p>
+            <a:pPr algn="ctr"/>
+            <a:r>
+              <a:rPr lang="en-US" sz="1600" dirty="0"/>
+              <a:t>Liquidate</a:t>
+            </a:r>
+          </a:p>
+        </p:txBody>
+      </p:sp>
+      <p:sp>
+        <p:nvSpPr>
+          <p:cNvPr id="59" name="Rectangle: Rounded Corners 58">
+            <a:extLst>
+              <a:ext uri="{FF2B5EF4-FFF2-40B4-BE49-F238E27FC236}">
+                <a16:creationId xmlns:a16="http://schemas.microsoft.com/office/drawing/2014/main" id="{34410B82-90F6-4AFA-970A-452D6DE7607D}"/>
+              </a:ext>
+            </a:extLst>
+          </p:cNvPr>
+          <p:cNvSpPr/>
+          <p:nvPr/>
+        </p:nvSpPr>
+        <p:spPr>
+          <a:xfrm>
+            <a:off x="5270811" y="5742165"/>
+            <a:ext cx="1484243" cy="574583"/>
+          </a:xfrm>
+          <a:prstGeom prst="roundRect">
+            <a:avLst/>
+          </a:prstGeom>
+        </p:spPr>
+        <p:style>
+          <a:lnRef idx="2">
+            <a:schemeClr val="accent1">
+              <a:shade val="50000"/>
+            </a:schemeClr>
+          </a:lnRef>
+          <a:fillRef idx="1">
+            <a:schemeClr val="accent1"/>
+          </a:fillRef>
+          <a:effectRef idx="0">
+            <a:schemeClr val="accent1"/>
+          </a:effectRef>
+          <a:fontRef idx="minor">
+            <a:schemeClr val="lt1"/>
+          </a:fontRef>
+        </p:style>
+        <p:txBody>
+          <a:bodyPr rtlCol="0" anchor="ctr"/>
+          <a:lstStyle/>
+          <a:p>
+            <a:pPr algn="ctr"/>
+            <a:r>
+              <a:rPr lang="en-US" sz="1600" dirty="0"/>
+              <a:t>Terminate</a:t>
+            </a:r>
+          </a:p>
+        </p:txBody>
+      </p:sp>
+      <p:sp>
+        <p:nvSpPr>
+          <p:cNvPr id="71" name="Oval 70">
+            <a:extLst>
+              <a:ext uri="{FF2B5EF4-FFF2-40B4-BE49-F238E27FC236}">
+                <a16:creationId xmlns:a16="http://schemas.microsoft.com/office/drawing/2014/main" id="{C5891883-CD3C-4315-A48C-F319442C38AE}"/>
+              </a:ext>
+            </a:extLst>
+          </p:cNvPr>
+          <p:cNvSpPr/>
+          <p:nvPr/>
+        </p:nvSpPr>
+        <p:spPr>
+          <a:xfrm>
+            <a:off x="188553" y="4097042"/>
+            <a:ext cx="1315736" cy="820669"/>
+          </a:xfrm>
+          <a:prstGeom prst="ellipse">
+            <a:avLst/>
+          </a:prstGeom>
+        </p:spPr>
+        <p:style>
+          <a:lnRef idx="2">
+            <a:schemeClr val="accent1">
+              <a:shade val="50000"/>
+            </a:schemeClr>
+          </a:lnRef>
+          <a:fillRef idx="1">
+            <a:schemeClr val="accent1"/>
+          </a:fillRef>
+          <a:effectRef idx="0">
+            <a:schemeClr val="accent1"/>
+          </a:effectRef>
+          <a:fontRef idx="minor">
+            <a:schemeClr val="lt1"/>
+          </a:fontRef>
+        </p:style>
+        <p:txBody>
+          <a:bodyPr rtlCol="0" anchor="ctr"/>
+          <a:lstStyle/>
+          <a:p>
+            <a:pPr algn="ctr"/>
+            <a:r>
+              <a:rPr lang="en-US" sz="1600" dirty="0"/>
+              <a:t>Position</a:t>
+            </a:r>
+          </a:p>
+          <a:p>
+            <a:pPr algn="ctr"/>
+            <a:r>
+              <a:rPr lang="en-US" sz="1600" dirty="0" err="1"/>
+              <a:t>Mgmt</a:t>
+            </a:r>
+            <a:endParaRPr lang="en-US" sz="1600" dirty="0"/>
+          </a:p>
+        </p:txBody>
+      </p:sp>
+      <p:sp>
+        <p:nvSpPr>
+          <p:cNvPr id="72" name="Oval 71">
+            <a:extLst>
+              <a:ext uri="{FF2B5EF4-FFF2-40B4-BE49-F238E27FC236}">
+                <a16:creationId xmlns:a16="http://schemas.microsoft.com/office/drawing/2014/main" id="{3B452BEB-4F9D-4624-A2E7-8275E9A0CDC6}"/>
+              </a:ext>
+            </a:extLst>
+          </p:cNvPr>
+          <p:cNvSpPr/>
+          <p:nvPr/>
+        </p:nvSpPr>
+        <p:spPr>
+          <a:xfrm>
+            <a:off x="286023" y="1302806"/>
+            <a:ext cx="1166430" cy="769689"/>
+          </a:xfrm>
+          <a:prstGeom prst="ellipse">
+            <a:avLst/>
+          </a:prstGeom>
+        </p:spPr>
+        <p:style>
+          <a:lnRef idx="2">
+            <a:schemeClr val="accent1">
+              <a:shade val="50000"/>
+            </a:schemeClr>
+          </a:lnRef>
+          <a:fillRef idx="1">
+            <a:schemeClr val="accent1"/>
+          </a:fillRef>
+          <a:effectRef idx="0">
+            <a:schemeClr val="accent1"/>
+          </a:effectRef>
+          <a:fontRef idx="minor">
+            <a:schemeClr val="lt1"/>
+          </a:fontRef>
+        </p:style>
+        <p:txBody>
+          <a:bodyPr rtlCol="0" anchor="ctr"/>
+          <a:lstStyle/>
+          <a:p>
+            <a:pPr algn="ctr"/>
+            <a:r>
+              <a:rPr lang="en-US" sz="1600" dirty="0"/>
+              <a:t>Money </a:t>
+            </a:r>
+            <a:r>
+              <a:rPr lang="en-US" sz="1600" dirty="0" err="1"/>
+              <a:t>Mgmt</a:t>
+            </a:r>
+            <a:endParaRPr lang="en-US" sz="1600" dirty="0"/>
+          </a:p>
+        </p:txBody>
+      </p:sp>
+      <p:sp>
+        <p:nvSpPr>
+          <p:cNvPr id="73" name="Oval 72">
+            <a:extLst>
+              <a:ext uri="{FF2B5EF4-FFF2-40B4-BE49-F238E27FC236}">
+                <a16:creationId xmlns:a16="http://schemas.microsoft.com/office/drawing/2014/main" id="{185A0391-72E3-424E-A94D-CD83EF9E1F01}"/>
+              </a:ext>
+            </a:extLst>
+          </p:cNvPr>
+          <p:cNvSpPr/>
+          <p:nvPr/>
+        </p:nvSpPr>
+        <p:spPr>
+          <a:xfrm>
+            <a:off x="1816702" y="1293571"/>
+            <a:ext cx="1038624" cy="787640"/>
+          </a:xfrm>
+          <a:prstGeom prst="ellipse">
+            <a:avLst/>
+          </a:prstGeom>
+        </p:spPr>
+        <p:style>
+          <a:lnRef idx="2">
+            <a:schemeClr val="accent1">
+              <a:shade val="50000"/>
+            </a:schemeClr>
+          </a:lnRef>
+          <a:fillRef idx="1">
+            <a:schemeClr val="accent1"/>
+          </a:fillRef>
+          <a:effectRef idx="0">
+            <a:schemeClr val="accent1"/>
+          </a:effectRef>
+          <a:fontRef idx="minor">
+            <a:schemeClr val="lt1"/>
+          </a:fontRef>
+        </p:style>
+        <p:txBody>
+          <a:bodyPr rtlCol="0" anchor="ctr"/>
+          <a:lstStyle/>
+          <a:p>
+            <a:pPr algn="ctr"/>
+            <a:r>
+              <a:rPr lang="en-US" sz="1600" dirty="0"/>
+              <a:t>Trade</a:t>
+            </a:r>
+          </a:p>
+          <a:p>
+            <a:pPr algn="ctr"/>
+            <a:r>
+              <a:rPr lang="en-US" sz="1600" dirty="0" err="1"/>
+              <a:t>Mgmt</a:t>
+            </a:r>
+            <a:endParaRPr lang="en-US" sz="1600" dirty="0"/>
+          </a:p>
+        </p:txBody>
+      </p:sp>
+      <p:cxnSp>
+        <p:nvCxnSpPr>
+          <p:cNvPr id="75" name="Straight Arrow Connector 74">
+            <a:extLst>
+              <a:ext uri="{FF2B5EF4-FFF2-40B4-BE49-F238E27FC236}">
+                <a16:creationId xmlns:a16="http://schemas.microsoft.com/office/drawing/2014/main" id="{E3406A20-776B-47B6-90D3-EA75AB0CB0EA}"/>
+              </a:ext>
+            </a:extLst>
+          </p:cNvPr>
+          <p:cNvCxnSpPr>
+            <a:cxnSpLocks/>
+            <a:stCxn id="37" idx="2"/>
+            <a:endCxn id="71" idx="0"/>
+          </p:cNvCxnSpPr>
+          <p:nvPr/>
+        </p:nvCxnSpPr>
+        <p:spPr>
+          <a:xfrm flipH="1">
+            <a:off x="846421" y="3556971"/>
+            <a:ext cx="815152" cy="540071"/>
+          </a:xfrm>
+          <a:prstGeom prst="straightConnector1">
+            <a:avLst/>
+          </a:prstGeom>
+          <a:ln>
+            <a:headEnd type="triangle"/>
+            <a:tailEnd type="triangle"/>
+          </a:ln>
+        </p:spPr>
+        <p:style>
+          <a:lnRef idx="1">
+            <a:schemeClr val="accent1"/>
+          </a:lnRef>
+          <a:fillRef idx="0">
+            <a:schemeClr val="accent1"/>
+          </a:fillRef>
+          <a:effectRef idx="0">
+            <a:schemeClr val="accent1"/>
+          </a:effectRef>
+          <a:fontRef idx="minor">
+            <a:schemeClr val="tx1"/>
+          </a:fontRef>
+        </p:style>
+      </p:cxnSp>
+      <p:cxnSp>
+        <p:nvCxnSpPr>
+          <p:cNvPr id="76" name="Straight Arrow Connector 75">
+            <a:extLst>
+              <a:ext uri="{FF2B5EF4-FFF2-40B4-BE49-F238E27FC236}">
+                <a16:creationId xmlns:a16="http://schemas.microsoft.com/office/drawing/2014/main" id="{A8C3C29B-89B8-4D34-AD95-F658053D788F}"/>
+              </a:ext>
+            </a:extLst>
+          </p:cNvPr>
+          <p:cNvCxnSpPr>
+            <a:cxnSpLocks/>
+            <a:stCxn id="37" idx="0"/>
+            <a:endCxn id="72" idx="4"/>
+          </p:cNvCxnSpPr>
+          <p:nvPr/>
+        </p:nvCxnSpPr>
+        <p:spPr>
+          <a:xfrm flipH="1" flipV="1">
+            <a:off x="869238" y="2072495"/>
+            <a:ext cx="792335" cy="780219"/>
+          </a:xfrm>
+          <a:prstGeom prst="straightConnector1">
+            <a:avLst/>
+          </a:prstGeom>
+          <a:ln>
+            <a:headEnd type="triangle"/>
+            <a:tailEnd type="triangle"/>
+          </a:ln>
+        </p:spPr>
+        <p:style>
+          <a:lnRef idx="1">
+            <a:schemeClr val="accent1"/>
+          </a:lnRef>
+          <a:fillRef idx="0">
+            <a:schemeClr val="accent1"/>
+          </a:fillRef>
+          <a:effectRef idx="0">
+            <a:schemeClr val="accent1"/>
+          </a:effectRef>
+          <a:fontRef idx="minor">
+            <a:schemeClr val="tx1"/>
+          </a:fontRef>
+        </p:style>
+      </p:cxnSp>
+      <p:cxnSp>
+        <p:nvCxnSpPr>
+          <p:cNvPr id="77" name="Straight Arrow Connector 76">
+            <a:extLst>
+              <a:ext uri="{FF2B5EF4-FFF2-40B4-BE49-F238E27FC236}">
+                <a16:creationId xmlns:a16="http://schemas.microsoft.com/office/drawing/2014/main" id="{F4E2DAB9-B250-4E2C-85C0-FF56D58B01F1}"/>
+              </a:ext>
+            </a:extLst>
+          </p:cNvPr>
+          <p:cNvCxnSpPr>
+            <a:cxnSpLocks/>
+            <a:stCxn id="133" idx="0"/>
+            <a:endCxn id="37" idx="2"/>
+          </p:cNvCxnSpPr>
+          <p:nvPr/>
+        </p:nvCxnSpPr>
+        <p:spPr>
+          <a:xfrm flipH="1" flipV="1">
+            <a:off x="1661573" y="3556971"/>
+            <a:ext cx="1238856" cy="602341"/>
+          </a:xfrm>
+          <a:prstGeom prst="straightConnector1">
+            <a:avLst/>
+          </a:prstGeom>
+          <a:ln>
+            <a:headEnd type="triangle"/>
+            <a:tailEnd type="triangle"/>
+          </a:ln>
+        </p:spPr>
+        <p:style>
+          <a:lnRef idx="1">
+            <a:schemeClr val="accent1"/>
+          </a:lnRef>
+          <a:fillRef idx="0">
+            <a:schemeClr val="accent1"/>
+          </a:fillRef>
+          <a:effectRef idx="0">
+            <a:schemeClr val="accent1"/>
+          </a:effectRef>
+          <a:fontRef idx="minor">
+            <a:schemeClr val="tx1"/>
+          </a:fontRef>
+        </p:style>
+      </p:cxnSp>
+      <p:cxnSp>
+        <p:nvCxnSpPr>
+          <p:cNvPr id="87" name="Straight Arrow Connector 86">
+            <a:extLst>
+              <a:ext uri="{FF2B5EF4-FFF2-40B4-BE49-F238E27FC236}">
+                <a16:creationId xmlns:a16="http://schemas.microsoft.com/office/drawing/2014/main" id="{DC130D63-5BAA-4DF8-BA76-733E8A5E694A}"/>
+              </a:ext>
+            </a:extLst>
+          </p:cNvPr>
+          <p:cNvCxnSpPr>
+            <a:cxnSpLocks/>
+            <a:stCxn id="38" idx="1"/>
+            <a:endCxn id="37" idx="3"/>
+          </p:cNvCxnSpPr>
+          <p:nvPr/>
+        </p:nvCxnSpPr>
+        <p:spPr>
+          <a:xfrm flipH="1">
+            <a:off x="2180885" y="3201635"/>
+            <a:ext cx="704483" cy="3208"/>
+          </a:xfrm>
+          <a:prstGeom prst="straightConnector1">
+            <a:avLst/>
+          </a:prstGeom>
+          <a:ln>
+            <a:tailEnd type="triangle"/>
+          </a:ln>
+        </p:spPr>
+        <p:style>
+          <a:lnRef idx="1">
+            <a:schemeClr val="accent1"/>
+          </a:lnRef>
+          <a:fillRef idx="0">
+            <a:schemeClr val="accent1"/>
+          </a:fillRef>
+          <a:effectRef idx="0">
+            <a:schemeClr val="accent1"/>
+          </a:effectRef>
+          <a:fontRef idx="minor">
+            <a:schemeClr val="tx1"/>
+          </a:fontRef>
+        </p:style>
+      </p:cxnSp>
+      <p:sp>
+        <p:nvSpPr>
+          <p:cNvPr id="92" name="Rectangle 91">
+            <a:extLst>
+              <a:ext uri="{FF2B5EF4-FFF2-40B4-BE49-F238E27FC236}">
+                <a16:creationId xmlns:a16="http://schemas.microsoft.com/office/drawing/2014/main" id="{76A6117F-792D-4F0B-93AA-32C82F89B02F}"/>
+              </a:ext>
+            </a:extLst>
+          </p:cNvPr>
+          <p:cNvSpPr/>
+          <p:nvPr/>
+        </p:nvSpPr>
+        <p:spPr>
+          <a:xfrm>
+            <a:off x="4891154" y="1308682"/>
+            <a:ext cx="2193141" cy="5184191"/>
+          </a:xfrm>
+          <a:prstGeom prst="rect">
+            <a:avLst/>
+          </a:prstGeom>
+          <a:noFill/>
+          <a:ln>
+            <a:solidFill>
+              <a:schemeClr val="accent1">
+                <a:shade val="50000"/>
+              </a:schemeClr>
+            </a:solidFill>
+            <a:prstDash val="dash"/>
+          </a:ln>
+        </p:spPr>
+        <p:style>
+          <a:lnRef idx="2">
+            <a:schemeClr val="accent1">
+              <a:shade val="50000"/>
+            </a:schemeClr>
+          </a:lnRef>
+          <a:fillRef idx="1">
+            <a:schemeClr val="accent1"/>
+          </a:fillRef>
+          <a:effectRef idx="0">
+            <a:schemeClr val="accent1"/>
+          </a:effectRef>
+          <a:fontRef idx="minor">
+            <a:schemeClr val="lt1"/>
+          </a:fontRef>
+        </p:style>
+        <p:txBody>
+          <a:bodyPr rtlCol="0" anchor="ctr"/>
+          <a:lstStyle/>
+          <a:p>
+            <a:pPr algn="ctr"/>
+            <a:endParaRPr lang="en-US"/>
+          </a:p>
+        </p:txBody>
+      </p:sp>
+      <p:sp>
+        <p:nvSpPr>
+          <p:cNvPr id="93" name="Rectangle: Rounded Corners 92">
+            <a:extLst>
+              <a:ext uri="{FF2B5EF4-FFF2-40B4-BE49-F238E27FC236}">
+                <a16:creationId xmlns:a16="http://schemas.microsoft.com/office/drawing/2014/main" id="{8DAA03FB-1A8F-45BA-97AE-4029A8AE266D}"/>
+              </a:ext>
+            </a:extLst>
+          </p:cNvPr>
+          <p:cNvSpPr/>
+          <p:nvPr/>
+        </p:nvSpPr>
+        <p:spPr>
+          <a:xfrm>
+            <a:off x="5291111" y="4961970"/>
+            <a:ext cx="1484243" cy="574583"/>
+          </a:xfrm>
+          <a:prstGeom prst="roundRect">
+            <a:avLst/>
+          </a:prstGeom>
+        </p:spPr>
+        <p:style>
+          <a:lnRef idx="2">
+            <a:schemeClr val="accent1">
+              <a:shade val="50000"/>
+            </a:schemeClr>
+          </a:lnRef>
+          <a:fillRef idx="1">
+            <a:schemeClr val="accent1"/>
+          </a:fillRef>
+          <a:effectRef idx="0">
+            <a:schemeClr val="accent1"/>
+          </a:effectRef>
+          <a:fontRef idx="minor">
+            <a:schemeClr val="lt1"/>
+          </a:fontRef>
+        </p:style>
+        <p:txBody>
+          <a:bodyPr rtlCol="0" anchor="ctr"/>
+          <a:lstStyle/>
+          <a:p>
+            <a:pPr algn="ctr"/>
+            <a:r>
+              <a:rPr lang="en-US" sz="1600" dirty="0" err="1"/>
+              <a:t>ExitOnly</a:t>
+            </a:r>
+            <a:endParaRPr lang="en-US" sz="1600" dirty="0"/>
+          </a:p>
+        </p:txBody>
+      </p:sp>
+      <p:sp>
+        <p:nvSpPr>
+          <p:cNvPr id="94" name="Arrow: Left 93">
+            <a:extLst>
+              <a:ext uri="{FF2B5EF4-FFF2-40B4-BE49-F238E27FC236}">
+                <a16:creationId xmlns:a16="http://schemas.microsoft.com/office/drawing/2014/main" id="{1DC0DD0F-32B9-4D26-9004-6B9D08BD607E}"/>
+              </a:ext>
+            </a:extLst>
+          </p:cNvPr>
+          <p:cNvSpPr/>
+          <p:nvPr/>
+        </p:nvSpPr>
+        <p:spPr>
+          <a:xfrm>
+            <a:off x="4255436" y="2973791"/>
+            <a:ext cx="635717" cy="482889"/>
+          </a:xfrm>
+          <a:prstGeom prst="leftArrow">
+            <a:avLst/>
+          </a:prstGeom>
+        </p:spPr>
+        <p:style>
+          <a:lnRef idx="2">
+            <a:schemeClr val="accent1">
+              <a:shade val="50000"/>
+            </a:schemeClr>
+          </a:lnRef>
+          <a:fillRef idx="1">
+            <a:schemeClr val="accent1"/>
+          </a:fillRef>
+          <a:effectRef idx="0">
+            <a:schemeClr val="accent1"/>
+          </a:effectRef>
+          <a:fontRef idx="minor">
+            <a:schemeClr val="lt1"/>
+          </a:fontRef>
+        </p:style>
+        <p:txBody>
+          <a:bodyPr rtlCol="0" anchor="ctr"/>
+          <a:lstStyle/>
+          <a:p>
+            <a:pPr algn="ctr"/>
+            <a:endParaRPr lang="en-US"/>
+          </a:p>
+        </p:txBody>
+      </p:sp>
+      <p:sp>
+        <p:nvSpPr>
+          <p:cNvPr id="95" name="Arrow: Left 94">
+            <a:extLst>
+              <a:ext uri="{FF2B5EF4-FFF2-40B4-BE49-F238E27FC236}">
+                <a16:creationId xmlns:a16="http://schemas.microsoft.com/office/drawing/2014/main" id="{4DC4B740-3767-473D-B977-C0CA4035EAF5}"/>
+              </a:ext>
+            </a:extLst>
+          </p:cNvPr>
+          <p:cNvSpPr/>
+          <p:nvPr/>
+        </p:nvSpPr>
+        <p:spPr>
+          <a:xfrm>
+            <a:off x="7084295" y="2992415"/>
+            <a:ext cx="647198" cy="474476"/>
+          </a:xfrm>
+          <a:prstGeom prst="leftArrow">
+            <a:avLst/>
+          </a:prstGeom>
+        </p:spPr>
+        <p:style>
+          <a:lnRef idx="2">
+            <a:schemeClr val="accent1">
+              <a:shade val="50000"/>
+            </a:schemeClr>
+          </a:lnRef>
+          <a:fillRef idx="1">
+            <a:schemeClr val="accent1"/>
+          </a:fillRef>
+          <a:effectRef idx="0">
+            <a:schemeClr val="accent1"/>
+          </a:effectRef>
+          <a:fontRef idx="minor">
+            <a:schemeClr val="lt1"/>
+          </a:fontRef>
+        </p:style>
+        <p:txBody>
+          <a:bodyPr rtlCol="0" anchor="ctr"/>
+          <a:lstStyle/>
+          <a:p>
+            <a:pPr algn="ctr"/>
+            <a:endParaRPr lang="en-US"/>
+          </a:p>
+        </p:txBody>
+      </p:sp>
+      <p:cxnSp>
+        <p:nvCxnSpPr>
+          <p:cNvPr id="96" name="Straight Arrow Connector 95">
+            <a:extLst>
+              <a:ext uri="{FF2B5EF4-FFF2-40B4-BE49-F238E27FC236}">
+                <a16:creationId xmlns:a16="http://schemas.microsoft.com/office/drawing/2014/main" id="{B93FB528-9078-4A1B-B186-D38AD705110A}"/>
+              </a:ext>
+            </a:extLst>
+          </p:cNvPr>
+          <p:cNvCxnSpPr>
+            <a:cxnSpLocks/>
+            <a:stCxn id="49" idx="1"/>
+            <a:endCxn id="106" idx="3"/>
+          </p:cNvCxnSpPr>
+          <p:nvPr/>
+        </p:nvCxnSpPr>
+        <p:spPr>
+          <a:xfrm flipH="1" flipV="1">
+            <a:off x="9202483" y="3219120"/>
+            <a:ext cx="969988" cy="1530564"/>
+          </a:xfrm>
+          <a:prstGeom prst="straightConnector1">
+            <a:avLst/>
+          </a:prstGeom>
+          <a:ln>
+            <a:tailEnd type="triangle"/>
+          </a:ln>
+        </p:spPr>
+        <p:style>
+          <a:lnRef idx="1">
+            <a:schemeClr val="accent1"/>
+          </a:lnRef>
+          <a:fillRef idx="0">
+            <a:schemeClr val="accent1"/>
+          </a:fillRef>
+          <a:effectRef idx="0">
+            <a:schemeClr val="accent1"/>
+          </a:effectRef>
+          <a:fontRef idx="minor">
+            <a:schemeClr val="tx1"/>
+          </a:fontRef>
+        </p:style>
+      </p:cxnSp>
+      <p:cxnSp>
+        <p:nvCxnSpPr>
+          <p:cNvPr id="97" name="Straight Arrow Connector 96">
+            <a:extLst>
+              <a:ext uri="{FF2B5EF4-FFF2-40B4-BE49-F238E27FC236}">
+                <a16:creationId xmlns:a16="http://schemas.microsoft.com/office/drawing/2014/main" id="{1CF4A800-7DB0-45B3-9E98-8305C592244F}"/>
+              </a:ext>
+            </a:extLst>
+          </p:cNvPr>
+          <p:cNvCxnSpPr>
+            <a:cxnSpLocks/>
+            <a:endCxn id="106" idx="3"/>
+          </p:cNvCxnSpPr>
+          <p:nvPr/>
+        </p:nvCxnSpPr>
+        <p:spPr>
+          <a:xfrm flipH="1" flipV="1">
+            <a:off x="9202483" y="3219120"/>
+            <a:ext cx="1096064" cy="29006"/>
+          </a:xfrm>
+          <a:prstGeom prst="straightConnector1">
+            <a:avLst/>
+          </a:prstGeom>
+          <a:ln>
+            <a:tailEnd type="triangle"/>
+          </a:ln>
+        </p:spPr>
+        <p:style>
+          <a:lnRef idx="1">
+            <a:schemeClr val="accent1"/>
+          </a:lnRef>
+          <a:fillRef idx="0">
+            <a:schemeClr val="accent1"/>
+          </a:fillRef>
+          <a:effectRef idx="0">
+            <a:schemeClr val="accent1"/>
+          </a:effectRef>
+          <a:fontRef idx="minor">
+            <a:schemeClr val="tx1"/>
+          </a:fontRef>
+        </p:style>
+      </p:cxnSp>
+      <p:cxnSp>
+        <p:nvCxnSpPr>
+          <p:cNvPr id="98" name="Straight Arrow Connector 97">
+            <a:extLst>
+              <a:ext uri="{FF2B5EF4-FFF2-40B4-BE49-F238E27FC236}">
+                <a16:creationId xmlns:a16="http://schemas.microsoft.com/office/drawing/2014/main" id="{23CEECF9-BC13-4D2F-A8C1-1382975CF76B}"/>
+              </a:ext>
+            </a:extLst>
+          </p:cNvPr>
+          <p:cNvCxnSpPr>
+            <a:cxnSpLocks/>
+            <a:stCxn id="51" idx="1"/>
+            <a:endCxn id="106" idx="3"/>
+          </p:cNvCxnSpPr>
+          <p:nvPr/>
+        </p:nvCxnSpPr>
+        <p:spPr>
+          <a:xfrm flipH="1">
+            <a:off x="9202483" y="1783990"/>
+            <a:ext cx="922627" cy="1435130"/>
+          </a:xfrm>
+          <a:prstGeom prst="straightConnector1">
+            <a:avLst/>
+          </a:prstGeom>
+          <a:ln>
+            <a:tailEnd type="triangle"/>
+          </a:ln>
+        </p:spPr>
+        <p:style>
+          <a:lnRef idx="1">
+            <a:schemeClr val="accent1"/>
+          </a:lnRef>
+          <a:fillRef idx="0">
+            <a:schemeClr val="accent1"/>
+          </a:fillRef>
+          <a:effectRef idx="0">
+            <a:schemeClr val="accent1"/>
+          </a:effectRef>
+          <a:fontRef idx="minor">
+            <a:schemeClr val="tx1"/>
+          </a:fontRef>
+        </p:style>
+      </p:cxnSp>
+      <p:sp>
+        <p:nvSpPr>
+          <p:cNvPr id="106" name="Diamond 105">
+            <a:extLst>
+              <a:ext uri="{FF2B5EF4-FFF2-40B4-BE49-F238E27FC236}">
+                <a16:creationId xmlns:a16="http://schemas.microsoft.com/office/drawing/2014/main" id="{711EA771-4913-4CFD-85D5-50B79A85DE4D}"/>
+              </a:ext>
+            </a:extLst>
+          </p:cNvPr>
+          <p:cNvSpPr/>
+          <p:nvPr/>
+        </p:nvSpPr>
+        <p:spPr>
+          <a:xfrm>
+            <a:off x="7718240" y="2862797"/>
+            <a:ext cx="1484243" cy="712646"/>
+          </a:xfrm>
+          <a:prstGeom prst="diamond">
+            <a:avLst/>
+          </a:prstGeom>
+        </p:spPr>
+        <p:style>
+          <a:lnRef idx="2">
+            <a:schemeClr val="accent1">
+              <a:shade val="50000"/>
+            </a:schemeClr>
+          </a:lnRef>
+          <a:fillRef idx="1">
+            <a:schemeClr val="accent1"/>
+          </a:fillRef>
+          <a:effectRef idx="0">
+            <a:schemeClr val="accent1"/>
+          </a:effectRef>
+          <a:fontRef idx="minor">
+            <a:schemeClr val="lt1"/>
+          </a:fontRef>
+        </p:style>
+        <p:txBody>
+          <a:bodyPr rtlCol="0" anchor="ctr"/>
+          <a:lstStyle/>
+          <a:p>
+            <a:pPr algn="ctr"/>
+            <a:r>
+              <a:rPr lang="en-US" sz="1600" dirty="0"/>
+              <a:t>Engine</a:t>
+            </a:r>
+          </a:p>
+        </p:txBody>
+      </p:sp>
+      <p:sp>
+        <p:nvSpPr>
+          <p:cNvPr id="124" name="Cloud 123">
+            <a:extLst>
+              <a:ext uri="{FF2B5EF4-FFF2-40B4-BE49-F238E27FC236}">
+                <a16:creationId xmlns:a16="http://schemas.microsoft.com/office/drawing/2014/main" id="{F209CF20-06C7-4B36-89FA-1EA6B820C810}"/>
+              </a:ext>
+            </a:extLst>
+          </p:cNvPr>
+          <p:cNvSpPr/>
+          <p:nvPr/>
+        </p:nvSpPr>
+        <p:spPr>
+          <a:xfrm>
+            <a:off x="1888278" y="5120890"/>
+            <a:ext cx="2377499" cy="827541"/>
+          </a:xfrm>
+          <a:prstGeom prst="cloud">
+            <a:avLst/>
+          </a:prstGeom>
+          <a:solidFill>
+            <a:schemeClr val="accent5">
+              <a:lumMod val="40000"/>
+              <a:lumOff val="60000"/>
+            </a:schemeClr>
+          </a:solidFill>
+        </p:spPr>
+        <p:style>
+          <a:lnRef idx="2">
+            <a:schemeClr val="accent1">
+              <a:shade val="50000"/>
+            </a:schemeClr>
+          </a:lnRef>
+          <a:fillRef idx="1">
+            <a:schemeClr val="accent1"/>
+          </a:fillRef>
+          <a:effectRef idx="0">
+            <a:schemeClr val="accent1"/>
+          </a:effectRef>
+          <a:fontRef idx="minor">
+            <a:schemeClr val="lt1"/>
+          </a:fontRef>
+        </p:style>
+        <p:txBody>
+          <a:bodyPr rtlCol="0" anchor="ctr"/>
+          <a:lstStyle/>
+          <a:p>
+            <a:pPr algn="ctr"/>
+            <a:r>
+              <a:rPr lang="en-US" dirty="0">
+                <a:solidFill>
+                  <a:schemeClr val="tx1">
+                    <a:lumMod val="75000"/>
+                    <a:lumOff val="25000"/>
+                  </a:schemeClr>
+                </a:solidFill>
+              </a:rPr>
+              <a:t>Internet/Web</a:t>
+            </a:r>
+          </a:p>
+        </p:txBody>
+      </p:sp>
+      <p:pic>
+        <p:nvPicPr>
+          <p:cNvPr id="126" name="Picture 125">
+            <a:extLst>
+              <a:ext uri="{FF2B5EF4-FFF2-40B4-BE49-F238E27FC236}">
+                <a16:creationId xmlns:a16="http://schemas.microsoft.com/office/drawing/2014/main" id="{D1A03DEF-8E49-401A-87D9-72B99CE03E90}"/>
+              </a:ext>
+            </a:extLst>
+          </p:cNvPr>
+          <p:cNvPicPr>
+            <a:picLocks noChangeAspect="1"/>
+          </p:cNvPicPr>
+          <p:nvPr/>
+        </p:nvPicPr>
+        <p:blipFill>
+          <a:blip r:embed="rId2"/>
+          <a:stretch>
+            <a:fillRect/>
+          </a:stretch>
+        </p:blipFill>
+        <p:spPr>
+          <a:xfrm>
+            <a:off x="582260" y="5156653"/>
+            <a:ext cx="506420" cy="765263"/>
+          </a:xfrm>
+          <a:prstGeom prst="rect">
+            <a:avLst/>
+          </a:prstGeom>
+        </p:spPr>
+      </p:pic>
+      <p:cxnSp>
+        <p:nvCxnSpPr>
+          <p:cNvPr id="127" name="Straight Arrow Connector 126">
+            <a:extLst>
+              <a:ext uri="{FF2B5EF4-FFF2-40B4-BE49-F238E27FC236}">
+                <a16:creationId xmlns:a16="http://schemas.microsoft.com/office/drawing/2014/main" id="{6986BC2D-5779-4C7F-8289-6AA8D11385C0}"/>
+              </a:ext>
+            </a:extLst>
+          </p:cNvPr>
+          <p:cNvCxnSpPr>
+            <a:cxnSpLocks/>
+            <a:stCxn id="124" idx="2"/>
+            <a:endCxn id="126" idx="3"/>
+          </p:cNvCxnSpPr>
+          <p:nvPr/>
+        </p:nvCxnSpPr>
+        <p:spPr>
+          <a:xfrm flipH="1">
+            <a:off x="1088680" y="5534661"/>
+            <a:ext cx="806973" cy="4624"/>
+          </a:xfrm>
+          <a:prstGeom prst="straightConnector1">
+            <a:avLst/>
+          </a:prstGeom>
+          <a:ln>
+            <a:headEnd type="triangle"/>
+            <a:tailEnd type="triangle"/>
+          </a:ln>
+        </p:spPr>
+        <p:style>
+          <a:lnRef idx="1">
+            <a:schemeClr val="accent1"/>
+          </a:lnRef>
+          <a:fillRef idx="0">
+            <a:schemeClr val="accent1"/>
+          </a:fillRef>
+          <a:effectRef idx="0">
+            <a:schemeClr val="accent1"/>
+          </a:effectRef>
+          <a:fontRef idx="minor">
+            <a:schemeClr val="tx1"/>
+          </a:fontRef>
+        </p:style>
+      </p:cxnSp>
+      <p:sp>
+        <p:nvSpPr>
+          <p:cNvPr id="133" name="Speech Bubble: Rectangle with Corners Rounded 132">
+            <a:extLst>
+              <a:ext uri="{FF2B5EF4-FFF2-40B4-BE49-F238E27FC236}">
+                <a16:creationId xmlns:a16="http://schemas.microsoft.com/office/drawing/2014/main" id="{626A27AA-B3A0-48B1-91C4-400740FA1A57}"/>
+              </a:ext>
+            </a:extLst>
+          </p:cNvPr>
+          <p:cNvSpPr/>
+          <p:nvPr/>
+        </p:nvSpPr>
+        <p:spPr>
+          <a:xfrm>
+            <a:off x="2014289" y="4159312"/>
+            <a:ext cx="1772279" cy="667355"/>
+          </a:xfrm>
+          <a:prstGeom prst="wedgeRoundRectCallout">
+            <a:avLst>
+              <a:gd name="adj1" fmla="val 11479"/>
+              <a:gd name="adj2" fmla="val 109557"/>
+              <a:gd name="adj3" fmla="val 16667"/>
+            </a:avLst>
+          </a:prstGeom>
+          <a:solidFill>
+            <a:schemeClr val="accent5">
+              <a:lumMod val="40000"/>
+              <a:lumOff val="60000"/>
+            </a:schemeClr>
+          </a:solidFill>
+        </p:spPr>
+        <p:style>
+          <a:lnRef idx="2">
+            <a:schemeClr val="accent1">
+              <a:shade val="50000"/>
+            </a:schemeClr>
+          </a:lnRef>
+          <a:fillRef idx="1">
+            <a:schemeClr val="accent1"/>
+          </a:fillRef>
+          <a:effectRef idx="0">
+            <a:schemeClr val="accent1"/>
+          </a:effectRef>
+          <a:fontRef idx="minor">
+            <a:schemeClr val="lt1"/>
+          </a:fontRef>
+        </p:style>
+        <p:txBody>
+          <a:bodyPr rtlCol="0" anchor="ctr"/>
+          <a:lstStyle/>
+          <a:p>
+            <a:pPr algn="ctr"/>
+            <a:r>
+              <a:rPr lang="en-US" sz="1400" dirty="0">
+                <a:solidFill>
+                  <a:schemeClr val="bg2">
+                    <a:lumMod val="25000"/>
+                  </a:schemeClr>
+                </a:solidFill>
+              </a:rPr>
+              <a:t>Input: Command</a:t>
+            </a:r>
+          </a:p>
+          <a:p>
+            <a:pPr algn="ctr"/>
+            <a:r>
+              <a:rPr lang="en-US" sz="1400" dirty="0">
+                <a:solidFill>
+                  <a:schemeClr val="bg2">
+                    <a:lumMod val="25000"/>
+                  </a:schemeClr>
+                </a:solidFill>
+              </a:rPr>
+              <a:t>Output: Report, Log</a:t>
+            </a:r>
+          </a:p>
+        </p:txBody>
+      </p:sp>
+      <p:sp>
+        <p:nvSpPr>
+          <p:cNvPr id="140" name="TextBox 139">
+            <a:extLst>
+              <a:ext uri="{FF2B5EF4-FFF2-40B4-BE49-F238E27FC236}">
+                <a16:creationId xmlns:a16="http://schemas.microsoft.com/office/drawing/2014/main" id="{C8DC5CC3-F945-4F58-820E-B84C75D88892}"/>
+              </a:ext>
+            </a:extLst>
+          </p:cNvPr>
+          <p:cNvSpPr txBox="1"/>
+          <p:nvPr/>
+        </p:nvSpPr>
+        <p:spPr>
+          <a:xfrm>
+            <a:off x="8136347" y="3596104"/>
+            <a:ext cx="1095690" cy="1169551"/>
+          </a:xfrm>
+          <a:prstGeom prst="rect">
+            <a:avLst/>
+          </a:prstGeom>
+          <a:noFill/>
+        </p:spPr>
+        <p:txBody>
+          <a:bodyPr wrap="square" rtlCol="0">
+            <a:spAutoFit/>
+          </a:bodyPr>
+          <a:lstStyle/>
+          <a:p>
+            <a:r>
+              <a:rPr lang="en-US" sz="1400" dirty="0"/>
+              <a:t>Signals</a:t>
+            </a:r>
+          </a:p>
+          <a:p>
+            <a:r>
+              <a:rPr lang="en-US" sz="1400" dirty="0"/>
+              <a:t>Commands</a:t>
+            </a:r>
+          </a:p>
+          <a:p>
+            <a:r>
+              <a:rPr lang="en-US" sz="1400" dirty="0"/>
+              <a:t>Events</a:t>
+            </a:r>
+          </a:p>
+          <a:p>
+            <a:r>
+              <a:rPr lang="en-US" sz="1400" dirty="0"/>
+              <a:t>Combined</a:t>
+            </a:r>
+          </a:p>
+          <a:p>
+            <a:endParaRPr lang="en-US" sz="1400" dirty="0"/>
+          </a:p>
+        </p:txBody>
+      </p:sp>
+      <p:sp>
+        <p:nvSpPr>
+          <p:cNvPr id="153" name="TextBox 152">
+            <a:extLst>
+              <a:ext uri="{FF2B5EF4-FFF2-40B4-BE49-F238E27FC236}">
+                <a16:creationId xmlns:a16="http://schemas.microsoft.com/office/drawing/2014/main" id="{39597590-315D-4F10-917A-46DBC6110138}"/>
+              </a:ext>
+            </a:extLst>
+          </p:cNvPr>
+          <p:cNvSpPr txBox="1"/>
+          <p:nvPr/>
+        </p:nvSpPr>
+        <p:spPr>
+          <a:xfrm>
+            <a:off x="412120" y="6020970"/>
+            <a:ext cx="1404582" cy="523220"/>
+          </a:xfrm>
+          <a:prstGeom prst="rect">
+            <a:avLst/>
+          </a:prstGeom>
+          <a:noFill/>
+        </p:spPr>
+        <p:txBody>
+          <a:bodyPr wrap="square" rtlCol="0">
+            <a:spAutoFit/>
+          </a:bodyPr>
+          <a:lstStyle/>
+          <a:p>
+            <a:r>
+              <a:rPr lang="en-US" sz="1400" dirty="0"/>
+              <a:t>Mobile, Laptop,</a:t>
+            </a:r>
+          </a:p>
+          <a:p>
+            <a:r>
+              <a:rPr lang="en-US" sz="1400" dirty="0"/>
+              <a:t>Desktop</a:t>
+            </a:r>
+          </a:p>
+        </p:txBody>
+      </p:sp>
+    </p:spTree>
+    <p:extLst>
+      <p:ext uri="{BB962C8B-B14F-4D97-AF65-F5344CB8AC3E}">
+        <p14:creationId xmlns:p14="http://schemas.microsoft.com/office/powerpoint/2010/main" val="3234941050"/>
       </p:ext>
     </p:extLst>
   </p:cSld>

</xml_diff>

<commit_message>
Implemented TradeAction to hook up with TradeSignal;
</commit_message>
<xml_diff>
--- a/NT8/Ninjatrader-web.pptx
+++ b/NT8/Ninjatrader-web.pptx
@@ -261,7 +261,7 @@
           <a:p>
             <a:fld id="{83F1246B-29A4-445C-A64E-6BEFF5AEC172}" type="datetimeFigureOut">
               <a:rPr lang="en-US" smtClean="0"/>
-              <a:t>1/4/2020</a:t>
+              <a:t>1/7/2020</a:t>
             </a:fld>
             <a:endParaRPr lang="en-US"/>
           </a:p>
@@ -459,7 +459,7 @@
           <a:p>
             <a:fld id="{83F1246B-29A4-445C-A64E-6BEFF5AEC172}" type="datetimeFigureOut">
               <a:rPr lang="en-US" smtClean="0"/>
-              <a:t>1/4/2020</a:t>
+              <a:t>1/7/2020</a:t>
             </a:fld>
             <a:endParaRPr lang="en-US"/>
           </a:p>
@@ -667,7 +667,7 @@
           <a:p>
             <a:fld id="{83F1246B-29A4-445C-A64E-6BEFF5AEC172}" type="datetimeFigureOut">
               <a:rPr lang="en-US" smtClean="0"/>
-              <a:t>1/4/2020</a:t>
+              <a:t>1/7/2020</a:t>
             </a:fld>
             <a:endParaRPr lang="en-US"/>
           </a:p>
@@ -865,7 +865,7 @@
           <a:p>
             <a:fld id="{83F1246B-29A4-445C-A64E-6BEFF5AEC172}" type="datetimeFigureOut">
               <a:rPr lang="en-US" smtClean="0"/>
-              <a:t>1/4/2020</a:t>
+              <a:t>1/7/2020</a:t>
             </a:fld>
             <a:endParaRPr lang="en-US"/>
           </a:p>
@@ -1140,7 +1140,7 @@
           <a:p>
             <a:fld id="{83F1246B-29A4-445C-A64E-6BEFF5AEC172}" type="datetimeFigureOut">
               <a:rPr lang="en-US" smtClean="0"/>
-              <a:t>1/4/2020</a:t>
+              <a:t>1/7/2020</a:t>
             </a:fld>
             <a:endParaRPr lang="en-US"/>
           </a:p>
@@ -1405,7 +1405,7 @@
           <a:p>
             <a:fld id="{83F1246B-29A4-445C-A64E-6BEFF5AEC172}" type="datetimeFigureOut">
               <a:rPr lang="en-US" smtClean="0"/>
-              <a:t>1/4/2020</a:t>
+              <a:t>1/7/2020</a:t>
             </a:fld>
             <a:endParaRPr lang="en-US"/>
           </a:p>
@@ -1817,7 +1817,7 @@
           <a:p>
             <a:fld id="{83F1246B-29A4-445C-A64E-6BEFF5AEC172}" type="datetimeFigureOut">
               <a:rPr lang="en-US" smtClean="0"/>
-              <a:t>1/4/2020</a:t>
+              <a:t>1/7/2020</a:t>
             </a:fld>
             <a:endParaRPr lang="en-US"/>
           </a:p>
@@ -1958,7 +1958,7 @@
           <a:p>
             <a:fld id="{83F1246B-29A4-445C-A64E-6BEFF5AEC172}" type="datetimeFigureOut">
               <a:rPr lang="en-US" smtClean="0"/>
-              <a:t>1/4/2020</a:t>
+              <a:t>1/7/2020</a:t>
             </a:fld>
             <a:endParaRPr lang="en-US"/>
           </a:p>
@@ -2071,7 +2071,7 @@
           <a:p>
             <a:fld id="{83F1246B-29A4-445C-A64E-6BEFF5AEC172}" type="datetimeFigureOut">
               <a:rPr lang="en-US" smtClean="0"/>
-              <a:t>1/4/2020</a:t>
+              <a:t>1/7/2020</a:t>
             </a:fld>
             <a:endParaRPr lang="en-US"/>
           </a:p>
@@ -2382,7 +2382,7 @@
           <a:p>
             <a:fld id="{83F1246B-29A4-445C-A64E-6BEFF5AEC172}" type="datetimeFigureOut">
               <a:rPr lang="en-US" smtClean="0"/>
-              <a:t>1/4/2020</a:t>
+              <a:t>1/7/2020</a:t>
             </a:fld>
             <a:endParaRPr lang="en-US"/>
           </a:p>
@@ -2670,7 +2670,7 @@
           <a:p>
             <a:fld id="{83F1246B-29A4-445C-A64E-6BEFF5AEC172}" type="datetimeFigureOut">
               <a:rPr lang="en-US" smtClean="0"/>
-              <a:t>1/4/2020</a:t>
+              <a:t>1/7/2020</a:t>
             </a:fld>
             <a:endParaRPr lang="en-US"/>
           </a:p>
@@ -2911,7 +2911,7 @@
           <a:p>
             <a:fld id="{83F1246B-29A4-445C-A64E-6BEFF5AEC172}" type="datetimeFigureOut">
               <a:rPr lang="en-US" smtClean="0"/>
-              <a:t>1/4/2020</a:t>
+              <a:t>1/7/2020</a:t>
             </a:fld>
             <a:endParaRPr lang="en-US"/>
           </a:p>
@@ -5607,8 +5607,8 @@
         </p:nvSpPr>
         <p:spPr>
           <a:xfrm>
-            <a:off x="2885368" y="2844325"/>
-            <a:ext cx="1370069" cy="714620"/>
+            <a:off x="2784446" y="2844325"/>
+            <a:ext cx="1470991" cy="714620"/>
           </a:xfrm>
           <a:prstGeom prst="roundRect">
             <a:avLst/>
@@ -6202,49 +6202,6 @@
           </a:fontRef>
         </p:style>
       </p:cxnSp>
-      <p:cxnSp>
-        <p:nvCxnSpPr>
-          <p:cNvPr id="87" name="Straight Arrow Connector 86">
-            <a:extLst>
-              <a:ext uri="{FF2B5EF4-FFF2-40B4-BE49-F238E27FC236}">
-                <a16:creationId xmlns:a16="http://schemas.microsoft.com/office/drawing/2014/main" id="{DC130D63-5BAA-4DF8-BA76-733E8A5E694A}"/>
-              </a:ext>
-            </a:extLst>
-          </p:cNvPr>
-          <p:cNvCxnSpPr>
-            <a:cxnSpLocks/>
-            <a:stCxn id="38" idx="1"/>
-            <a:endCxn id="37" idx="3"/>
-          </p:cNvCxnSpPr>
-          <p:nvPr/>
-        </p:nvCxnSpPr>
-        <p:spPr>
-          <a:xfrm flipH="1">
-            <a:off x="2180885" y="3201635"/>
-            <a:ext cx="704483" cy="3208"/>
-          </a:xfrm>
-          <a:prstGeom prst="straightConnector1">
-            <a:avLst/>
-          </a:prstGeom>
-          <a:ln>
-            <a:tailEnd type="triangle"/>
-          </a:ln>
-        </p:spPr>
-        <p:style>
-          <a:lnRef idx="1">
-            <a:schemeClr val="accent1"/>
-          </a:lnRef>
-          <a:fillRef idx="0">
-            <a:schemeClr val="accent1"/>
-          </a:fillRef>
-          <a:effectRef idx="0">
-            <a:schemeClr val="accent1"/>
-          </a:effectRef>
-          <a:fontRef idx="minor">
-            <a:schemeClr val="tx1"/>
-          </a:fontRef>
-        </p:style>
-      </p:cxnSp>
       <p:sp>
         <p:nvSpPr>
           <p:cNvPr id="92" name="Rectangle 91">
@@ -6848,7 +6805,7 @@
         <p:spPr>
           <a:xfrm>
             <a:off x="8136347" y="3596104"/>
-            <a:ext cx="1095690" cy="1169551"/>
+            <a:ext cx="1200600" cy="1169551"/>
           </a:xfrm>
           <a:prstGeom prst="rect">
             <a:avLst/>
@@ -6869,13 +6826,13 @@
           <a:p>
             <a:r>
               <a:rPr lang="en-US" sz="1400" dirty="0"/>
-              <a:t>Commands</a:t>
+              <a:t>+ Commands</a:t>
             </a:r>
           </a:p>
           <a:p>
             <a:r>
               <a:rPr lang="en-US" sz="1400" dirty="0"/>
-              <a:t>Events</a:t>
+              <a:t>+ Events</a:t>
             </a:r>
           </a:p>
           <a:p>
@@ -6927,6 +6884,52 @@
               <a:rPr lang="en-US" sz="1400" dirty="0"/>
               <a:t>Desktop</a:t>
             </a:r>
+          </a:p>
+        </p:txBody>
+      </p:sp>
+      <p:sp>
+        <p:nvSpPr>
+          <p:cNvPr id="39" name="Arrow: Left 38">
+            <a:extLst>
+              <a:ext uri="{FF2B5EF4-FFF2-40B4-BE49-F238E27FC236}">
+                <a16:creationId xmlns:a16="http://schemas.microsoft.com/office/drawing/2014/main" id="{062E1260-5E7F-4C81-A10C-2F3D50C8A1B1}"/>
+              </a:ext>
+            </a:extLst>
+          </p:cNvPr>
+          <p:cNvSpPr/>
+          <p:nvPr/>
+        </p:nvSpPr>
+        <p:spPr>
+          <a:xfrm>
+            <a:off x="2180885" y="2960190"/>
+            <a:ext cx="603561" cy="482889"/>
+          </a:xfrm>
+          <a:prstGeom prst="leftArrow">
+            <a:avLst/>
+          </a:prstGeom>
+        </p:spPr>
+        <p:style>
+          <a:lnRef idx="2">
+            <a:schemeClr val="accent1">
+              <a:shade val="50000"/>
+            </a:schemeClr>
+          </a:lnRef>
+          <a:fillRef idx="1">
+            <a:schemeClr val="accent1"/>
+          </a:fillRef>
+          <a:effectRef idx="0">
+            <a:schemeClr val="accent1"/>
+          </a:effectRef>
+          <a:fontRef idx="minor">
+            <a:schemeClr val="lt1"/>
+          </a:fontRef>
+        </p:style>
+        <p:txBody>
+          <a:bodyPr rtlCol="0" anchor="ctr"/>
+          <a:lstStyle/>
+          <a:p>
+            <a:pPr algn="ctr"/>
+            <a:endParaRPr lang="en-US"/>
           </a:p>
         </p:txBody>
       </p:sp>

</xml_diff>

<commit_message>
Fixed the invalid SL/PT prices;
</commit_message>
<xml_diff>
--- a/NT8/Ninjatrader-web.pptx
+++ b/NT8/Ninjatrader-web.pptx
@@ -7,7 +7,14 @@
   <p:sldIdLst>
     <p:sldId id="258" r:id="rId2"/>
     <p:sldId id="260" r:id="rId3"/>
-    <p:sldId id="261" r:id="rId4"/>
+    <p:sldId id="267" r:id="rId4"/>
+    <p:sldId id="261" r:id="rId5"/>
+    <p:sldId id="262" r:id="rId6"/>
+    <p:sldId id="263" r:id="rId7"/>
+    <p:sldId id="264" r:id="rId8"/>
+    <p:sldId id="268" r:id="rId9"/>
+    <p:sldId id="265" r:id="rId10"/>
+    <p:sldId id="266" r:id="rId11"/>
   </p:sldIdLst>
   <p:sldSz cx="12192000" cy="6858000"/>
   <p:notesSz cx="6858000" cy="9144000"/>
@@ -261,7 +268,7 @@
           <a:p>
             <a:fld id="{83F1246B-29A4-445C-A64E-6BEFF5AEC172}" type="datetimeFigureOut">
               <a:rPr lang="en-US" smtClean="0"/>
-              <a:t>1/7/2020</a:t>
+              <a:t>1/22/2020</a:t>
             </a:fld>
             <a:endParaRPr lang="en-US"/>
           </a:p>
@@ -459,7 +466,7 @@
           <a:p>
             <a:fld id="{83F1246B-29A4-445C-A64E-6BEFF5AEC172}" type="datetimeFigureOut">
               <a:rPr lang="en-US" smtClean="0"/>
-              <a:t>1/7/2020</a:t>
+              <a:t>1/22/2020</a:t>
             </a:fld>
             <a:endParaRPr lang="en-US"/>
           </a:p>
@@ -667,7 +674,7 @@
           <a:p>
             <a:fld id="{83F1246B-29A4-445C-A64E-6BEFF5AEC172}" type="datetimeFigureOut">
               <a:rPr lang="en-US" smtClean="0"/>
-              <a:t>1/7/2020</a:t>
+              <a:t>1/22/2020</a:t>
             </a:fld>
             <a:endParaRPr lang="en-US"/>
           </a:p>
@@ -865,7 +872,7 @@
           <a:p>
             <a:fld id="{83F1246B-29A4-445C-A64E-6BEFF5AEC172}" type="datetimeFigureOut">
               <a:rPr lang="en-US" smtClean="0"/>
-              <a:t>1/7/2020</a:t>
+              <a:t>1/22/2020</a:t>
             </a:fld>
             <a:endParaRPr lang="en-US"/>
           </a:p>
@@ -1140,7 +1147,7 @@
           <a:p>
             <a:fld id="{83F1246B-29A4-445C-A64E-6BEFF5AEC172}" type="datetimeFigureOut">
               <a:rPr lang="en-US" smtClean="0"/>
-              <a:t>1/7/2020</a:t>
+              <a:t>1/22/2020</a:t>
             </a:fld>
             <a:endParaRPr lang="en-US"/>
           </a:p>
@@ -1405,7 +1412,7 @@
           <a:p>
             <a:fld id="{83F1246B-29A4-445C-A64E-6BEFF5AEC172}" type="datetimeFigureOut">
               <a:rPr lang="en-US" smtClean="0"/>
-              <a:t>1/7/2020</a:t>
+              <a:t>1/22/2020</a:t>
             </a:fld>
             <a:endParaRPr lang="en-US"/>
           </a:p>
@@ -1817,7 +1824,7 @@
           <a:p>
             <a:fld id="{83F1246B-29A4-445C-A64E-6BEFF5AEC172}" type="datetimeFigureOut">
               <a:rPr lang="en-US" smtClean="0"/>
-              <a:t>1/7/2020</a:t>
+              <a:t>1/22/2020</a:t>
             </a:fld>
             <a:endParaRPr lang="en-US"/>
           </a:p>
@@ -1958,7 +1965,7 @@
           <a:p>
             <a:fld id="{83F1246B-29A4-445C-A64E-6BEFF5AEC172}" type="datetimeFigureOut">
               <a:rPr lang="en-US" smtClean="0"/>
-              <a:t>1/7/2020</a:t>
+              <a:t>1/22/2020</a:t>
             </a:fld>
             <a:endParaRPr lang="en-US"/>
           </a:p>
@@ -2071,7 +2078,7 @@
           <a:p>
             <a:fld id="{83F1246B-29A4-445C-A64E-6BEFF5AEC172}" type="datetimeFigureOut">
               <a:rPr lang="en-US" smtClean="0"/>
-              <a:t>1/7/2020</a:t>
+              <a:t>1/22/2020</a:t>
             </a:fld>
             <a:endParaRPr lang="en-US"/>
           </a:p>
@@ -2382,7 +2389,7 @@
           <a:p>
             <a:fld id="{83F1246B-29A4-445C-A64E-6BEFF5AEC172}" type="datetimeFigureOut">
               <a:rPr lang="en-US" smtClean="0"/>
-              <a:t>1/7/2020</a:t>
+              <a:t>1/22/2020</a:t>
             </a:fld>
             <a:endParaRPr lang="en-US"/>
           </a:p>
@@ -2670,7 +2677,7 @@
           <a:p>
             <a:fld id="{83F1246B-29A4-445C-A64E-6BEFF5AEC172}" type="datetimeFigureOut">
               <a:rPr lang="en-US" smtClean="0"/>
-              <a:t>1/7/2020</a:t>
+              <a:t>1/22/2020</a:t>
             </a:fld>
             <a:endParaRPr lang="en-US"/>
           </a:p>
@@ -2911,7 +2918,7 @@
           <a:p>
             <a:fld id="{83F1246B-29A4-445C-A64E-6BEFF5AEC172}" type="datetimeFigureOut">
               <a:rPr lang="en-US" smtClean="0"/>
-              <a:t>1/7/2020</a:t>
+              <a:t>1/22/2020</a:t>
             </a:fld>
             <a:endParaRPr lang="en-US"/>
           </a:p>
@@ -4092,6 +4099,117 @@
 </p:sld>
 </file>
 
+<file path=ppt/slides/slide10.xml><?xml version="1.0" encoding="utf-8"?>
+<p:sld xmlns:a="http://schemas.openxmlformats.org/drawingml/2006/main" xmlns:r="http://schemas.openxmlformats.org/officeDocument/2006/relationships" xmlns:p="http://schemas.openxmlformats.org/presentationml/2006/main">
+  <p:cSld>
+    <p:spTree>
+      <p:nvGrpSpPr>
+        <p:cNvPr id="1" name=""/>
+        <p:cNvGrpSpPr/>
+        <p:nvPr/>
+      </p:nvGrpSpPr>
+      <p:grpSpPr>
+        <a:xfrm>
+          <a:off x="0" y="0"/>
+          <a:ext cx="0" cy="0"/>
+          <a:chOff x="0" y="0"/>
+          <a:chExt cx="0" cy="0"/>
+        </a:xfrm>
+      </p:grpSpPr>
+      <p:sp>
+        <p:nvSpPr>
+          <p:cNvPr id="2" name="Title 1">
+            <a:extLst>
+              <a:ext uri="{FF2B5EF4-FFF2-40B4-BE49-F238E27FC236}">
+                <a16:creationId xmlns:a16="http://schemas.microsoft.com/office/drawing/2014/main" id="{80EBE4C7-798B-48DA-B2FA-C7FB9666FBE0}"/>
+              </a:ext>
+            </a:extLst>
+          </p:cNvPr>
+          <p:cNvSpPr>
+            <a:spLocks noGrp="1"/>
+          </p:cNvSpPr>
+          <p:nvPr>
+            <p:ph type="title"/>
+          </p:nvPr>
+        </p:nvSpPr>
+        <p:spPr/>
+        <p:txBody>
+          <a:bodyPr/>
+          <a:lstStyle/>
+          <a:p>
+            <a:r>
+              <a:rPr lang="en-US" dirty="0"/>
+              <a:t>Where to Start With</a:t>
+            </a:r>
+          </a:p>
+        </p:txBody>
+      </p:sp>
+      <p:sp>
+        <p:nvSpPr>
+          <p:cNvPr id="3" name="Content Placeholder 2">
+            <a:extLst>
+              <a:ext uri="{FF2B5EF4-FFF2-40B4-BE49-F238E27FC236}">
+                <a16:creationId xmlns:a16="http://schemas.microsoft.com/office/drawing/2014/main" id="{A365D734-73BE-4EC0-A1A4-E255E4C8399E}"/>
+              </a:ext>
+            </a:extLst>
+          </p:cNvPr>
+          <p:cNvSpPr>
+            <a:spLocks noGrp="1"/>
+          </p:cNvSpPr>
+          <p:nvPr>
+            <p:ph idx="1"/>
+          </p:nvPr>
+        </p:nvSpPr>
+        <p:spPr/>
+        <p:txBody>
+          <a:bodyPr/>
+          <a:lstStyle/>
+          <a:p>
+            <a:r>
+              <a:rPr lang="en-US" dirty="0" err="1"/>
+              <a:t>Ninjatrader</a:t>
+            </a:r>
+            <a:r>
+              <a:rPr lang="en-US" dirty="0"/>
+              <a:t> Framework (Frontend + Backend)</a:t>
+            </a:r>
+          </a:p>
+          <a:p>
+            <a:r>
+              <a:rPr lang="en-US" dirty="0"/>
+              <a:t>Proprietary Strategies</a:t>
+            </a:r>
+          </a:p>
+          <a:p>
+            <a:r>
+              <a:rPr lang="en-US" dirty="0"/>
+              <a:t>Algo Trader’s Community (re-organize the trading book website?)</a:t>
+            </a:r>
+          </a:p>
+          <a:p>
+            <a:r>
+              <a:rPr lang="en-US" dirty="0"/>
+              <a:t>Training Materials and Beginner Programmer’s Training</a:t>
+            </a:r>
+          </a:p>
+          <a:p>
+            <a:endParaRPr lang="en-US" dirty="0"/>
+          </a:p>
+        </p:txBody>
+      </p:sp>
+    </p:spTree>
+    <p:extLst>
+      <p:ext uri="{BB962C8B-B14F-4D97-AF65-F5344CB8AC3E}">
+        <p14:creationId xmlns:p14="http://schemas.microsoft.com/office/powerpoint/2010/main" val="2801765652"/>
+      </p:ext>
+    </p:extLst>
+  </p:cSld>
+  <p:clrMapOvr>
+    <a:masterClrMapping/>
+  </p:clrMapOvr>
+</p:sld>
+</file>
+
 <file path=ppt/slides/slide2.xml><?xml version="1.0" encoding="utf-8"?>
 <p:sld xmlns:a="http://schemas.openxmlformats.org/drawingml/2006/main" xmlns:r="http://schemas.openxmlformats.org/officeDocument/2006/relationships" xmlns:p="http://schemas.openxmlformats.org/presentationml/2006/main">
   <p:cSld>
@@ -5305,6 +5423,1425 @@
             <a:pPr algn="ctr"/>
             <a:r>
               <a:rPr lang="en-US" dirty="0"/>
+              <a:t>Institute Subscription Mode – with </a:t>
+            </a:r>
+            <a:r>
+              <a:rPr lang="en-US" dirty="0" err="1"/>
+              <a:t>BackEnd</a:t>
+            </a:r>
+            <a:endParaRPr lang="en-US" dirty="0"/>
+          </a:p>
+        </p:txBody>
+      </p:sp>
+      <p:sp>
+        <p:nvSpPr>
+          <p:cNvPr id="4" name="Oval 3">
+            <a:extLst>
+              <a:ext uri="{FF2B5EF4-FFF2-40B4-BE49-F238E27FC236}">
+                <a16:creationId xmlns:a16="http://schemas.microsoft.com/office/drawing/2014/main" id="{47568DBD-5EAD-4283-AF4E-AF280617BC04}"/>
+              </a:ext>
+            </a:extLst>
+          </p:cNvPr>
+          <p:cNvSpPr/>
+          <p:nvPr/>
+        </p:nvSpPr>
+        <p:spPr>
+          <a:xfrm>
+            <a:off x="1974573" y="1206518"/>
+            <a:ext cx="1484243" cy="840822"/>
+          </a:xfrm>
+          <a:prstGeom prst="ellipse">
+            <a:avLst/>
+          </a:prstGeom>
+        </p:spPr>
+        <p:style>
+          <a:lnRef idx="2">
+            <a:schemeClr val="accent1">
+              <a:shade val="50000"/>
+            </a:schemeClr>
+          </a:lnRef>
+          <a:fillRef idx="1">
+            <a:schemeClr val="accent1"/>
+          </a:fillRef>
+          <a:effectRef idx="0">
+            <a:schemeClr val="accent1"/>
+          </a:effectRef>
+          <a:fontRef idx="minor">
+            <a:schemeClr val="lt1"/>
+          </a:fontRef>
+        </p:style>
+        <p:txBody>
+          <a:bodyPr rtlCol="0" anchor="ctr"/>
+          <a:lstStyle/>
+          <a:p>
+            <a:pPr algn="ctr"/>
+            <a:r>
+              <a:rPr lang="en-US" dirty="0"/>
+              <a:t>Mobile</a:t>
+            </a:r>
+          </a:p>
+        </p:txBody>
+      </p:sp>
+      <p:sp>
+        <p:nvSpPr>
+          <p:cNvPr id="5" name="Rectangle: Rounded Corners 4">
+            <a:extLst>
+              <a:ext uri="{FF2B5EF4-FFF2-40B4-BE49-F238E27FC236}">
+                <a16:creationId xmlns:a16="http://schemas.microsoft.com/office/drawing/2014/main" id="{A81E8A88-9CA3-4F0F-9F5F-22C52FF97089}"/>
+              </a:ext>
+            </a:extLst>
+          </p:cNvPr>
+          <p:cNvSpPr/>
+          <p:nvPr/>
+        </p:nvSpPr>
+        <p:spPr>
+          <a:xfrm>
+            <a:off x="7591764" y="1464607"/>
+            <a:ext cx="1484243" cy="840821"/>
+          </a:xfrm>
+          <a:prstGeom prst="roundRect">
+            <a:avLst/>
+          </a:prstGeom>
+        </p:spPr>
+        <p:style>
+          <a:lnRef idx="2">
+            <a:schemeClr val="accent1">
+              <a:shade val="50000"/>
+            </a:schemeClr>
+          </a:lnRef>
+          <a:fillRef idx="1">
+            <a:schemeClr val="accent1"/>
+          </a:fillRef>
+          <a:effectRef idx="0">
+            <a:schemeClr val="accent1"/>
+          </a:effectRef>
+          <a:fontRef idx="minor">
+            <a:schemeClr val="lt1"/>
+          </a:fontRef>
+        </p:style>
+        <p:txBody>
+          <a:bodyPr rtlCol="0" anchor="ctr"/>
+          <a:lstStyle/>
+          <a:p>
+            <a:pPr algn="ctr"/>
+            <a:r>
+              <a:rPr lang="en-US" dirty="0" err="1"/>
+              <a:t>Ninjatrader</a:t>
+            </a:r>
+            <a:endParaRPr lang="en-US" dirty="0"/>
+          </a:p>
+          <a:p>
+            <a:pPr algn="ctr"/>
+            <a:r>
+              <a:rPr lang="en-US" dirty="0" err="1"/>
+              <a:t>FrontEnd</a:t>
+            </a:r>
+            <a:endParaRPr lang="en-US" dirty="0"/>
+          </a:p>
+        </p:txBody>
+      </p:sp>
+      <p:sp>
+        <p:nvSpPr>
+          <p:cNvPr id="6" name="Oval 5">
+            <a:extLst>
+              <a:ext uri="{FF2B5EF4-FFF2-40B4-BE49-F238E27FC236}">
+                <a16:creationId xmlns:a16="http://schemas.microsoft.com/office/drawing/2014/main" id="{E42F66E7-243B-469F-A2F2-C8217D84B28C}"/>
+              </a:ext>
+            </a:extLst>
+          </p:cNvPr>
+          <p:cNvSpPr/>
+          <p:nvPr/>
+        </p:nvSpPr>
+        <p:spPr>
+          <a:xfrm>
+            <a:off x="2001077" y="5050465"/>
+            <a:ext cx="1484243" cy="840822"/>
+          </a:xfrm>
+          <a:prstGeom prst="ellipse">
+            <a:avLst/>
+          </a:prstGeom>
+        </p:spPr>
+        <p:style>
+          <a:lnRef idx="2">
+            <a:schemeClr val="accent1">
+              <a:shade val="50000"/>
+            </a:schemeClr>
+          </a:lnRef>
+          <a:fillRef idx="1">
+            <a:schemeClr val="accent1"/>
+          </a:fillRef>
+          <a:effectRef idx="0">
+            <a:schemeClr val="accent1"/>
+          </a:effectRef>
+          <a:fontRef idx="minor">
+            <a:schemeClr val="lt1"/>
+          </a:fontRef>
+        </p:style>
+        <p:txBody>
+          <a:bodyPr rtlCol="0" anchor="ctr"/>
+          <a:lstStyle/>
+          <a:p>
+            <a:pPr algn="ctr"/>
+            <a:r>
+              <a:rPr lang="en-US" dirty="0"/>
+              <a:t>Web</a:t>
+            </a:r>
+          </a:p>
+        </p:txBody>
+      </p:sp>
+      <p:sp>
+        <p:nvSpPr>
+          <p:cNvPr id="7" name="Rectangle: Rounded Corners 6">
+            <a:extLst>
+              <a:ext uri="{FF2B5EF4-FFF2-40B4-BE49-F238E27FC236}">
+                <a16:creationId xmlns:a16="http://schemas.microsoft.com/office/drawing/2014/main" id="{C9730206-258F-417C-9DE7-2BBFCD1536F1}"/>
+              </a:ext>
+            </a:extLst>
+          </p:cNvPr>
+          <p:cNvSpPr/>
+          <p:nvPr/>
+        </p:nvSpPr>
+        <p:spPr>
+          <a:xfrm>
+            <a:off x="4822723" y="2962018"/>
+            <a:ext cx="1355237" cy="840822"/>
+          </a:xfrm>
+          <a:prstGeom prst="roundRect">
+            <a:avLst/>
+          </a:prstGeom>
+        </p:spPr>
+        <p:style>
+          <a:lnRef idx="2">
+            <a:schemeClr val="accent1">
+              <a:shade val="50000"/>
+            </a:schemeClr>
+          </a:lnRef>
+          <a:fillRef idx="1">
+            <a:schemeClr val="accent1"/>
+          </a:fillRef>
+          <a:effectRef idx="0">
+            <a:schemeClr val="accent1"/>
+          </a:effectRef>
+          <a:fontRef idx="minor">
+            <a:schemeClr val="lt1"/>
+          </a:fontRef>
+        </p:style>
+        <p:txBody>
+          <a:bodyPr rtlCol="0" anchor="ctr"/>
+          <a:lstStyle/>
+          <a:p>
+            <a:pPr algn="ctr"/>
+            <a:r>
+              <a:rPr lang="en-US" dirty="0" err="1"/>
+              <a:t>WebServer</a:t>
+            </a:r>
+            <a:endParaRPr lang="en-US" dirty="0"/>
+          </a:p>
+        </p:txBody>
+      </p:sp>
+      <p:cxnSp>
+        <p:nvCxnSpPr>
+          <p:cNvPr id="10" name="Straight Arrow Connector 9">
+            <a:extLst>
+              <a:ext uri="{FF2B5EF4-FFF2-40B4-BE49-F238E27FC236}">
+                <a16:creationId xmlns:a16="http://schemas.microsoft.com/office/drawing/2014/main" id="{5C8A4F31-9B89-46EB-9761-CBED9F389420}"/>
+              </a:ext>
+            </a:extLst>
+          </p:cNvPr>
+          <p:cNvCxnSpPr>
+            <a:cxnSpLocks/>
+            <a:stCxn id="4" idx="6"/>
+            <a:endCxn id="7" idx="1"/>
+          </p:cNvCxnSpPr>
+          <p:nvPr/>
+        </p:nvCxnSpPr>
+        <p:spPr>
+          <a:xfrm>
+            <a:off x="3458816" y="1626929"/>
+            <a:ext cx="1363907" cy="1755500"/>
+          </a:xfrm>
+          <a:prstGeom prst="straightConnector1">
+            <a:avLst/>
+          </a:prstGeom>
+          <a:ln>
+            <a:tailEnd type="triangle"/>
+          </a:ln>
+        </p:spPr>
+        <p:style>
+          <a:lnRef idx="1">
+            <a:schemeClr val="accent1"/>
+          </a:lnRef>
+          <a:fillRef idx="0">
+            <a:schemeClr val="accent1"/>
+          </a:fillRef>
+          <a:effectRef idx="0">
+            <a:schemeClr val="accent1"/>
+          </a:effectRef>
+          <a:fontRef idx="minor">
+            <a:schemeClr val="tx1"/>
+          </a:fontRef>
+        </p:style>
+      </p:cxnSp>
+      <p:cxnSp>
+        <p:nvCxnSpPr>
+          <p:cNvPr id="12" name="Straight Arrow Connector 11">
+            <a:extLst>
+              <a:ext uri="{FF2B5EF4-FFF2-40B4-BE49-F238E27FC236}">
+                <a16:creationId xmlns:a16="http://schemas.microsoft.com/office/drawing/2014/main" id="{1AE5DFBA-5E61-4BE0-81B5-0BEE2CE3185A}"/>
+              </a:ext>
+            </a:extLst>
+          </p:cNvPr>
+          <p:cNvCxnSpPr>
+            <a:cxnSpLocks/>
+            <a:stCxn id="6" idx="6"/>
+            <a:endCxn id="7" idx="1"/>
+          </p:cNvCxnSpPr>
+          <p:nvPr/>
+        </p:nvCxnSpPr>
+        <p:spPr>
+          <a:xfrm flipV="1">
+            <a:off x="3485320" y="3382429"/>
+            <a:ext cx="1337403" cy="2088447"/>
+          </a:xfrm>
+          <a:prstGeom prst="straightConnector1">
+            <a:avLst/>
+          </a:prstGeom>
+          <a:ln>
+            <a:tailEnd type="triangle"/>
+          </a:ln>
+        </p:spPr>
+        <p:style>
+          <a:lnRef idx="1">
+            <a:schemeClr val="accent1"/>
+          </a:lnRef>
+          <a:fillRef idx="0">
+            <a:schemeClr val="accent1"/>
+          </a:fillRef>
+          <a:effectRef idx="0">
+            <a:schemeClr val="accent1"/>
+          </a:effectRef>
+          <a:fontRef idx="minor">
+            <a:schemeClr val="tx1"/>
+          </a:fontRef>
+        </p:style>
+      </p:cxnSp>
+      <p:cxnSp>
+        <p:nvCxnSpPr>
+          <p:cNvPr id="18" name="Straight Arrow Connector 17">
+            <a:extLst>
+              <a:ext uri="{FF2B5EF4-FFF2-40B4-BE49-F238E27FC236}">
+                <a16:creationId xmlns:a16="http://schemas.microsoft.com/office/drawing/2014/main" id="{8BCDE0A5-4E96-4B9D-97E9-816A69035F02}"/>
+              </a:ext>
+            </a:extLst>
+          </p:cNvPr>
+          <p:cNvCxnSpPr>
+            <a:cxnSpLocks/>
+            <a:stCxn id="7" idx="3"/>
+            <a:endCxn id="5" idx="1"/>
+          </p:cNvCxnSpPr>
+          <p:nvPr/>
+        </p:nvCxnSpPr>
+        <p:spPr>
+          <a:xfrm flipV="1">
+            <a:off x="6177960" y="1885018"/>
+            <a:ext cx="1413804" cy="1497411"/>
+          </a:xfrm>
+          <a:prstGeom prst="straightConnector1">
+            <a:avLst/>
+          </a:prstGeom>
+          <a:ln>
+            <a:tailEnd type="triangle"/>
+          </a:ln>
+        </p:spPr>
+        <p:style>
+          <a:lnRef idx="1">
+            <a:schemeClr val="accent1"/>
+          </a:lnRef>
+          <a:fillRef idx="0">
+            <a:schemeClr val="accent1"/>
+          </a:fillRef>
+          <a:effectRef idx="0">
+            <a:schemeClr val="accent1"/>
+          </a:effectRef>
+          <a:fontRef idx="minor">
+            <a:schemeClr val="tx1"/>
+          </a:fontRef>
+        </p:style>
+      </p:cxnSp>
+      <p:sp>
+        <p:nvSpPr>
+          <p:cNvPr id="21" name="Oval 20">
+            <a:extLst>
+              <a:ext uri="{FF2B5EF4-FFF2-40B4-BE49-F238E27FC236}">
+                <a16:creationId xmlns:a16="http://schemas.microsoft.com/office/drawing/2014/main" id="{42EBCFD6-AB0F-4ECC-A167-63A897E724AD}"/>
+              </a:ext>
+            </a:extLst>
+          </p:cNvPr>
+          <p:cNvSpPr/>
+          <p:nvPr/>
+        </p:nvSpPr>
+        <p:spPr>
+          <a:xfrm>
+            <a:off x="10013392" y="1515831"/>
+            <a:ext cx="1364974" cy="746960"/>
+          </a:xfrm>
+          <a:prstGeom prst="ellipse">
+            <a:avLst/>
+          </a:prstGeom>
+        </p:spPr>
+        <p:style>
+          <a:lnRef idx="2">
+            <a:schemeClr val="accent1">
+              <a:shade val="50000"/>
+            </a:schemeClr>
+          </a:lnRef>
+          <a:fillRef idx="1">
+            <a:schemeClr val="accent1"/>
+          </a:fillRef>
+          <a:effectRef idx="0">
+            <a:schemeClr val="accent1"/>
+          </a:effectRef>
+          <a:fontRef idx="minor">
+            <a:schemeClr val="lt1"/>
+          </a:fontRef>
+        </p:style>
+        <p:txBody>
+          <a:bodyPr rtlCol="0" anchor="ctr"/>
+          <a:lstStyle/>
+          <a:p>
+            <a:pPr algn="ctr"/>
+            <a:r>
+              <a:rPr lang="en-US" dirty="0"/>
+              <a:t>User 1</a:t>
+            </a:r>
+          </a:p>
+        </p:txBody>
+      </p:sp>
+      <p:cxnSp>
+        <p:nvCxnSpPr>
+          <p:cNvPr id="25" name="Straight Arrow Connector 24">
+            <a:extLst>
+              <a:ext uri="{FF2B5EF4-FFF2-40B4-BE49-F238E27FC236}">
+                <a16:creationId xmlns:a16="http://schemas.microsoft.com/office/drawing/2014/main" id="{A44AFB2F-706C-477F-BF94-2B8A107EDD15}"/>
+              </a:ext>
+            </a:extLst>
+          </p:cNvPr>
+          <p:cNvCxnSpPr>
+            <a:cxnSpLocks/>
+            <a:stCxn id="21" idx="2"/>
+            <a:endCxn id="5" idx="3"/>
+          </p:cNvCxnSpPr>
+          <p:nvPr/>
+        </p:nvCxnSpPr>
+        <p:spPr>
+          <a:xfrm flipH="1" flipV="1">
+            <a:off x="9076007" y="1885018"/>
+            <a:ext cx="937385" cy="4293"/>
+          </a:xfrm>
+          <a:prstGeom prst="straightConnector1">
+            <a:avLst/>
+          </a:prstGeom>
+          <a:ln>
+            <a:headEnd type="triangle"/>
+            <a:tailEnd type="triangle"/>
+          </a:ln>
+        </p:spPr>
+        <p:style>
+          <a:lnRef idx="1">
+            <a:schemeClr val="accent1"/>
+          </a:lnRef>
+          <a:fillRef idx="0">
+            <a:schemeClr val="accent1"/>
+          </a:fillRef>
+          <a:effectRef idx="0">
+            <a:schemeClr val="accent1"/>
+          </a:effectRef>
+          <a:fontRef idx="minor">
+            <a:schemeClr val="tx1"/>
+          </a:fontRef>
+        </p:style>
+      </p:cxnSp>
+      <p:sp>
+        <p:nvSpPr>
+          <p:cNvPr id="24" name="Rectangle: Rounded Corners 23">
+            <a:extLst>
+              <a:ext uri="{FF2B5EF4-FFF2-40B4-BE49-F238E27FC236}">
+                <a16:creationId xmlns:a16="http://schemas.microsoft.com/office/drawing/2014/main" id="{5E22DE06-B620-438A-8B8E-67EA92684307}"/>
+              </a:ext>
+            </a:extLst>
+          </p:cNvPr>
+          <p:cNvSpPr/>
+          <p:nvPr/>
+        </p:nvSpPr>
+        <p:spPr>
+          <a:xfrm>
+            <a:off x="7631515" y="3009685"/>
+            <a:ext cx="1484243" cy="840821"/>
+          </a:xfrm>
+          <a:prstGeom prst="roundRect">
+            <a:avLst/>
+          </a:prstGeom>
+        </p:spPr>
+        <p:style>
+          <a:lnRef idx="2">
+            <a:schemeClr val="accent1">
+              <a:shade val="50000"/>
+            </a:schemeClr>
+          </a:lnRef>
+          <a:fillRef idx="1">
+            <a:schemeClr val="accent1"/>
+          </a:fillRef>
+          <a:effectRef idx="0">
+            <a:schemeClr val="accent1"/>
+          </a:effectRef>
+          <a:fontRef idx="minor">
+            <a:schemeClr val="lt1"/>
+          </a:fontRef>
+        </p:style>
+        <p:txBody>
+          <a:bodyPr rtlCol="0" anchor="ctr"/>
+          <a:lstStyle/>
+          <a:p>
+            <a:pPr algn="ctr"/>
+            <a:r>
+              <a:rPr lang="en-US" dirty="0" err="1"/>
+              <a:t>Ninjatrader</a:t>
+            </a:r>
+            <a:endParaRPr lang="en-US" dirty="0"/>
+          </a:p>
+          <a:p>
+            <a:pPr algn="ctr"/>
+            <a:r>
+              <a:rPr lang="en-US" dirty="0" err="1"/>
+              <a:t>FrontEnd</a:t>
+            </a:r>
+            <a:endParaRPr lang="en-US" dirty="0"/>
+          </a:p>
+        </p:txBody>
+      </p:sp>
+      <p:cxnSp>
+        <p:nvCxnSpPr>
+          <p:cNvPr id="26" name="Straight Arrow Connector 25">
+            <a:extLst>
+              <a:ext uri="{FF2B5EF4-FFF2-40B4-BE49-F238E27FC236}">
+                <a16:creationId xmlns:a16="http://schemas.microsoft.com/office/drawing/2014/main" id="{1D0DD93E-E054-478B-BA5F-A09E748AB1D7}"/>
+              </a:ext>
+            </a:extLst>
+          </p:cNvPr>
+          <p:cNvCxnSpPr>
+            <a:cxnSpLocks/>
+            <a:stCxn id="7" idx="3"/>
+            <a:endCxn id="24" idx="1"/>
+          </p:cNvCxnSpPr>
+          <p:nvPr/>
+        </p:nvCxnSpPr>
+        <p:spPr>
+          <a:xfrm>
+            <a:off x="6177960" y="3382429"/>
+            <a:ext cx="1453555" cy="47667"/>
+          </a:xfrm>
+          <a:prstGeom prst="straightConnector1">
+            <a:avLst/>
+          </a:prstGeom>
+          <a:ln>
+            <a:tailEnd type="triangle"/>
+          </a:ln>
+        </p:spPr>
+        <p:style>
+          <a:lnRef idx="1">
+            <a:schemeClr val="accent1"/>
+          </a:lnRef>
+          <a:fillRef idx="0">
+            <a:schemeClr val="accent1"/>
+          </a:fillRef>
+          <a:effectRef idx="0">
+            <a:schemeClr val="accent1"/>
+          </a:effectRef>
+          <a:fontRef idx="minor">
+            <a:schemeClr val="tx1"/>
+          </a:fontRef>
+        </p:style>
+      </p:cxnSp>
+      <p:sp>
+        <p:nvSpPr>
+          <p:cNvPr id="27" name="Oval 26">
+            <a:extLst>
+              <a:ext uri="{FF2B5EF4-FFF2-40B4-BE49-F238E27FC236}">
+                <a16:creationId xmlns:a16="http://schemas.microsoft.com/office/drawing/2014/main" id="{265BE071-CF1E-485D-9E1D-D544DA75F59F}"/>
+              </a:ext>
+            </a:extLst>
+          </p:cNvPr>
+          <p:cNvSpPr/>
+          <p:nvPr/>
+        </p:nvSpPr>
+        <p:spPr>
+          <a:xfrm>
+            <a:off x="10064060" y="3075673"/>
+            <a:ext cx="1364974" cy="746960"/>
+          </a:xfrm>
+          <a:prstGeom prst="ellipse">
+            <a:avLst/>
+          </a:prstGeom>
+        </p:spPr>
+        <p:style>
+          <a:lnRef idx="2">
+            <a:schemeClr val="accent1">
+              <a:shade val="50000"/>
+            </a:schemeClr>
+          </a:lnRef>
+          <a:fillRef idx="1">
+            <a:schemeClr val="accent1"/>
+          </a:fillRef>
+          <a:effectRef idx="0">
+            <a:schemeClr val="accent1"/>
+          </a:effectRef>
+          <a:fontRef idx="minor">
+            <a:schemeClr val="lt1"/>
+          </a:fontRef>
+        </p:style>
+        <p:txBody>
+          <a:bodyPr rtlCol="0" anchor="ctr"/>
+          <a:lstStyle/>
+          <a:p>
+            <a:pPr algn="ctr"/>
+            <a:r>
+              <a:rPr lang="en-US" dirty="0"/>
+              <a:t>User 2</a:t>
+            </a:r>
+          </a:p>
+        </p:txBody>
+      </p:sp>
+      <p:sp>
+        <p:nvSpPr>
+          <p:cNvPr id="28" name="Rectangle: Rounded Corners 27">
+            <a:extLst>
+              <a:ext uri="{FF2B5EF4-FFF2-40B4-BE49-F238E27FC236}">
+                <a16:creationId xmlns:a16="http://schemas.microsoft.com/office/drawing/2014/main" id="{90B09BA0-2F84-45BF-8283-A945C381DD3A}"/>
+              </a:ext>
+            </a:extLst>
+          </p:cNvPr>
+          <p:cNvSpPr/>
+          <p:nvPr/>
+        </p:nvSpPr>
+        <p:spPr>
+          <a:xfrm>
+            <a:off x="7647215" y="4683749"/>
+            <a:ext cx="1484243" cy="840821"/>
+          </a:xfrm>
+          <a:prstGeom prst="roundRect">
+            <a:avLst/>
+          </a:prstGeom>
+        </p:spPr>
+        <p:style>
+          <a:lnRef idx="2">
+            <a:schemeClr val="accent1">
+              <a:shade val="50000"/>
+            </a:schemeClr>
+          </a:lnRef>
+          <a:fillRef idx="1">
+            <a:schemeClr val="accent1"/>
+          </a:fillRef>
+          <a:effectRef idx="0">
+            <a:schemeClr val="accent1"/>
+          </a:effectRef>
+          <a:fontRef idx="minor">
+            <a:schemeClr val="lt1"/>
+          </a:fontRef>
+        </p:style>
+        <p:txBody>
+          <a:bodyPr rtlCol="0" anchor="ctr"/>
+          <a:lstStyle/>
+          <a:p>
+            <a:pPr algn="ctr"/>
+            <a:r>
+              <a:rPr lang="en-US" dirty="0" err="1"/>
+              <a:t>Ninjatrader</a:t>
+            </a:r>
+            <a:r>
+              <a:rPr lang="en-US" dirty="0"/>
+              <a:t> </a:t>
+            </a:r>
+            <a:r>
+              <a:rPr lang="en-US" dirty="0" err="1"/>
+              <a:t>FrontEnd</a:t>
+            </a:r>
+            <a:endParaRPr lang="en-US" dirty="0"/>
+          </a:p>
+        </p:txBody>
+      </p:sp>
+      <p:cxnSp>
+        <p:nvCxnSpPr>
+          <p:cNvPr id="29" name="Straight Arrow Connector 28">
+            <a:extLst>
+              <a:ext uri="{FF2B5EF4-FFF2-40B4-BE49-F238E27FC236}">
+                <a16:creationId xmlns:a16="http://schemas.microsoft.com/office/drawing/2014/main" id="{02E3CF65-4E09-4268-A861-33DAB9FF7CDD}"/>
+              </a:ext>
+            </a:extLst>
+          </p:cNvPr>
+          <p:cNvCxnSpPr>
+            <a:cxnSpLocks/>
+            <a:stCxn id="7" idx="3"/>
+            <a:endCxn id="28" idx="1"/>
+          </p:cNvCxnSpPr>
+          <p:nvPr/>
+        </p:nvCxnSpPr>
+        <p:spPr>
+          <a:xfrm>
+            <a:off x="6177960" y="3382429"/>
+            <a:ext cx="1469255" cy="1721731"/>
+          </a:xfrm>
+          <a:prstGeom prst="straightConnector1">
+            <a:avLst/>
+          </a:prstGeom>
+          <a:ln>
+            <a:tailEnd type="triangle"/>
+          </a:ln>
+        </p:spPr>
+        <p:style>
+          <a:lnRef idx="1">
+            <a:schemeClr val="accent1"/>
+          </a:lnRef>
+          <a:fillRef idx="0">
+            <a:schemeClr val="accent1"/>
+          </a:fillRef>
+          <a:effectRef idx="0">
+            <a:schemeClr val="accent1"/>
+          </a:effectRef>
+          <a:fontRef idx="minor">
+            <a:schemeClr val="tx1"/>
+          </a:fontRef>
+        </p:style>
+      </p:cxnSp>
+      <p:sp>
+        <p:nvSpPr>
+          <p:cNvPr id="30" name="Oval 29">
+            <a:extLst>
+              <a:ext uri="{FF2B5EF4-FFF2-40B4-BE49-F238E27FC236}">
+                <a16:creationId xmlns:a16="http://schemas.microsoft.com/office/drawing/2014/main" id="{BAD64714-28CA-4D6F-BC1B-12CA9EAEBFBF}"/>
+              </a:ext>
+            </a:extLst>
+          </p:cNvPr>
+          <p:cNvSpPr/>
+          <p:nvPr/>
+        </p:nvSpPr>
+        <p:spPr>
+          <a:xfrm>
+            <a:off x="10148462" y="4749737"/>
+            <a:ext cx="1364974" cy="746960"/>
+          </a:xfrm>
+          <a:prstGeom prst="ellipse">
+            <a:avLst/>
+          </a:prstGeom>
+        </p:spPr>
+        <p:style>
+          <a:lnRef idx="2">
+            <a:schemeClr val="accent1">
+              <a:shade val="50000"/>
+            </a:schemeClr>
+          </a:lnRef>
+          <a:fillRef idx="1">
+            <a:schemeClr val="accent1"/>
+          </a:fillRef>
+          <a:effectRef idx="0">
+            <a:schemeClr val="accent1"/>
+          </a:effectRef>
+          <a:fontRef idx="minor">
+            <a:schemeClr val="lt1"/>
+          </a:fontRef>
+        </p:style>
+        <p:txBody>
+          <a:bodyPr rtlCol="0" anchor="ctr"/>
+          <a:lstStyle/>
+          <a:p>
+            <a:pPr algn="ctr"/>
+            <a:r>
+              <a:rPr lang="en-US" dirty="0"/>
+              <a:t>User 3</a:t>
+            </a:r>
+          </a:p>
+        </p:txBody>
+      </p:sp>
+      <p:cxnSp>
+        <p:nvCxnSpPr>
+          <p:cNvPr id="31" name="Straight Arrow Connector 30">
+            <a:extLst>
+              <a:ext uri="{FF2B5EF4-FFF2-40B4-BE49-F238E27FC236}">
+                <a16:creationId xmlns:a16="http://schemas.microsoft.com/office/drawing/2014/main" id="{9ADBD6CF-1D46-47F8-9230-F8DD4094A04F}"/>
+              </a:ext>
+            </a:extLst>
+          </p:cNvPr>
+          <p:cNvCxnSpPr>
+            <a:cxnSpLocks/>
+            <a:stCxn id="30" idx="2"/>
+            <a:endCxn id="28" idx="3"/>
+          </p:cNvCxnSpPr>
+          <p:nvPr/>
+        </p:nvCxnSpPr>
+        <p:spPr>
+          <a:xfrm flipH="1" flipV="1">
+            <a:off x="9131458" y="5104160"/>
+            <a:ext cx="1017004" cy="19057"/>
+          </a:xfrm>
+          <a:prstGeom prst="straightConnector1">
+            <a:avLst/>
+          </a:prstGeom>
+          <a:ln>
+            <a:headEnd type="triangle"/>
+            <a:tailEnd type="triangle"/>
+          </a:ln>
+        </p:spPr>
+        <p:style>
+          <a:lnRef idx="1">
+            <a:schemeClr val="accent1"/>
+          </a:lnRef>
+          <a:fillRef idx="0">
+            <a:schemeClr val="accent1"/>
+          </a:fillRef>
+          <a:effectRef idx="0">
+            <a:schemeClr val="accent1"/>
+          </a:effectRef>
+          <a:fontRef idx="minor">
+            <a:schemeClr val="tx1"/>
+          </a:fontRef>
+        </p:style>
+      </p:cxnSp>
+      <p:cxnSp>
+        <p:nvCxnSpPr>
+          <p:cNvPr id="33" name="Straight Arrow Connector 32">
+            <a:extLst>
+              <a:ext uri="{FF2B5EF4-FFF2-40B4-BE49-F238E27FC236}">
+                <a16:creationId xmlns:a16="http://schemas.microsoft.com/office/drawing/2014/main" id="{D9186CC4-C6B4-4206-BAA9-1FEAA38FE754}"/>
+              </a:ext>
+            </a:extLst>
+          </p:cNvPr>
+          <p:cNvCxnSpPr>
+            <a:cxnSpLocks/>
+            <a:stCxn id="27" idx="2"/>
+            <a:endCxn id="24" idx="3"/>
+          </p:cNvCxnSpPr>
+          <p:nvPr/>
+        </p:nvCxnSpPr>
+        <p:spPr>
+          <a:xfrm flipH="1" flipV="1">
+            <a:off x="9115758" y="3430096"/>
+            <a:ext cx="948302" cy="19057"/>
+          </a:xfrm>
+          <a:prstGeom prst="straightConnector1">
+            <a:avLst/>
+          </a:prstGeom>
+          <a:ln>
+            <a:headEnd type="triangle"/>
+            <a:tailEnd type="triangle"/>
+          </a:ln>
+        </p:spPr>
+        <p:style>
+          <a:lnRef idx="1">
+            <a:schemeClr val="accent1"/>
+          </a:lnRef>
+          <a:fillRef idx="0">
+            <a:schemeClr val="accent1"/>
+          </a:fillRef>
+          <a:effectRef idx="0">
+            <a:schemeClr val="accent1"/>
+          </a:effectRef>
+          <a:fontRef idx="minor">
+            <a:schemeClr val="tx1"/>
+          </a:fontRef>
+        </p:style>
+      </p:cxnSp>
+      <p:pic>
+        <p:nvPicPr>
+          <p:cNvPr id="14" name="Picture 13">
+            <a:extLst>
+              <a:ext uri="{FF2B5EF4-FFF2-40B4-BE49-F238E27FC236}">
+                <a16:creationId xmlns:a16="http://schemas.microsoft.com/office/drawing/2014/main" id="{AF0930E3-E7D9-4F78-88C0-A7A20C4B4B83}"/>
+              </a:ext>
+            </a:extLst>
+          </p:cNvPr>
+          <p:cNvPicPr>
+            <a:picLocks noChangeAspect="1"/>
+          </p:cNvPicPr>
+          <p:nvPr/>
+        </p:nvPicPr>
+        <p:blipFill>
+          <a:blip r:embed="rId2"/>
+          <a:stretch>
+            <a:fillRect/>
+          </a:stretch>
+        </p:blipFill>
+        <p:spPr>
+          <a:xfrm>
+            <a:off x="420018" y="2840439"/>
+            <a:ext cx="685896" cy="1047896"/>
+          </a:xfrm>
+          <a:prstGeom prst="rect">
+            <a:avLst/>
+          </a:prstGeom>
+        </p:spPr>
+      </p:pic>
+      <p:cxnSp>
+        <p:nvCxnSpPr>
+          <p:cNvPr id="16" name="Straight Arrow Connector 15">
+            <a:extLst>
+              <a:ext uri="{FF2B5EF4-FFF2-40B4-BE49-F238E27FC236}">
+                <a16:creationId xmlns:a16="http://schemas.microsoft.com/office/drawing/2014/main" id="{33DA835A-4965-44D4-A9DF-3F1A05480CF6}"/>
+              </a:ext>
+            </a:extLst>
+          </p:cNvPr>
+          <p:cNvCxnSpPr>
+            <a:stCxn id="14" idx="3"/>
+            <a:endCxn id="4" idx="2"/>
+          </p:cNvCxnSpPr>
+          <p:nvPr/>
+        </p:nvCxnSpPr>
+        <p:spPr>
+          <a:xfrm flipV="1">
+            <a:off x="1105914" y="1626929"/>
+            <a:ext cx="868659" cy="1737458"/>
+          </a:xfrm>
+          <a:prstGeom prst="straightConnector1">
+            <a:avLst/>
+          </a:prstGeom>
+          <a:ln>
+            <a:tailEnd type="triangle"/>
+          </a:ln>
+        </p:spPr>
+        <p:style>
+          <a:lnRef idx="1">
+            <a:schemeClr val="accent1"/>
+          </a:lnRef>
+          <a:fillRef idx="0">
+            <a:schemeClr val="accent1"/>
+          </a:fillRef>
+          <a:effectRef idx="0">
+            <a:schemeClr val="accent1"/>
+          </a:effectRef>
+          <a:fontRef idx="minor">
+            <a:schemeClr val="tx1"/>
+          </a:fontRef>
+        </p:style>
+      </p:cxnSp>
+      <p:cxnSp>
+        <p:nvCxnSpPr>
+          <p:cNvPr id="19" name="Straight Arrow Connector 18">
+            <a:extLst>
+              <a:ext uri="{FF2B5EF4-FFF2-40B4-BE49-F238E27FC236}">
+                <a16:creationId xmlns:a16="http://schemas.microsoft.com/office/drawing/2014/main" id="{B01F9E38-439D-4396-B034-F24554F5B48A}"/>
+              </a:ext>
+            </a:extLst>
+          </p:cNvPr>
+          <p:cNvCxnSpPr>
+            <a:stCxn id="14" idx="3"/>
+            <a:endCxn id="6" idx="2"/>
+          </p:cNvCxnSpPr>
+          <p:nvPr/>
+        </p:nvCxnSpPr>
+        <p:spPr>
+          <a:xfrm>
+            <a:off x="1105914" y="3364387"/>
+            <a:ext cx="895163" cy="2106489"/>
+          </a:xfrm>
+          <a:prstGeom prst="straightConnector1">
+            <a:avLst/>
+          </a:prstGeom>
+          <a:ln>
+            <a:tailEnd type="triangle"/>
+          </a:ln>
+        </p:spPr>
+        <p:style>
+          <a:lnRef idx="1">
+            <a:schemeClr val="accent1"/>
+          </a:lnRef>
+          <a:fillRef idx="0">
+            <a:schemeClr val="accent1"/>
+          </a:fillRef>
+          <a:effectRef idx="0">
+            <a:schemeClr val="accent1"/>
+          </a:effectRef>
+          <a:fontRef idx="minor">
+            <a:schemeClr val="tx1"/>
+          </a:fontRef>
+        </p:style>
+      </p:cxnSp>
+      <p:cxnSp>
+        <p:nvCxnSpPr>
+          <p:cNvPr id="22" name="Straight Connector 21">
+            <a:extLst>
+              <a:ext uri="{FF2B5EF4-FFF2-40B4-BE49-F238E27FC236}">
+                <a16:creationId xmlns:a16="http://schemas.microsoft.com/office/drawing/2014/main" id="{EDB079D9-F011-4EC1-A6B9-F5CC242C53B1}"/>
+              </a:ext>
+            </a:extLst>
+          </p:cNvPr>
+          <p:cNvCxnSpPr>
+            <a:cxnSpLocks/>
+          </p:cNvCxnSpPr>
+          <p:nvPr/>
+        </p:nvCxnSpPr>
+        <p:spPr>
+          <a:xfrm>
+            <a:off x="8388626" y="5866228"/>
+            <a:ext cx="1" cy="706850"/>
+          </a:xfrm>
+          <a:prstGeom prst="line">
+            <a:avLst/>
+          </a:prstGeom>
+          <a:ln w="50800">
+            <a:solidFill>
+              <a:srgbClr val="7030A0"/>
+            </a:solidFill>
+            <a:prstDash val="sysDot"/>
+          </a:ln>
+        </p:spPr>
+        <p:style>
+          <a:lnRef idx="1">
+            <a:schemeClr val="accent1"/>
+          </a:lnRef>
+          <a:fillRef idx="0">
+            <a:schemeClr val="accent1"/>
+          </a:fillRef>
+          <a:effectRef idx="0">
+            <a:schemeClr val="accent1"/>
+          </a:effectRef>
+          <a:fontRef idx="minor">
+            <a:schemeClr val="tx1"/>
+          </a:fontRef>
+        </p:style>
+      </p:cxnSp>
+      <p:cxnSp>
+        <p:nvCxnSpPr>
+          <p:cNvPr id="34" name="Straight Connector 33">
+            <a:extLst>
+              <a:ext uri="{FF2B5EF4-FFF2-40B4-BE49-F238E27FC236}">
+                <a16:creationId xmlns:a16="http://schemas.microsoft.com/office/drawing/2014/main" id="{BD45F8FF-6513-4183-B09C-11AE00B3D8F4}"/>
+              </a:ext>
+            </a:extLst>
+          </p:cNvPr>
+          <p:cNvCxnSpPr>
+            <a:cxnSpLocks/>
+          </p:cNvCxnSpPr>
+          <p:nvPr/>
+        </p:nvCxnSpPr>
+        <p:spPr>
+          <a:xfrm>
+            <a:off x="10887220" y="5842296"/>
+            <a:ext cx="1" cy="706850"/>
+          </a:xfrm>
+          <a:prstGeom prst="line">
+            <a:avLst/>
+          </a:prstGeom>
+          <a:ln w="50800">
+            <a:solidFill>
+              <a:srgbClr val="7030A0"/>
+            </a:solidFill>
+            <a:prstDash val="sysDot"/>
+          </a:ln>
+        </p:spPr>
+        <p:style>
+          <a:lnRef idx="1">
+            <a:schemeClr val="accent1"/>
+          </a:lnRef>
+          <a:fillRef idx="0">
+            <a:schemeClr val="accent1"/>
+          </a:fillRef>
+          <a:effectRef idx="0">
+            <a:schemeClr val="accent1"/>
+          </a:effectRef>
+          <a:fontRef idx="minor">
+            <a:schemeClr val="tx1"/>
+          </a:fontRef>
+        </p:style>
+      </p:cxnSp>
+      <p:sp>
+        <p:nvSpPr>
+          <p:cNvPr id="32" name="TextBox 31">
+            <a:extLst>
+              <a:ext uri="{FF2B5EF4-FFF2-40B4-BE49-F238E27FC236}">
+                <a16:creationId xmlns:a16="http://schemas.microsoft.com/office/drawing/2014/main" id="{158BB948-593D-4D2B-89F5-32054322E7D1}"/>
+              </a:ext>
+            </a:extLst>
+          </p:cNvPr>
+          <p:cNvSpPr txBox="1"/>
+          <p:nvPr/>
+        </p:nvSpPr>
+        <p:spPr>
+          <a:xfrm>
+            <a:off x="6159916" y="2076366"/>
+            <a:ext cx="1234901" cy="369332"/>
+          </a:xfrm>
+          <a:prstGeom prst="rect">
+            <a:avLst/>
+          </a:prstGeom>
+          <a:noFill/>
+        </p:spPr>
+        <p:txBody>
+          <a:bodyPr wrap="square" rtlCol="0">
+            <a:spAutoFit/>
+          </a:bodyPr>
+          <a:lstStyle/>
+          <a:p>
+            <a:r>
+              <a:rPr lang="en-US" dirty="0"/>
+              <a:t>Subscribe</a:t>
+            </a:r>
+          </a:p>
+        </p:txBody>
+      </p:sp>
+      <p:sp>
+        <p:nvSpPr>
+          <p:cNvPr id="35" name="TextBox 34">
+            <a:extLst>
+              <a:ext uri="{FF2B5EF4-FFF2-40B4-BE49-F238E27FC236}">
+                <a16:creationId xmlns:a16="http://schemas.microsoft.com/office/drawing/2014/main" id="{E8733423-E203-4D5F-AB48-F3E626CCC81E}"/>
+              </a:ext>
+            </a:extLst>
+          </p:cNvPr>
+          <p:cNvSpPr txBox="1"/>
+          <p:nvPr/>
+        </p:nvSpPr>
+        <p:spPr>
+          <a:xfrm>
+            <a:off x="6442904" y="3103575"/>
+            <a:ext cx="1234901" cy="369332"/>
+          </a:xfrm>
+          <a:prstGeom prst="rect">
+            <a:avLst/>
+          </a:prstGeom>
+          <a:noFill/>
+        </p:spPr>
+        <p:txBody>
+          <a:bodyPr wrap="square" rtlCol="0">
+            <a:spAutoFit/>
+          </a:bodyPr>
+          <a:lstStyle/>
+          <a:p>
+            <a:r>
+              <a:rPr lang="en-US" dirty="0"/>
+              <a:t>Subscribe</a:t>
+            </a:r>
+          </a:p>
+        </p:txBody>
+      </p:sp>
+      <p:sp>
+        <p:nvSpPr>
+          <p:cNvPr id="36" name="TextBox 35">
+            <a:extLst>
+              <a:ext uri="{FF2B5EF4-FFF2-40B4-BE49-F238E27FC236}">
+                <a16:creationId xmlns:a16="http://schemas.microsoft.com/office/drawing/2014/main" id="{AD91650E-0A1B-43AC-ABF1-D7E3AF982AE2}"/>
+              </a:ext>
+            </a:extLst>
+          </p:cNvPr>
+          <p:cNvSpPr txBox="1"/>
+          <p:nvPr/>
+        </p:nvSpPr>
+        <p:spPr>
+          <a:xfrm>
+            <a:off x="6196943" y="4406425"/>
+            <a:ext cx="1234901" cy="369332"/>
+          </a:xfrm>
+          <a:prstGeom prst="rect">
+            <a:avLst/>
+          </a:prstGeom>
+          <a:noFill/>
+        </p:spPr>
+        <p:txBody>
+          <a:bodyPr wrap="square" rtlCol="0">
+            <a:spAutoFit/>
+          </a:bodyPr>
+          <a:lstStyle/>
+          <a:p>
+            <a:r>
+              <a:rPr lang="en-US" dirty="0"/>
+              <a:t>Subscribe</a:t>
+            </a:r>
+          </a:p>
+        </p:txBody>
+      </p:sp>
+      <p:sp>
+        <p:nvSpPr>
+          <p:cNvPr id="37" name="Rectangle: Rounded Corners 36">
+            <a:extLst>
+              <a:ext uri="{FF2B5EF4-FFF2-40B4-BE49-F238E27FC236}">
+                <a16:creationId xmlns:a16="http://schemas.microsoft.com/office/drawing/2014/main" id="{B198FAFA-03CC-4AB5-96FD-B487E8D8051E}"/>
+              </a:ext>
+            </a:extLst>
+          </p:cNvPr>
+          <p:cNvSpPr/>
+          <p:nvPr/>
+        </p:nvSpPr>
+        <p:spPr>
+          <a:xfrm>
+            <a:off x="2056143" y="2950236"/>
+            <a:ext cx="1355237" cy="840822"/>
+          </a:xfrm>
+          <a:prstGeom prst="roundRect">
+            <a:avLst/>
+          </a:prstGeom>
+        </p:spPr>
+        <p:style>
+          <a:lnRef idx="2">
+            <a:schemeClr val="accent1">
+              <a:shade val="50000"/>
+            </a:schemeClr>
+          </a:lnRef>
+          <a:fillRef idx="1">
+            <a:schemeClr val="accent1"/>
+          </a:fillRef>
+          <a:effectRef idx="0">
+            <a:schemeClr val="accent1"/>
+          </a:effectRef>
+          <a:fontRef idx="minor">
+            <a:schemeClr val="lt1"/>
+          </a:fontRef>
+        </p:style>
+        <p:txBody>
+          <a:bodyPr rtlCol="0" anchor="ctr"/>
+          <a:lstStyle/>
+          <a:p>
+            <a:pPr algn="ctr"/>
+            <a:r>
+              <a:rPr lang="en-US" dirty="0" err="1"/>
+              <a:t>Ninjatrader</a:t>
+            </a:r>
+            <a:r>
+              <a:rPr lang="en-US" dirty="0"/>
+              <a:t>/AI Backend</a:t>
+            </a:r>
+          </a:p>
+        </p:txBody>
+      </p:sp>
+      <p:cxnSp>
+        <p:nvCxnSpPr>
+          <p:cNvPr id="39" name="Straight Arrow Connector 38">
+            <a:extLst>
+              <a:ext uri="{FF2B5EF4-FFF2-40B4-BE49-F238E27FC236}">
+                <a16:creationId xmlns:a16="http://schemas.microsoft.com/office/drawing/2014/main" id="{CB4E1E40-6459-430C-BC38-33AD1FCA2E82}"/>
+              </a:ext>
+            </a:extLst>
+          </p:cNvPr>
+          <p:cNvCxnSpPr>
+            <a:cxnSpLocks/>
+            <a:stCxn id="4" idx="4"/>
+            <a:endCxn id="37" idx="0"/>
+          </p:cNvCxnSpPr>
+          <p:nvPr/>
+        </p:nvCxnSpPr>
+        <p:spPr>
+          <a:xfrm>
+            <a:off x="2716695" y="2047340"/>
+            <a:ext cx="17067" cy="902896"/>
+          </a:xfrm>
+          <a:prstGeom prst="straightConnector1">
+            <a:avLst/>
+          </a:prstGeom>
+          <a:ln>
+            <a:tailEnd type="triangle"/>
+          </a:ln>
+        </p:spPr>
+        <p:style>
+          <a:lnRef idx="1">
+            <a:schemeClr val="accent1"/>
+          </a:lnRef>
+          <a:fillRef idx="0">
+            <a:schemeClr val="accent1"/>
+          </a:fillRef>
+          <a:effectRef idx="0">
+            <a:schemeClr val="accent1"/>
+          </a:effectRef>
+          <a:fontRef idx="minor">
+            <a:schemeClr val="tx1"/>
+          </a:fontRef>
+        </p:style>
+      </p:cxnSp>
+      <p:cxnSp>
+        <p:nvCxnSpPr>
+          <p:cNvPr id="40" name="Straight Arrow Connector 39">
+            <a:extLst>
+              <a:ext uri="{FF2B5EF4-FFF2-40B4-BE49-F238E27FC236}">
+                <a16:creationId xmlns:a16="http://schemas.microsoft.com/office/drawing/2014/main" id="{AC343D64-6E76-457F-8435-83901DC75466}"/>
+              </a:ext>
+            </a:extLst>
+          </p:cNvPr>
+          <p:cNvCxnSpPr>
+            <a:cxnSpLocks/>
+            <a:stCxn id="37" idx="3"/>
+            <a:endCxn id="7" idx="1"/>
+          </p:cNvCxnSpPr>
+          <p:nvPr/>
+        </p:nvCxnSpPr>
+        <p:spPr>
+          <a:xfrm>
+            <a:off x="3411380" y="3370647"/>
+            <a:ext cx="1411343" cy="11782"/>
+          </a:xfrm>
+          <a:prstGeom prst="straightConnector1">
+            <a:avLst/>
+          </a:prstGeom>
+          <a:ln>
+            <a:tailEnd type="triangle"/>
+          </a:ln>
+        </p:spPr>
+        <p:style>
+          <a:lnRef idx="1">
+            <a:schemeClr val="accent1"/>
+          </a:lnRef>
+          <a:fillRef idx="0">
+            <a:schemeClr val="accent1"/>
+          </a:fillRef>
+          <a:effectRef idx="0">
+            <a:schemeClr val="accent1"/>
+          </a:effectRef>
+          <a:fontRef idx="minor">
+            <a:schemeClr val="tx1"/>
+          </a:fontRef>
+        </p:style>
+      </p:cxnSp>
+      <p:cxnSp>
+        <p:nvCxnSpPr>
+          <p:cNvPr id="41" name="Straight Arrow Connector 40">
+            <a:extLst>
+              <a:ext uri="{FF2B5EF4-FFF2-40B4-BE49-F238E27FC236}">
+                <a16:creationId xmlns:a16="http://schemas.microsoft.com/office/drawing/2014/main" id="{0092277F-DC26-403C-B349-F9632656F132}"/>
+              </a:ext>
+            </a:extLst>
+          </p:cNvPr>
+          <p:cNvCxnSpPr>
+            <a:cxnSpLocks/>
+            <a:stCxn id="6" idx="0"/>
+            <a:endCxn id="37" idx="2"/>
+          </p:cNvCxnSpPr>
+          <p:nvPr/>
+        </p:nvCxnSpPr>
+        <p:spPr>
+          <a:xfrm flipH="1" flipV="1">
+            <a:off x="2733762" y="3791058"/>
+            <a:ext cx="9437" cy="1259407"/>
+          </a:xfrm>
+          <a:prstGeom prst="straightConnector1">
+            <a:avLst/>
+          </a:prstGeom>
+          <a:ln>
+            <a:tailEnd type="triangle"/>
+          </a:ln>
+        </p:spPr>
+        <p:style>
+          <a:lnRef idx="1">
+            <a:schemeClr val="accent1"/>
+          </a:lnRef>
+          <a:fillRef idx="0">
+            <a:schemeClr val="accent1"/>
+          </a:fillRef>
+          <a:effectRef idx="0">
+            <a:schemeClr val="accent1"/>
+          </a:effectRef>
+          <a:fontRef idx="minor">
+            <a:schemeClr val="tx1"/>
+          </a:fontRef>
+        </p:style>
+      </p:cxnSp>
+      <p:cxnSp>
+        <p:nvCxnSpPr>
+          <p:cNvPr id="45" name="Straight Arrow Connector 44">
+            <a:extLst>
+              <a:ext uri="{FF2B5EF4-FFF2-40B4-BE49-F238E27FC236}">
+                <a16:creationId xmlns:a16="http://schemas.microsoft.com/office/drawing/2014/main" id="{58015FC3-2488-4E23-A865-73E8A8EEA940}"/>
+              </a:ext>
+            </a:extLst>
+          </p:cNvPr>
+          <p:cNvCxnSpPr>
+            <a:cxnSpLocks/>
+            <a:stCxn id="14" idx="3"/>
+            <a:endCxn id="37" idx="1"/>
+          </p:cNvCxnSpPr>
+          <p:nvPr/>
+        </p:nvCxnSpPr>
+        <p:spPr>
+          <a:xfrm>
+            <a:off x="1105914" y="3364387"/>
+            <a:ext cx="950229" cy="6260"/>
+          </a:xfrm>
+          <a:prstGeom prst="straightConnector1">
+            <a:avLst/>
+          </a:prstGeom>
+          <a:ln>
+            <a:tailEnd type="triangle"/>
+          </a:ln>
+        </p:spPr>
+        <p:style>
+          <a:lnRef idx="1">
+            <a:schemeClr val="accent1"/>
+          </a:lnRef>
+          <a:fillRef idx="0">
+            <a:schemeClr val="accent1"/>
+          </a:fillRef>
+          <a:effectRef idx="0">
+            <a:schemeClr val="accent1"/>
+          </a:effectRef>
+          <a:fontRef idx="minor">
+            <a:schemeClr val="tx1"/>
+          </a:fontRef>
+        </p:style>
+      </p:cxnSp>
+    </p:spTree>
+    <p:extLst>
+      <p:ext uri="{BB962C8B-B14F-4D97-AF65-F5344CB8AC3E}">
+        <p14:creationId xmlns:p14="http://schemas.microsoft.com/office/powerpoint/2010/main" val="2241869845"/>
+      </p:ext>
+    </p:extLst>
+  </p:cSld>
+  <p:clrMapOvr>
+    <a:masterClrMapping/>
+  </p:clrMapOvr>
+</p:sld>
+</file>
+
+<file path=ppt/slides/slide4.xml><?xml version="1.0" encoding="utf-8"?>
+<p:sld xmlns:a="http://schemas.openxmlformats.org/drawingml/2006/main" xmlns:r="http://schemas.openxmlformats.org/officeDocument/2006/relationships" xmlns:p="http://schemas.openxmlformats.org/presentationml/2006/main">
+  <p:cSld>
+    <p:spTree>
+      <p:nvGrpSpPr>
+        <p:cNvPr id="1" name=""/>
+        <p:cNvGrpSpPr/>
+        <p:nvPr/>
+      </p:nvGrpSpPr>
+      <p:grpSpPr>
+        <a:xfrm>
+          <a:off x="0" y="0"/>
+          <a:ext cx="0" cy="0"/>
+          <a:chOff x="0" y="0"/>
+          <a:chExt cx="0" cy="0"/>
+        </a:xfrm>
+      </p:grpSpPr>
+      <p:sp>
+        <p:nvSpPr>
+          <p:cNvPr id="2" name="Title 1">
+            <a:extLst>
+              <a:ext uri="{FF2B5EF4-FFF2-40B4-BE49-F238E27FC236}">
+                <a16:creationId xmlns:a16="http://schemas.microsoft.com/office/drawing/2014/main" id="{BC3BA0E8-4F02-4B96-9391-1D4C0C07CFED}"/>
+              </a:ext>
+            </a:extLst>
+          </p:cNvPr>
+          <p:cNvSpPr>
+            <a:spLocks noGrp="1"/>
+          </p:cNvSpPr>
+          <p:nvPr>
+            <p:ph type="title"/>
+          </p:nvPr>
+        </p:nvSpPr>
+        <p:spPr>
+          <a:xfrm>
+            <a:off x="838200" y="365126"/>
+            <a:ext cx="10515600" cy="840822"/>
+          </a:xfrm>
+        </p:spPr>
+        <p:txBody>
+          <a:bodyPr>
+            <a:normAutofit/>
+          </a:bodyPr>
+          <a:lstStyle/>
+          <a:p>
+            <a:pPr algn="ctr"/>
+            <a:r>
+              <a:rPr lang="en-US" dirty="0"/>
               <a:t>Strategy Architecture</a:t>
             </a:r>
           </a:p>
@@ -6937,6 +8474,757 @@
     <p:extLst>
       <p:ext uri="{BB962C8B-B14F-4D97-AF65-F5344CB8AC3E}">
         <p14:creationId xmlns:p14="http://schemas.microsoft.com/office/powerpoint/2010/main" val="3234941050"/>
+      </p:ext>
+    </p:extLst>
+  </p:cSld>
+  <p:clrMapOvr>
+    <a:masterClrMapping/>
+  </p:clrMapOvr>
+</p:sld>
+</file>
+
+<file path=ppt/slides/slide5.xml><?xml version="1.0" encoding="utf-8"?>
+<p:sld xmlns:a="http://schemas.openxmlformats.org/drawingml/2006/main" xmlns:r="http://schemas.openxmlformats.org/officeDocument/2006/relationships" xmlns:p="http://schemas.openxmlformats.org/presentationml/2006/main">
+  <p:cSld>
+    <p:spTree>
+      <p:nvGrpSpPr>
+        <p:cNvPr id="1" name=""/>
+        <p:cNvGrpSpPr/>
+        <p:nvPr/>
+      </p:nvGrpSpPr>
+      <p:grpSpPr>
+        <a:xfrm>
+          <a:off x="0" y="0"/>
+          <a:ext cx="0" cy="0"/>
+          <a:chOff x="0" y="0"/>
+          <a:chExt cx="0" cy="0"/>
+        </a:xfrm>
+      </p:grpSpPr>
+      <p:sp>
+        <p:nvSpPr>
+          <p:cNvPr id="2" name="Title 1">
+            <a:extLst>
+              <a:ext uri="{FF2B5EF4-FFF2-40B4-BE49-F238E27FC236}">
+                <a16:creationId xmlns:a16="http://schemas.microsoft.com/office/drawing/2014/main" id="{51E6B5EF-4524-41AF-870A-9AAF367EBE40}"/>
+              </a:ext>
+            </a:extLst>
+          </p:cNvPr>
+          <p:cNvSpPr>
+            <a:spLocks noGrp="1"/>
+          </p:cNvSpPr>
+          <p:nvPr>
+            <p:ph type="title"/>
+          </p:nvPr>
+        </p:nvSpPr>
+        <p:spPr/>
+        <p:txBody>
+          <a:bodyPr/>
+          <a:lstStyle/>
+          <a:p>
+            <a:r>
+              <a:rPr lang="en-US" dirty="0"/>
+              <a:t>Business Model</a:t>
+            </a:r>
+          </a:p>
+        </p:txBody>
+      </p:sp>
+      <p:sp>
+        <p:nvSpPr>
+          <p:cNvPr id="3" name="Content Placeholder 2">
+            <a:extLst>
+              <a:ext uri="{FF2B5EF4-FFF2-40B4-BE49-F238E27FC236}">
+                <a16:creationId xmlns:a16="http://schemas.microsoft.com/office/drawing/2014/main" id="{A39BD6F0-C56E-4B2C-968E-9B9264235BEB}"/>
+              </a:ext>
+            </a:extLst>
+          </p:cNvPr>
+          <p:cNvSpPr>
+            <a:spLocks noGrp="1"/>
+          </p:cNvSpPr>
+          <p:nvPr>
+            <p:ph idx="1"/>
+          </p:nvPr>
+        </p:nvSpPr>
+        <p:spPr/>
+        <p:txBody>
+          <a:bodyPr/>
+          <a:lstStyle/>
+          <a:p>
+            <a:r>
+              <a:rPr lang="en-US" dirty="0"/>
+              <a:t>Background</a:t>
+            </a:r>
+          </a:p>
+          <a:p>
+            <a:r>
+              <a:rPr lang="en-US" dirty="0"/>
+              <a:t>Target Customers</a:t>
+            </a:r>
+          </a:p>
+          <a:p>
+            <a:pPr lvl="1"/>
+            <a:r>
+              <a:rPr lang="en-US" dirty="0"/>
+              <a:t>Retail Traders</a:t>
+            </a:r>
+          </a:p>
+          <a:p>
+            <a:pPr lvl="1"/>
+            <a:r>
+              <a:rPr lang="en-US" dirty="0"/>
+              <a:t>Institute</a:t>
+            </a:r>
+          </a:p>
+          <a:p>
+            <a:r>
+              <a:rPr lang="en-US" dirty="0"/>
+              <a:t>Outcome Expected</a:t>
+            </a:r>
+          </a:p>
+          <a:p>
+            <a:r>
+              <a:rPr lang="en-US" dirty="0"/>
+              <a:t>Platform</a:t>
+            </a:r>
+          </a:p>
+          <a:p>
+            <a:r>
+              <a:rPr lang="en-US" dirty="0"/>
+              <a:t>Where to Start With</a:t>
+            </a:r>
+          </a:p>
+        </p:txBody>
+      </p:sp>
+    </p:spTree>
+    <p:extLst>
+      <p:ext uri="{BB962C8B-B14F-4D97-AF65-F5344CB8AC3E}">
+        <p14:creationId xmlns:p14="http://schemas.microsoft.com/office/powerpoint/2010/main" val="1969466987"/>
+      </p:ext>
+    </p:extLst>
+  </p:cSld>
+  <p:clrMapOvr>
+    <a:masterClrMapping/>
+  </p:clrMapOvr>
+</p:sld>
+</file>
+
+<file path=ppt/slides/slide6.xml><?xml version="1.0" encoding="utf-8"?>
+<p:sld xmlns:a="http://schemas.openxmlformats.org/drawingml/2006/main" xmlns:r="http://schemas.openxmlformats.org/officeDocument/2006/relationships" xmlns:p="http://schemas.openxmlformats.org/presentationml/2006/main">
+  <p:cSld>
+    <p:spTree>
+      <p:nvGrpSpPr>
+        <p:cNvPr id="1" name=""/>
+        <p:cNvGrpSpPr/>
+        <p:nvPr/>
+      </p:nvGrpSpPr>
+      <p:grpSpPr>
+        <a:xfrm>
+          <a:off x="0" y="0"/>
+          <a:ext cx="0" cy="0"/>
+          <a:chOff x="0" y="0"/>
+          <a:chExt cx="0" cy="0"/>
+        </a:xfrm>
+      </p:grpSpPr>
+      <p:sp>
+        <p:nvSpPr>
+          <p:cNvPr id="2" name="Title 1">
+            <a:extLst>
+              <a:ext uri="{FF2B5EF4-FFF2-40B4-BE49-F238E27FC236}">
+                <a16:creationId xmlns:a16="http://schemas.microsoft.com/office/drawing/2014/main" id="{E6721D10-A0F4-4623-84A5-3A414F463587}"/>
+              </a:ext>
+            </a:extLst>
+          </p:cNvPr>
+          <p:cNvSpPr>
+            <a:spLocks noGrp="1"/>
+          </p:cNvSpPr>
+          <p:nvPr>
+            <p:ph type="title"/>
+          </p:nvPr>
+        </p:nvSpPr>
+        <p:spPr/>
+        <p:txBody>
+          <a:bodyPr/>
+          <a:lstStyle/>
+          <a:p>
+            <a:r>
+              <a:rPr lang="en-US" dirty="0"/>
+              <a:t>Background</a:t>
+            </a:r>
+          </a:p>
+        </p:txBody>
+      </p:sp>
+      <p:sp>
+        <p:nvSpPr>
+          <p:cNvPr id="3" name="Content Placeholder 2">
+            <a:extLst>
+              <a:ext uri="{FF2B5EF4-FFF2-40B4-BE49-F238E27FC236}">
+                <a16:creationId xmlns:a16="http://schemas.microsoft.com/office/drawing/2014/main" id="{8A1760D6-7562-4888-9592-6E8C036553F9}"/>
+              </a:ext>
+            </a:extLst>
+          </p:cNvPr>
+          <p:cNvSpPr>
+            <a:spLocks noGrp="1"/>
+          </p:cNvSpPr>
+          <p:nvPr>
+            <p:ph idx="1"/>
+          </p:nvPr>
+        </p:nvSpPr>
+        <p:spPr/>
+        <p:txBody>
+          <a:bodyPr/>
+          <a:lstStyle/>
+          <a:p>
+            <a:r>
+              <a:rPr lang="en-US" dirty="0"/>
+              <a:t>The Evolution of Technology in Trading Financial Markets</a:t>
+            </a:r>
+          </a:p>
+          <a:p>
+            <a:pPr lvl="1"/>
+            <a:r>
+              <a:rPr lang="en-US" dirty="0"/>
+              <a:t>Open-outcry</a:t>
+            </a:r>
+          </a:p>
+          <a:p>
+            <a:pPr lvl="1"/>
+            <a:r>
+              <a:rPr lang="en-US" dirty="0"/>
+              <a:t>Computer assistance (Analysis &amp; Research)</a:t>
+            </a:r>
+          </a:p>
+          <a:p>
+            <a:pPr lvl="1"/>
+            <a:r>
+              <a:rPr lang="en-US" dirty="0"/>
+              <a:t>Electronic online trading</a:t>
+            </a:r>
+          </a:p>
+          <a:p>
+            <a:pPr lvl="1"/>
+            <a:r>
+              <a:rPr lang="en-US" dirty="0"/>
+              <a:t>Algo, AI, and more…</a:t>
+            </a:r>
+          </a:p>
+          <a:p>
+            <a:pPr marL="457200" lvl="1" indent="0">
+              <a:buNone/>
+            </a:pPr>
+            <a:endParaRPr lang="en-US" dirty="0"/>
+          </a:p>
+          <a:p>
+            <a:pPr marL="457200" lvl="1" indent="0">
+              <a:buNone/>
+            </a:pPr>
+            <a:r>
+              <a:rPr lang="en-US" dirty="0"/>
+              <a:t>Open-outcry -&gt; computer/online -&gt; Algo/AI</a:t>
+            </a:r>
+          </a:p>
+          <a:p>
+            <a:pPr marL="457200" lvl="1" indent="0">
+              <a:buNone/>
+            </a:pPr>
+            <a:r>
+              <a:rPr lang="en-US" dirty="0"/>
+              <a:t>What will be needed from the traders for transition to Algo/AI today?</a:t>
+            </a:r>
+          </a:p>
+          <a:p>
+            <a:pPr marL="457200" lvl="1" indent="0">
+              <a:buNone/>
+            </a:pPr>
+            <a:r>
+              <a:rPr lang="en-US" dirty="0"/>
+              <a:t>Why hiring a freelancer will not work as expected?</a:t>
+            </a:r>
+          </a:p>
+          <a:p>
+            <a:pPr marL="457200" lvl="1" indent="0">
+              <a:buNone/>
+            </a:pPr>
+            <a:r>
+              <a:rPr lang="en-US" dirty="0"/>
+              <a:t>What is the proper way to provide the support/service to customers?</a:t>
+            </a:r>
+          </a:p>
+          <a:p>
+            <a:pPr lvl="1"/>
+            <a:endParaRPr lang="en-US" dirty="0"/>
+          </a:p>
+        </p:txBody>
+      </p:sp>
+    </p:spTree>
+    <p:extLst>
+      <p:ext uri="{BB962C8B-B14F-4D97-AF65-F5344CB8AC3E}">
+        <p14:creationId xmlns:p14="http://schemas.microsoft.com/office/powerpoint/2010/main" val="1679883263"/>
+      </p:ext>
+    </p:extLst>
+  </p:cSld>
+  <p:clrMapOvr>
+    <a:masterClrMapping/>
+  </p:clrMapOvr>
+</p:sld>
+</file>
+
+<file path=ppt/slides/slide7.xml><?xml version="1.0" encoding="utf-8"?>
+<p:sld xmlns:a="http://schemas.openxmlformats.org/drawingml/2006/main" xmlns:r="http://schemas.openxmlformats.org/officeDocument/2006/relationships" xmlns:p="http://schemas.openxmlformats.org/presentationml/2006/main">
+  <p:cSld>
+    <p:spTree>
+      <p:nvGrpSpPr>
+        <p:cNvPr id="1" name=""/>
+        <p:cNvGrpSpPr/>
+        <p:nvPr/>
+      </p:nvGrpSpPr>
+      <p:grpSpPr>
+        <a:xfrm>
+          <a:off x="0" y="0"/>
+          <a:ext cx="0" cy="0"/>
+          <a:chOff x="0" y="0"/>
+          <a:chExt cx="0" cy="0"/>
+        </a:xfrm>
+      </p:grpSpPr>
+      <p:sp>
+        <p:nvSpPr>
+          <p:cNvPr id="2" name="Title 1">
+            <a:extLst>
+              <a:ext uri="{FF2B5EF4-FFF2-40B4-BE49-F238E27FC236}">
+                <a16:creationId xmlns:a16="http://schemas.microsoft.com/office/drawing/2014/main" id="{72A82A2D-371C-4CB1-9410-DB7D7792A196}"/>
+              </a:ext>
+            </a:extLst>
+          </p:cNvPr>
+          <p:cNvSpPr>
+            <a:spLocks noGrp="1"/>
+          </p:cNvSpPr>
+          <p:nvPr>
+            <p:ph type="title"/>
+          </p:nvPr>
+        </p:nvSpPr>
+        <p:spPr/>
+        <p:txBody>
+          <a:bodyPr/>
+          <a:lstStyle/>
+          <a:p>
+            <a:r>
+              <a:rPr lang="en-US" dirty="0"/>
+              <a:t>Target Customers</a:t>
+            </a:r>
+          </a:p>
+        </p:txBody>
+      </p:sp>
+      <p:sp>
+        <p:nvSpPr>
+          <p:cNvPr id="3" name="Content Placeholder 2">
+            <a:extLst>
+              <a:ext uri="{FF2B5EF4-FFF2-40B4-BE49-F238E27FC236}">
+                <a16:creationId xmlns:a16="http://schemas.microsoft.com/office/drawing/2014/main" id="{BA0C9968-5771-4CAC-9938-CA774D061CFE}"/>
+              </a:ext>
+            </a:extLst>
+          </p:cNvPr>
+          <p:cNvSpPr>
+            <a:spLocks noGrp="1"/>
+          </p:cNvSpPr>
+          <p:nvPr>
+            <p:ph idx="1"/>
+          </p:nvPr>
+        </p:nvSpPr>
+        <p:spPr/>
+        <p:txBody>
+          <a:bodyPr>
+            <a:normAutofit fontScale="92500" lnSpcReduction="10000"/>
+          </a:bodyPr>
+          <a:lstStyle/>
+          <a:p>
+            <a:r>
+              <a:rPr lang="en-US" dirty="0"/>
+              <a:t>Retail Traders</a:t>
+            </a:r>
+          </a:p>
+          <a:p>
+            <a:pPr lvl="1"/>
+            <a:r>
+              <a:rPr lang="en-US" dirty="0" err="1"/>
+              <a:t>Ninjatrader</a:t>
+            </a:r>
+            <a:r>
+              <a:rPr lang="en-US" dirty="0"/>
+              <a:t> Framework  (easy to develop customized strategies, free of charge, only charge for registration) – Beginner Programmers</a:t>
+            </a:r>
+          </a:p>
+          <a:p>
+            <a:pPr lvl="1"/>
+            <a:r>
+              <a:rPr lang="en-US" dirty="0"/>
+              <a:t>Subscription/ Proprietary Strategies/Training  (paid service) – Non-Programmers</a:t>
+            </a:r>
+          </a:p>
+          <a:p>
+            <a:pPr lvl="1"/>
+            <a:r>
+              <a:rPr lang="en-US" dirty="0"/>
+              <a:t>Programming service (paid service, work for non-programmers, charge a share) – Contractor Programmers</a:t>
+            </a:r>
+          </a:p>
+          <a:p>
+            <a:endParaRPr lang="en-US" dirty="0"/>
+          </a:p>
+          <a:p>
+            <a:r>
+              <a:rPr lang="en-US" dirty="0"/>
+              <a:t>Institute</a:t>
+            </a:r>
+          </a:p>
+          <a:p>
+            <a:pPr lvl="1"/>
+            <a:r>
+              <a:rPr lang="en-US" dirty="0"/>
+              <a:t>Subscription/Proprietary Strategies (Sale or paid subscription)</a:t>
+            </a:r>
+          </a:p>
+          <a:p>
+            <a:pPr lvl="2"/>
+            <a:r>
+              <a:rPr lang="en-US" dirty="0"/>
+              <a:t>The subscription/purchase includes frontend and backend, the frontend can be reverse engineered but not the backend. The day to day trading needs to pull data and instructions from backend to the frontend to make the trades work</a:t>
+            </a:r>
+          </a:p>
+          <a:p>
+            <a:pPr lvl="1"/>
+            <a:r>
+              <a:rPr lang="en-US" dirty="0"/>
+              <a:t>Programming service (paid)</a:t>
+            </a:r>
+          </a:p>
+        </p:txBody>
+      </p:sp>
+    </p:spTree>
+    <p:extLst>
+      <p:ext uri="{BB962C8B-B14F-4D97-AF65-F5344CB8AC3E}">
+        <p14:creationId xmlns:p14="http://schemas.microsoft.com/office/powerpoint/2010/main" val="1221307754"/>
+      </p:ext>
+    </p:extLst>
+  </p:cSld>
+  <p:clrMapOvr>
+    <a:masterClrMapping/>
+  </p:clrMapOvr>
+</p:sld>
+</file>
+
+<file path=ppt/slides/slide8.xml><?xml version="1.0" encoding="utf-8"?>
+<p:sld xmlns:a="http://schemas.openxmlformats.org/drawingml/2006/main" xmlns:r="http://schemas.openxmlformats.org/officeDocument/2006/relationships" xmlns:p="http://schemas.openxmlformats.org/presentationml/2006/main">
+  <p:cSld>
+    <p:spTree>
+      <p:nvGrpSpPr>
+        <p:cNvPr id="1" name=""/>
+        <p:cNvGrpSpPr/>
+        <p:nvPr/>
+      </p:nvGrpSpPr>
+      <p:grpSpPr>
+        <a:xfrm>
+          <a:off x="0" y="0"/>
+          <a:ext cx="0" cy="0"/>
+          <a:chOff x="0" y="0"/>
+          <a:chExt cx="0" cy="0"/>
+        </a:xfrm>
+      </p:grpSpPr>
+      <p:sp>
+        <p:nvSpPr>
+          <p:cNvPr id="2" name="Title 1">
+            <a:extLst>
+              <a:ext uri="{FF2B5EF4-FFF2-40B4-BE49-F238E27FC236}">
+                <a16:creationId xmlns:a16="http://schemas.microsoft.com/office/drawing/2014/main" id="{2E2990C7-598B-49F9-8BB5-42C7FF725FB6}"/>
+              </a:ext>
+            </a:extLst>
+          </p:cNvPr>
+          <p:cNvSpPr>
+            <a:spLocks noGrp="1"/>
+          </p:cNvSpPr>
+          <p:nvPr>
+            <p:ph type="title"/>
+          </p:nvPr>
+        </p:nvSpPr>
+        <p:spPr/>
+        <p:txBody>
+          <a:bodyPr/>
+          <a:lstStyle/>
+          <a:p>
+            <a:r>
+              <a:rPr lang="en-US" dirty="0"/>
+              <a:t>Outcome Expected</a:t>
+            </a:r>
+          </a:p>
+        </p:txBody>
+      </p:sp>
+      <p:sp>
+        <p:nvSpPr>
+          <p:cNvPr id="3" name="Content Placeholder 2">
+            <a:extLst>
+              <a:ext uri="{FF2B5EF4-FFF2-40B4-BE49-F238E27FC236}">
+                <a16:creationId xmlns:a16="http://schemas.microsoft.com/office/drawing/2014/main" id="{BD4EC978-F8A1-420B-A166-CB508118212C}"/>
+              </a:ext>
+            </a:extLst>
+          </p:cNvPr>
+          <p:cNvSpPr>
+            <a:spLocks noGrp="1"/>
+          </p:cNvSpPr>
+          <p:nvPr>
+            <p:ph idx="1"/>
+          </p:nvPr>
+        </p:nvSpPr>
+        <p:spPr/>
+        <p:txBody>
+          <a:bodyPr/>
+          <a:lstStyle/>
+          <a:p>
+            <a:r>
+              <a:rPr lang="en-US" dirty="0"/>
+              <a:t>Platform and Technologies</a:t>
+            </a:r>
+          </a:p>
+          <a:p>
+            <a:pPr lvl="1"/>
+            <a:r>
+              <a:rPr lang="en-US" dirty="0"/>
+              <a:t>Product: </a:t>
+            </a:r>
+            <a:r>
+              <a:rPr lang="en-US" dirty="0" err="1"/>
+              <a:t>Ninjatrader</a:t>
+            </a:r>
+            <a:r>
+              <a:rPr lang="en-US" dirty="0"/>
+              <a:t> framework</a:t>
+            </a:r>
+          </a:p>
+          <a:p>
+            <a:pPr lvl="1"/>
+            <a:r>
+              <a:rPr lang="en-US" dirty="0"/>
+              <a:t>Proprietary strategies (Sale &amp; Subscription)</a:t>
+            </a:r>
+          </a:p>
+          <a:p>
+            <a:pPr lvl="1"/>
+            <a:r>
+              <a:rPr lang="en-US" dirty="0"/>
+              <a:t>Community (Programming service and Support, Training)</a:t>
+            </a:r>
+          </a:p>
+          <a:p>
+            <a:r>
+              <a:rPr lang="en-US" dirty="0"/>
+              <a:t>Income</a:t>
+            </a:r>
+          </a:p>
+          <a:p>
+            <a:pPr lvl="1"/>
+            <a:r>
+              <a:rPr lang="en-US" dirty="0"/>
+              <a:t>Registration</a:t>
+            </a:r>
+          </a:p>
+          <a:p>
+            <a:pPr lvl="1"/>
+            <a:r>
+              <a:rPr lang="en-US" dirty="0"/>
+              <a:t>Proprietary Strategies Sale &amp; Subscription</a:t>
+            </a:r>
+          </a:p>
+          <a:p>
+            <a:pPr lvl="1"/>
+            <a:r>
+              <a:rPr lang="en-US" dirty="0"/>
+              <a:t>Share of Programming service, Paid training and Support</a:t>
+            </a:r>
+          </a:p>
+        </p:txBody>
+      </p:sp>
+    </p:spTree>
+    <p:extLst>
+      <p:ext uri="{BB962C8B-B14F-4D97-AF65-F5344CB8AC3E}">
+        <p14:creationId xmlns:p14="http://schemas.microsoft.com/office/powerpoint/2010/main" val="2566743075"/>
+      </p:ext>
+    </p:extLst>
+  </p:cSld>
+  <p:clrMapOvr>
+    <a:masterClrMapping/>
+  </p:clrMapOvr>
+</p:sld>
+</file>
+
+<file path=ppt/slides/slide9.xml><?xml version="1.0" encoding="utf-8"?>
+<p:sld xmlns:a="http://schemas.openxmlformats.org/drawingml/2006/main" xmlns:r="http://schemas.openxmlformats.org/officeDocument/2006/relationships" xmlns:p="http://schemas.openxmlformats.org/presentationml/2006/main">
+  <p:cSld>
+    <p:spTree>
+      <p:nvGrpSpPr>
+        <p:cNvPr id="1" name=""/>
+        <p:cNvGrpSpPr/>
+        <p:nvPr/>
+      </p:nvGrpSpPr>
+      <p:grpSpPr>
+        <a:xfrm>
+          <a:off x="0" y="0"/>
+          <a:ext cx="0" cy="0"/>
+          <a:chOff x="0" y="0"/>
+          <a:chExt cx="0" cy="0"/>
+        </a:xfrm>
+      </p:grpSpPr>
+      <p:sp>
+        <p:nvSpPr>
+          <p:cNvPr id="2" name="Title 1">
+            <a:extLst>
+              <a:ext uri="{FF2B5EF4-FFF2-40B4-BE49-F238E27FC236}">
+                <a16:creationId xmlns:a16="http://schemas.microsoft.com/office/drawing/2014/main" id="{D42E29B7-F40C-42C7-821F-B4877657B3EE}"/>
+              </a:ext>
+            </a:extLst>
+          </p:cNvPr>
+          <p:cNvSpPr>
+            <a:spLocks noGrp="1"/>
+          </p:cNvSpPr>
+          <p:nvPr>
+            <p:ph type="title"/>
+          </p:nvPr>
+        </p:nvSpPr>
+        <p:spPr/>
+        <p:txBody>
+          <a:bodyPr/>
+          <a:lstStyle/>
+          <a:p>
+            <a:r>
+              <a:rPr lang="en-US" dirty="0"/>
+              <a:t>Platform</a:t>
+            </a:r>
+          </a:p>
+        </p:txBody>
+      </p:sp>
+      <p:sp>
+        <p:nvSpPr>
+          <p:cNvPr id="3" name="Content Placeholder 2">
+            <a:extLst>
+              <a:ext uri="{FF2B5EF4-FFF2-40B4-BE49-F238E27FC236}">
+                <a16:creationId xmlns:a16="http://schemas.microsoft.com/office/drawing/2014/main" id="{87CBA6D3-865F-41F7-8929-1708D7EED29A}"/>
+              </a:ext>
+            </a:extLst>
+          </p:cNvPr>
+          <p:cNvSpPr>
+            <a:spLocks noGrp="1"/>
+          </p:cNvSpPr>
+          <p:nvPr>
+            <p:ph idx="1"/>
+          </p:nvPr>
+        </p:nvSpPr>
+        <p:spPr/>
+        <p:txBody>
+          <a:bodyPr/>
+          <a:lstStyle/>
+          <a:p>
+            <a:r>
+              <a:rPr lang="en-US" dirty="0"/>
+              <a:t>Community Based Platform (Algo Trader’s Community)</a:t>
+            </a:r>
+          </a:p>
+          <a:p>
+            <a:pPr lvl="1"/>
+            <a:r>
+              <a:rPr lang="en-US" dirty="0"/>
+              <a:t>Customers join with a small </a:t>
+            </a:r>
+            <a:r>
+              <a:rPr lang="en-US" dirty="0">
+                <a:solidFill>
+                  <a:srgbClr val="FF0000"/>
+                </a:solidFill>
+              </a:rPr>
+              <a:t>registration fee</a:t>
+            </a:r>
+          </a:p>
+          <a:p>
+            <a:pPr lvl="1"/>
+            <a:r>
+              <a:rPr lang="en-US" dirty="0"/>
+              <a:t>Free </a:t>
+            </a:r>
+            <a:r>
+              <a:rPr lang="en-US" dirty="0" err="1"/>
+              <a:t>Ninjatrader</a:t>
+            </a:r>
+            <a:r>
+              <a:rPr lang="en-US" dirty="0"/>
+              <a:t> Framework (Add </a:t>
+            </a:r>
+            <a:r>
+              <a:rPr lang="en-US" dirty="0" err="1"/>
+              <a:t>Tradestation</a:t>
+            </a:r>
+            <a:r>
+              <a:rPr lang="en-US" dirty="0"/>
+              <a:t> later)</a:t>
+            </a:r>
+          </a:p>
+          <a:p>
+            <a:pPr lvl="1"/>
+            <a:r>
+              <a:rPr lang="en-US" dirty="0"/>
+              <a:t>Free training materials/seminar</a:t>
+            </a:r>
+          </a:p>
+          <a:p>
+            <a:pPr lvl="1"/>
+            <a:r>
+              <a:rPr lang="en-US" dirty="0">
+                <a:solidFill>
+                  <a:srgbClr val="FF0000"/>
+                </a:solidFill>
+              </a:rPr>
+              <a:t>Paid subscription for proprietary strategies</a:t>
+            </a:r>
+          </a:p>
+          <a:p>
+            <a:pPr lvl="1"/>
+            <a:r>
+              <a:rPr lang="en-US" dirty="0">
+                <a:solidFill>
+                  <a:srgbClr val="FF0000"/>
+                </a:solidFill>
+              </a:rPr>
+              <a:t>Paid one-on-one coaching or support</a:t>
+            </a:r>
+          </a:p>
+          <a:p>
+            <a:pPr lvl="1"/>
+            <a:r>
+              <a:rPr lang="en-US" dirty="0"/>
+              <a:t>Chance to hire contractor programmer</a:t>
+            </a:r>
+          </a:p>
+          <a:p>
+            <a:pPr lvl="1"/>
+            <a:r>
+              <a:rPr lang="en-US" dirty="0"/>
+              <a:t>Chance to become a contractor programmer</a:t>
+            </a:r>
+          </a:p>
+          <a:p>
+            <a:pPr lvl="1"/>
+            <a:r>
+              <a:rPr lang="en-US" dirty="0"/>
+              <a:t>Manage programming service, </a:t>
+            </a:r>
+            <a:r>
+              <a:rPr lang="en-US" dirty="0">
+                <a:solidFill>
+                  <a:srgbClr val="FF0000"/>
+                </a:solidFill>
+              </a:rPr>
+              <a:t>charge a fee from the contract</a:t>
+            </a:r>
+          </a:p>
+        </p:txBody>
+      </p:sp>
+    </p:spTree>
+    <p:extLst>
+      <p:ext uri="{BB962C8B-B14F-4D97-AF65-F5344CB8AC3E}">
+        <p14:creationId xmlns:p14="http://schemas.microsoft.com/office/powerpoint/2010/main" val="4069655234"/>
       </p:ext>
     </p:extLst>
   </p:cSld>

</xml_diff>

<commit_message>
Add monthly/weekly SnR Indicators;
</commit_message>
<xml_diff>
--- a/NT8/Ninjatrader-web.pptx
+++ b/NT8/Ninjatrader-web.pptx
@@ -268,7 +268,7 @@
           <a:p>
             <a:fld id="{83F1246B-29A4-445C-A64E-6BEFF5AEC172}" type="datetimeFigureOut">
               <a:rPr lang="en-US" smtClean="0"/>
-              <a:t>1/22/2020</a:t>
+              <a:t>1/28/2020</a:t>
             </a:fld>
             <a:endParaRPr lang="en-US"/>
           </a:p>
@@ -466,7 +466,7 @@
           <a:p>
             <a:fld id="{83F1246B-29A4-445C-A64E-6BEFF5AEC172}" type="datetimeFigureOut">
               <a:rPr lang="en-US" smtClean="0"/>
-              <a:t>1/22/2020</a:t>
+              <a:t>1/28/2020</a:t>
             </a:fld>
             <a:endParaRPr lang="en-US"/>
           </a:p>
@@ -674,7 +674,7 @@
           <a:p>
             <a:fld id="{83F1246B-29A4-445C-A64E-6BEFF5AEC172}" type="datetimeFigureOut">
               <a:rPr lang="en-US" smtClean="0"/>
-              <a:t>1/22/2020</a:t>
+              <a:t>1/28/2020</a:t>
             </a:fld>
             <a:endParaRPr lang="en-US"/>
           </a:p>
@@ -872,7 +872,7 @@
           <a:p>
             <a:fld id="{83F1246B-29A4-445C-A64E-6BEFF5AEC172}" type="datetimeFigureOut">
               <a:rPr lang="en-US" smtClean="0"/>
-              <a:t>1/22/2020</a:t>
+              <a:t>1/28/2020</a:t>
             </a:fld>
             <a:endParaRPr lang="en-US"/>
           </a:p>
@@ -1147,7 +1147,7 @@
           <a:p>
             <a:fld id="{83F1246B-29A4-445C-A64E-6BEFF5AEC172}" type="datetimeFigureOut">
               <a:rPr lang="en-US" smtClean="0"/>
-              <a:t>1/22/2020</a:t>
+              <a:t>1/28/2020</a:t>
             </a:fld>
             <a:endParaRPr lang="en-US"/>
           </a:p>
@@ -1412,7 +1412,7 @@
           <a:p>
             <a:fld id="{83F1246B-29A4-445C-A64E-6BEFF5AEC172}" type="datetimeFigureOut">
               <a:rPr lang="en-US" smtClean="0"/>
-              <a:t>1/22/2020</a:t>
+              <a:t>1/28/2020</a:t>
             </a:fld>
             <a:endParaRPr lang="en-US"/>
           </a:p>
@@ -1824,7 +1824,7 @@
           <a:p>
             <a:fld id="{83F1246B-29A4-445C-A64E-6BEFF5AEC172}" type="datetimeFigureOut">
               <a:rPr lang="en-US" smtClean="0"/>
-              <a:t>1/22/2020</a:t>
+              <a:t>1/28/2020</a:t>
             </a:fld>
             <a:endParaRPr lang="en-US"/>
           </a:p>
@@ -1965,7 +1965,7 @@
           <a:p>
             <a:fld id="{83F1246B-29A4-445C-A64E-6BEFF5AEC172}" type="datetimeFigureOut">
               <a:rPr lang="en-US" smtClean="0"/>
-              <a:t>1/22/2020</a:t>
+              <a:t>1/28/2020</a:t>
             </a:fld>
             <a:endParaRPr lang="en-US"/>
           </a:p>
@@ -2078,7 +2078,7 @@
           <a:p>
             <a:fld id="{83F1246B-29A4-445C-A64E-6BEFF5AEC172}" type="datetimeFigureOut">
               <a:rPr lang="en-US" smtClean="0"/>
-              <a:t>1/22/2020</a:t>
+              <a:t>1/28/2020</a:t>
             </a:fld>
             <a:endParaRPr lang="en-US"/>
           </a:p>
@@ -2389,7 +2389,7 @@
           <a:p>
             <a:fld id="{83F1246B-29A4-445C-A64E-6BEFF5AEC172}" type="datetimeFigureOut">
               <a:rPr lang="en-US" smtClean="0"/>
-              <a:t>1/22/2020</a:t>
+              <a:t>1/28/2020</a:t>
             </a:fld>
             <a:endParaRPr lang="en-US"/>
           </a:p>
@@ -2677,7 +2677,7 @@
           <a:p>
             <a:fld id="{83F1246B-29A4-445C-A64E-6BEFF5AEC172}" type="datetimeFigureOut">
               <a:rPr lang="en-US" smtClean="0"/>
-              <a:t>1/22/2020</a:t>
+              <a:t>1/28/2020</a:t>
             </a:fld>
             <a:endParaRPr lang="en-US"/>
           </a:p>
@@ -2918,7 +2918,7 @@
           <a:p>
             <a:fld id="{83F1246B-29A4-445C-A64E-6BEFF5AEC172}" type="datetimeFigureOut">
               <a:rPr lang="en-US" smtClean="0"/>
-              <a:t>1/22/2020</a:t>
+              <a:t>1/28/2020</a:t>
             </a:fld>
             <a:endParaRPr lang="en-US"/>
           </a:p>
@@ -9194,7 +9194,7 @@
             <a:pPr lvl="1"/>
             <a:r>
               <a:rPr lang="en-US" dirty="0"/>
-              <a:t>Chance to hire contractor programmer</a:t>
+              <a:t>Chance to hire contractor programmer with lower cost and more support</a:t>
             </a:r>
           </a:p>
           <a:p>

</xml_diff>

<commit_message>
Updated notes and PPT;
</commit_message>
<xml_diff>
--- a/NT8/Ninjatrader-web.pptx
+++ b/NT8/Ninjatrader-web.pptx
@@ -8,13 +8,14 @@
     <p:sldId id="258" r:id="rId2"/>
     <p:sldId id="260" r:id="rId3"/>
     <p:sldId id="267" r:id="rId4"/>
-    <p:sldId id="261" r:id="rId5"/>
-    <p:sldId id="262" r:id="rId6"/>
-    <p:sldId id="263" r:id="rId7"/>
-    <p:sldId id="264" r:id="rId8"/>
-    <p:sldId id="268" r:id="rId9"/>
-    <p:sldId id="265" r:id="rId10"/>
-    <p:sldId id="266" r:id="rId11"/>
+    <p:sldId id="269" r:id="rId5"/>
+    <p:sldId id="261" r:id="rId6"/>
+    <p:sldId id="262" r:id="rId7"/>
+    <p:sldId id="263" r:id="rId8"/>
+    <p:sldId id="264" r:id="rId9"/>
+    <p:sldId id="268" r:id="rId10"/>
+    <p:sldId id="265" r:id="rId11"/>
+    <p:sldId id="266" r:id="rId12"/>
   </p:sldIdLst>
   <p:sldSz cx="12192000" cy="6858000"/>
   <p:notesSz cx="6858000" cy="9144000"/>
@@ -268,7 +269,7 @@
           <a:p>
             <a:fld id="{83F1246B-29A4-445C-A64E-6BEFF5AEC172}" type="datetimeFigureOut">
               <a:rPr lang="en-US" smtClean="0"/>
-              <a:t>1/28/2020</a:t>
+              <a:t>2/23/2020</a:t>
             </a:fld>
             <a:endParaRPr lang="en-US"/>
           </a:p>
@@ -466,7 +467,7 @@
           <a:p>
             <a:fld id="{83F1246B-29A4-445C-A64E-6BEFF5AEC172}" type="datetimeFigureOut">
               <a:rPr lang="en-US" smtClean="0"/>
-              <a:t>1/28/2020</a:t>
+              <a:t>2/23/2020</a:t>
             </a:fld>
             <a:endParaRPr lang="en-US"/>
           </a:p>
@@ -674,7 +675,7 @@
           <a:p>
             <a:fld id="{83F1246B-29A4-445C-A64E-6BEFF5AEC172}" type="datetimeFigureOut">
               <a:rPr lang="en-US" smtClean="0"/>
-              <a:t>1/28/2020</a:t>
+              <a:t>2/23/2020</a:t>
             </a:fld>
             <a:endParaRPr lang="en-US"/>
           </a:p>
@@ -872,7 +873,7 @@
           <a:p>
             <a:fld id="{83F1246B-29A4-445C-A64E-6BEFF5AEC172}" type="datetimeFigureOut">
               <a:rPr lang="en-US" smtClean="0"/>
-              <a:t>1/28/2020</a:t>
+              <a:t>2/23/2020</a:t>
             </a:fld>
             <a:endParaRPr lang="en-US"/>
           </a:p>
@@ -1147,7 +1148,7 @@
           <a:p>
             <a:fld id="{83F1246B-29A4-445C-A64E-6BEFF5AEC172}" type="datetimeFigureOut">
               <a:rPr lang="en-US" smtClean="0"/>
-              <a:t>1/28/2020</a:t>
+              <a:t>2/23/2020</a:t>
             </a:fld>
             <a:endParaRPr lang="en-US"/>
           </a:p>
@@ -1412,7 +1413,7 @@
           <a:p>
             <a:fld id="{83F1246B-29A4-445C-A64E-6BEFF5AEC172}" type="datetimeFigureOut">
               <a:rPr lang="en-US" smtClean="0"/>
-              <a:t>1/28/2020</a:t>
+              <a:t>2/23/2020</a:t>
             </a:fld>
             <a:endParaRPr lang="en-US"/>
           </a:p>
@@ -1824,7 +1825,7 @@
           <a:p>
             <a:fld id="{83F1246B-29A4-445C-A64E-6BEFF5AEC172}" type="datetimeFigureOut">
               <a:rPr lang="en-US" smtClean="0"/>
-              <a:t>1/28/2020</a:t>
+              <a:t>2/23/2020</a:t>
             </a:fld>
             <a:endParaRPr lang="en-US"/>
           </a:p>
@@ -1965,7 +1966,7 @@
           <a:p>
             <a:fld id="{83F1246B-29A4-445C-A64E-6BEFF5AEC172}" type="datetimeFigureOut">
               <a:rPr lang="en-US" smtClean="0"/>
-              <a:t>1/28/2020</a:t>
+              <a:t>2/23/2020</a:t>
             </a:fld>
             <a:endParaRPr lang="en-US"/>
           </a:p>
@@ -2078,7 +2079,7 @@
           <a:p>
             <a:fld id="{83F1246B-29A4-445C-A64E-6BEFF5AEC172}" type="datetimeFigureOut">
               <a:rPr lang="en-US" smtClean="0"/>
-              <a:t>1/28/2020</a:t>
+              <a:t>2/23/2020</a:t>
             </a:fld>
             <a:endParaRPr lang="en-US"/>
           </a:p>
@@ -2389,7 +2390,7 @@
           <a:p>
             <a:fld id="{83F1246B-29A4-445C-A64E-6BEFF5AEC172}" type="datetimeFigureOut">
               <a:rPr lang="en-US" smtClean="0"/>
-              <a:t>1/28/2020</a:t>
+              <a:t>2/23/2020</a:t>
             </a:fld>
             <a:endParaRPr lang="en-US"/>
           </a:p>
@@ -2677,7 +2678,7 @@
           <a:p>
             <a:fld id="{83F1246B-29A4-445C-A64E-6BEFF5AEC172}" type="datetimeFigureOut">
               <a:rPr lang="en-US" smtClean="0"/>
-              <a:t>1/28/2020</a:t>
+              <a:t>2/23/2020</a:t>
             </a:fld>
             <a:endParaRPr lang="en-US"/>
           </a:p>
@@ -2918,7 +2919,7 @@
           <a:p>
             <a:fld id="{83F1246B-29A4-445C-A64E-6BEFF5AEC172}" type="datetimeFigureOut">
               <a:rPr lang="en-US" smtClean="0"/>
-              <a:t>1/28/2020</a:t>
+              <a:t>2/23/2020</a:t>
             </a:fld>
             <a:endParaRPr lang="en-US"/>
           </a:p>
@@ -4121,6 +4122,188 @@
           <p:cNvPr id="2" name="Title 1">
             <a:extLst>
               <a:ext uri="{FF2B5EF4-FFF2-40B4-BE49-F238E27FC236}">
+                <a16:creationId xmlns:a16="http://schemas.microsoft.com/office/drawing/2014/main" id="{D42E29B7-F40C-42C7-821F-B4877657B3EE}"/>
+              </a:ext>
+            </a:extLst>
+          </p:cNvPr>
+          <p:cNvSpPr>
+            <a:spLocks noGrp="1"/>
+          </p:cNvSpPr>
+          <p:nvPr>
+            <p:ph type="title"/>
+          </p:nvPr>
+        </p:nvSpPr>
+        <p:spPr/>
+        <p:txBody>
+          <a:bodyPr/>
+          <a:lstStyle/>
+          <a:p>
+            <a:r>
+              <a:rPr lang="en-US" dirty="0"/>
+              <a:t>Platform</a:t>
+            </a:r>
+          </a:p>
+        </p:txBody>
+      </p:sp>
+      <p:sp>
+        <p:nvSpPr>
+          <p:cNvPr id="3" name="Content Placeholder 2">
+            <a:extLst>
+              <a:ext uri="{FF2B5EF4-FFF2-40B4-BE49-F238E27FC236}">
+                <a16:creationId xmlns:a16="http://schemas.microsoft.com/office/drawing/2014/main" id="{87CBA6D3-865F-41F7-8929-1708D7EED29A}"/>
+              </a:ext>
+            </a:extLst>
+          </p:cNvPr>
+          <p:cNvSpPr>
+            <a:spLocks noGrp="1"/>
+          </p:cNvSpPr>
+          <p:nvPr>
+            <p:ph idx="1"/>
+          </p:nvPr>
+        </p:nvSpPr>
+        <p:spPr/>
+        <p:txBody>
+          <a:bodyPr/>
+          <a:lstStyle/>
+          <a:p>
+            <a:r>
+              <a:rPr lang="en-US" dirty="0"/>
+              <a:t>Community Based Platform (Algo Trader’s Community)</a:t>
+            </a:r>
+          </a:p>
+          <a:p>
+            <a:pPr lvl="1"/>
+            <a:r>
+              <a:rPr lang="en-US" dirty="0"/>
+              <a:t>Customers join with a small </a:t>
+            </a:r>
+            <a:r>
+              <a:rPr lang="en-US" dirty="0">
+                <a:solidFill>
+                  <a:srgbClr val="FF0000"/>
+                </a:solidFill>
+              </a:rPr>
+              <a:t>registration fee</a:t>
+            </a:r>
+          </a:p>
+          <a:p>
+            <a:pPr lvl="1"/>
+            <a:r>
+              <a:rPr lang="en-US" dirty="0"/>
+              <a:t>Free </a:t>
+            </a:r>
+            <a:r>
+              <a:rPr lang="en-US" dirty="0" err="1"/>
+              <a:t>Ninjatrader</a:t>
+            </a:r>
+            <a:r>
+              <a:rPr lang="en-US" dirty="0"/>
+              <a:t> Framework (Add </a:t>
+            </a:r>
+            <a:r>
+              <a:rPr lang="en-US" dirty="0" err="1"/>
+              <a:t>Tradestation</a:t>
+            </a:r>
+            <a:r>
+              <a:rPr lang="en-US" dirty="0"/>
+              <a:t> later)</a:t>
+            </a:r>
+          </a:p>
+          <a:p>
+            <a:pPr lvl="1"/>
+            <a:r>
+              <a:rPr lang="en-US" dirty="0"/>
+              <a:t>Free training materials/seminar</a:t>
+            </a:r>
+          </a:p>
+          <a:p>
+            <a:pPr lvl="1"/>
+            <a:r>
+              <a:rPr lang="en-US" dirty="0">
+                <a:solidFill>
+                  <a:srgbClr val="FF0000"/>
+                </a:solidFill>
+              </a:rPr>
+              <a:t>Paid subscription for proprietary strategies</a:t>
+            </a:r>
+          </a:p>
+          <a:p>
+            <a:pPr lvl="1"/>
+            <a:r>
+              <a:rPr lang="en-US" dirty="0">
+                <a:solidFill>
+                  <a:srgbClr val="FF0000"/>
+                </a:solidFill>
+              </a:rPr>
+              <a:t>Paid one-on-one coaching or support</a:t>
+            </a:r>
+          </a:p>
+          <a:p>
+            <a:pPr lvl="1"/>
+            <a:r>
+              <a:rPr lang="en-US" dirty="0"/>
+              <a:t>Chance to hire contractor programmer with lower cost and more support</a:t>
+            </a:r>
+          </a:p>
+          <a:p>
+            <a:pPr lvl="1"/>
+            <a:r>
+              <a:rPr lang="en-US" dirty="0"/>
+              <a:t>Chance to become a contractor programmer</a:t>
+            </a:r>
+          </a:p>
+          <a:p>
+            <a:pPr lvl="1"/>
+            <a:r>
+              <a:rPr lang="en-US" dirty="0"/>
+              <a:t>Manage programming service, </a:t>
+            </a:r>
+            <a:r>
+              <a:rPr lang="en-US" dirty="0">
+                <a:solidFill>
+                  <a:srgbClr val="FF0000"/>
+                </a:solidFill>
+              </a:rPr>
+              <a:t>charge a fee from the contract</a:t>
+            </a:r>
+          </a:p>
+        </p:txBody>
+      </p:sp>
+    </p:spTree>
+    <p:extLst>
+      <p:ext uri="{BB962C8B-B14F-4D97-AF65-F5344CB8AC3E}">
+        <p14:creationId xmlns:p14="http://schemas.microsoft.com/office/powerpoint/2010/main" val="4069655234"/>
+      </p:ext>
+    </p:extLst>
+  </p:cSld>
+  <p:clrMapOvr>
+    <a:masterClrMapping/>
+  </p:clrMapOvr>
+</p:sld>
+</file>
+
+<file path=ppt/slides/slide11.xml><?xml version="1.0" encoding="utf-8"?>
+<p:sld xmlns:a="http://schemas.openxmlformats.org/drawingml/2006/main" xmlns:r="http://schemas.openxmlformats.org/officeDocument/2006/relationships" xmlns:p="http://schemas.openxmlformats.org/presentationml/2006/main">
+  <p:cSld>
+    <p:spTree>
+      <p:nvGrpSpPr>
+        <p:cNvPr id="1" name=""/>
+        <p:cNvGrpSpPr/>
+        <p:nvPr/>
+      </p:nvGrpSpPr>
+      <p:grpSpPr>
+        <a:xfrm>
+          <a:off x="0" y="0"/>
+          <a:ext cx="0" cy="0"/>
+          <a:chOff x="0" y="0"/>
+          <a:chExt cx="0" cy="0"/>
+        </a:xfrm>
+      </p:grpSpPr>
+      <p:sp>
+        <p:nvSpPr>
+          <p:cNvPr id="2" name="Title 1">
+            <a:extLst>
+              <a:ext uri="{FF2B5EF4-FFF2-40B4-BE49-F238E27FC236}">
                 <a16:creationId xmlns:a16="http://schemas.microsoft.com/office/drawing/2014/main" id="{80EBE4C7-798B-48DA-B2FA-C7FB9666FBE0}"/>
               </a:ext>
             </a:extLst>
@@ -5651,14 +5834,13 @@
           <p:cNvCxnSpPr>
             <a:cxnSpLocks/>
             <a:stCxn id="4" idx="6"/>
-            <a:endCxn id="7" idx="1"/>
           </p:cNvCxnSpPr>
           <p:nvPr/>
         </p:nvCxnSpPr>
         <p:spPr>
           <a:xfrm>
             <a:off x="3458816" y="1626929"/>
-            <a:ext cx="1363907" cy="1755500"/>
+            <a:ext cx="1363907" cy="1577665"/>
           </a:xfrm>
           <a:prstGeom prst="straightConnector1">
             <a:avLst/>
@@ -5694,14 +5876,13 @@
           <p:cNvCxnSpPr>
             <a:cxnSpLocks/>
             <a:stCxn id="6" idx="6"/>
-            <a:endCxn id="7" idx="1"/>
           </p:cNvCxnSpPr>
           <p:nvPr/>
         </p:nvCxnSpPr>
         <p:spPr>
           <a:xfrm flipV="1">
-            <a:off x="3485320" y="3382429"/>
-            <a:ext cx="1337403" cy="2088447"/>
+            <a:off x="3485320" y="3573710"/>
+            <a:ext cx="1337403" cy="1897166"/>
           </a:xfrm>
           <a:prstGeom prst="straightConnector1">
             <a:avLst/>
@@ -6829,7 +7010,7 @@
         </p:nvSpPr>
         <p:spPr>
           <a:xfrm>
-            <a:off x="838200" y="365126"/>
+            <a:off x="862766" y="365696"/>
             <a:ext cx="10515600" cy="840822"/>
           </a:xfrm>
         </p:spPr>
@@ -6842,1638 +7023,159 @@
             <a:pPr algn="ctr"/>
             <a:r>
               <a:rPr lang="en-US" dirty="0"/>
-              <a:t>Strategy Architecture</a:t>
-            </a:r>
-          </a:p>
-        </p:txBody>
-      </p:sp>
-      <p:sp>
-        <p:nvSpPr>
-          <p:cNvPr id="5" name="Rectangle: Rounded Corners 4">
-            <a:extLst>
-              <a:ext uri="{FF2B5EF4-FFF2-40B4-BE49-F238E27FC236}">
-                <a16:creationId xmlns:a16="http://schemas.microsoft.com/office/drawing/2014/main" id="{A81E8A88-9CA3-4F0F-9F5F-22C52FF97089}"/>
-              </a:ext>
-            </a:extLst>
-          </p:cNvPr>
-          <p:cNvSpPr/>
-          <p:nvPr/>
-        </p:nvSpPr>
-        <p:spPr>
-          <a:xfrm>
-            <a:off x="5270812" y="1804735"/>
-            <a:ext cx="1484243" cy="574583"/>
-          </a:xfrm>
-          <a:prstGeom prst="roundRect">
-            <a:avLst/>
-          </a:prstGeom>
-        </p:spPr>
-        <p:style>
-          <a:lnRef idx="2">
-            <a:schemeClr val="accent1">
-              <a:shade val="50000"/>
-            </a:schemeClr>
-          </a:lnRef>
-          <a:fillRef idx="1">
-            <a:schemeClr val="accent1"/>
-          </a:fillRef>
-          <a:effectRef idx="0">
-            <a:schemeClr val="accent1"/>
-          </a:effectRef>
-          <a:fontRef idx="minor">
-            <a:schemeClr val="lt1"/>
-          </a:fontRef>
-        </p:style>
-        <p:txBody>
-          <a:bodyPr rtlCol="0" anchor="ctr"/>
-          <a:lstStyle/>
-          <a:p>
-            <a:pPr algn="ctr"/>
-            <a:r>
-              <a:rPr lang="en-US" sz="1600" dirty="0"/>
-              <a:t>Entry</a:t>
-            </a:r>
-          </a:p>
-        </p:txBody>
-      </p:sp>
-      <p:sp>
-        <p:nvSpPr>
-          <p:cNvPr id="24" name="Rectangle: Rounded Corners 23">
-            <a:extLst>
-              <a:ext uri="{FF2B5EF4-FFF2-40B4-BE49-F238E27FC236}">
-                <a16:creationId xmlns:a16="http://schemas.microsoft.com/office/drawing/2014/main" id="{5E22DE06-B620-438A-8B8E-67EA92684307}"/>
-              </a:ext>
-            </a:extLst>
-          </p:cNvPr>
-          <p:cNvSpPr/>
-          <p:nvPr/>
-        </p:nvSpPr>
-        <p:spPr>
-          <a:xfrm>
-            <a:off x="5270811" y="2565470"/>
-            <a:ext cx="1484243" cy="574583"/>
-          </a:xfrm>
-          <a:prstGeom prst="roundRect">
-            <a:avLst/>
-          </a:prstGeom>
-        </p:spPr>
-        <p:style>
-          <a:lnRef idx="2">
-            <a:schemeClr val="accent1">
-              <a:shade val="50000"/>
-            </a:schemeClr>
-          </a:lnRef>
-          <a:fillRef idx="1">
-            <a:schemeClr val="accent1"/>
-          </a:fillRef>
-          <a:effectRef idx="0">
-            <a:schemeClr val="accent1"/>
-          </a:effectRef>
-          <a:fontRef idx="minor">
-            <a:schemeClr val="lt1"/>
-          </a:fontRef>
-        </p:style>
-        <p:txBody>
-          <a:bodyPr rtlCol="0" anchor="ctr"/>
-          <a:lstStyle/>
-          <a:p>
-            <a:pPr algn="ctr"/>
-            <a:r>
-              <a:rPr lang="en-US" sz="1600" dirty="0" err="1"/>
-              <a:t>StopLoss</a:t>
-            </a:r>
-            <a:endParaRPr lang="en-US" sz="1600" dirty="0"/>
-          </a:p>
-        </p:txBody>
-      </p:sp>
-      <p:sp>
-        <p:nvSpPr>
-          <p:cNvPr id="28" name="Rectangle: Rounded Corners 27">
-            <a:extLst>
-              <a:ext uri="{FF2B5EF4-FFF2-40B4-BE49-F238E27FC236}">
-                <a16:creationId xmlns:a16="http://schemas.microsoft.com/office/drawing/2014/main" id="{90B09BA0-2F84-45BF-8283-A945C381DD3A}"/>
-              </a:ext>
-            </a:extLst>
-          </p:cNvPr>
-          <p:cNvSpPr/>
-          <p:nvPr/>
-        </p:nvSpPr>
-        <p:spPr>
-          <a:xfrm>
-            <a:off x="5270811" y="3335651"/>
-            <a:ext cx="1484243" cy="574583"/>
-          </a:xfrm>
-          <a:prstGeom prst="roundRect">
-            <a:avLst/>
-          </a:prstGeom>
-        </p:spPr>
-        <p:style>
-          <a:lnRef idx="2">
-            <a:schemeClr val="accent1">
-              <a:shade val="50000"/>
-            </a:schemeClr>
-          </a:lnRef>
-          <a:fillRef idx="1">
-            <a:schemeClr val="accent1"/>
-          </a:fillRef>
-          <a:effectRef idx="0">
-            <a:schemeClr val="accent1"/>
-          </a:effectRef>
-          <a:fontRef idx="minor">
-            <a:schemeClr val="lt1"/>
-          </a:fontRef>
-        </p:style>
-        <p:txBody>
-          <a:bodyPr rtlCol="0" anchor="ctr"/>
-          <a:lstStyle/>
-          <a:p>
-            <a:pPr algn="ctr"/>
-            <a:r>
-              <a:rPr lang="en-US" sz="1600" dirty="0" err="1"/>
-              <a:t>ProfitTarget</a:t>
-            </a:r>
-            <a:endParaRPr lang="en-US" sz="1600" dirty="0"/>
-          </a:p>
-        </p:txBody>
-      </p:sp>
-      <p:cxnSp>
-        <p:nvCxnSpPr>
-          <p:cNvPr id="33" name="Straight Arrow Connector 32">
-            <a:extLst>
-              <a:ext uri="{FF2B5EF4-FFF2-40B4-BE49-F238E27FC236}">
-                <a16:creationId xmlns:a16="http://schemas.microsoft.com/office/drawing/2014/main" id="{D9186CC4-C6B4-4206-BAA9-1FEAA38FE754}"/>
-              </a:ext>
-            </a:extLst>
-          </p:cNvPr>
-          <p:cNvCxnSpPr>
-            <a:cxnSpLocks/>
-            <a:stCxn id="37" idx="0"/>
-            <a:endCxn id="73" idx="4"/>
-          </p:cNvCxnSpPr>
-          <p:nvPr/>
-        </p:nvCxnSpPr>
-        <p:spPr>
-          <a:xfrm flipV="1">
-            <a:off x="1661573" y="2081211"/>
-            <a:ext cx="674441" cy="771503"/>
-          </a:xfrm>
-          <a:prstGeom prst="straightConnector1">
-            <a:avLst/>
-          </a:prstGeom>
-          <a:ln>
-            <a:headEnd type="triangle"/>
-            <a:tailEnd type="triangle"/>
-          </a:ln>
-        </p:spPr>
-        <p:style>
-          <a:lnRef idx="1">
-            <a:schemeClr val="accent1"/>
-          </a:lnRef>
-          <a:fillRef idx="0">
-            <a:schemeClr val="accent1"/>
-          </a:fillRef>
-          <a:effectRef idx="0">
-            <a:schemeClr val="accent1"/>
-          </a:effectRef>
-          <a:fontRef idx="minor">
-            <a:schemeClr val="tx1"/>
-          </a:fontRef>
-        </p:style>
-      </p:cxnSp>
-      <p:sp>
-        <p:nvSpPr>
-          <p:cNvPr id="36" name="TextBox 35">
-            <a:extLst>
-              <a:ext uri="{FF2B5EF4-FFF2-40B4-BE49-F238E27FC236}">
-                <a16:creationId xmlns:a16="http://schemas.microsoft.com/office/drawing/2014/main" id="{AD91650E-0A1B-43AC-ABF1-D7E3AF982AE2}"/>
-              </a:ext>
-            </a:extLst>
-          </p:cNvPr>
-          <p:cNvSpPr txBox="1"/>
-          <p:nvPr/>
-        </p:nvSpPr>
-        <p:spPr>
-          <a:xfrm>
-            <a:off x="5291111" y="1385942"/>
-            <a:ext cx="1463943" cy="369332"/>
-          </a:xfrm>
-          <a:prstGeom prst="rect">
-            <a:avLst/>
-          </a:prstGeom>
-          <a:noFill/>
-        </p:spPr>
-        <p:txBody>
-          <a:bodyPr wrap="square" rtlCol="0">
-            <a:spAutoFit/>
+              <a:t>Institute Subscription Mode – with </a:t>
+            </a:r>
+            <a:r>
+              <a:rPr lang="en-US" dirty="0" err="1"/>
+              <a:t>BackEnd</a:t>
+            </a:r>
+            <a:endParaRPr lang="en-US" dirty="0"/>
+          </a:p>
+        </p:txBody>
+      </p:sp>
+      <p:sp>
+        <p:nvSpPr>
+          <p:cNvPr id="38" name="Content Placeholder 2">
+            <a:extLst>
+              <a:ext uri="{FF2B5EF4-FFF2-40B4-BE49-F238E27FC236}">
+                <a16:creationId xmlns:a16="http://schemas.microsoft.com/office/drawing/2014/main" id="{C082DB50-4371-457F-86AA-01312932B633}"/>
+              </a:ext>
+            </a:extLst>
+          </p:cNvPr>
+          <p:cNvSpPr>
+            <a:spLocks noGrp="1"/>
+          </p:cNvSpPr>
+          <p:nvPr>
+            <p:ph idx="1"/>
+          </p:nvPr>
+        </p:nvSpPr>
+        <p:spPr>
+          <a:xfrm>
+            <a:off x="838200" y="1825625"/>
+            <a:ext cx="10515600" cy="4351338"/>
+          </a:xfrm>
+        </p:spPr>
+        <p:txBody>
+          <a:bodyPr>
+            <a:normAutofit lnSpcReduction="10000"/>
           </a:bodyPr>
           <a:lstStyle/>
           <a:p>
             <a:r>
+              <a:rPr lang="en-US" dirty="0"/>
+              <a:t>What does the </a:t>
+            </a:r>
+            <a:r>
               <a:rPr lang="en-US" dirty="0" err="1"/>
-              <a:t>TradeSignals</a:t>
-            </a:r>
+              <a:t>BackEnd</a:t>
+            </a:r>
+            <a:r>
+              <a:rPr lang="en-US" dirty="0"/>
+              <a:t> provide</a:t>
+            </a:r>
+          </a:p>
+          <a:p>
+            <a:pPr lvl="1"/>
+            <a:r>
+              <a:rPr lang="en-US" dirty="0"/>
+              <a:t>Command (Start, stop algo, </a:t>
+            </a:r>
+            <a:r>
+              <a:rPr lang="en-US" dirty="0" err="1"/>
+              <a:t>etc</a:t>
+            </a:r>
+            <a:r>
+              <a:rPr lang="en-US" dirty="0"/>
+              <a:t>)</a:t>
+            </a:r>
+          </a:p>
+          <a:p>
+            <a:pPr lvl="1"/>
+            <a:r>
+              <a:rPr lang="en-US" dirty="0" err="1"/>
+              <a:t>MarketContext</a:t>
+            </a:r>
+            <a:r>
+              <a:rPr lang="en-US" dirty="0"/>
+              <a:t> (Human input, or AI generated)</a:t>
+            </a:r>
+          </a:p>
+          <a:p>
+            <a:pPr lvl="1"/>
+            <a:r>
+              <a:rPr lang="en-US" dirty="0"/>
+              <a:t>Size (based on the probability of winning)</a:t>
+            </a:r>
+          </a:p>
+          <a:p>
+            <a:pPr lvl="1"/>
             <a:endParaRPr lang="en-US" dirty="0"/>
           </a:p>
-        </p:txBody>
-      </p:sp>
-      <p:sp>
-        <p:nvSpPr>
-          <p:cNvPr id="37" name="Rectangle: Rounded Corners 36">
-            <a:extLst>
-              <a:ext uri="{FF2B5EF4-FFF2-40B4-BE49-F238E27FC236}">
-                <a16:creationId xmlns:a16="http://schemas.microsoft.com/office/drawing/2014/main" id="{F9A1B19B-8D9C-43EA-93DD-2D9694F73BF8}"/>
-              </a:ext>
-            </a:extLst>
-          </p:cNvPr>
-          <p:cNvSpPr/>
-          <p:nvPr/>
-        </p:nvSpPr>
-        <p:spPr>
-          <a:xfrm>
-            <a:off x="1142261" y="2852714"/>
-            <a:ext cx="1038624" cy="704257"/>
-          </a:xfrm>
-          <a:prstGeom prst="roundRect">
-            <a:avLst/>
-          </a:prstGeom>
-          <a:solidFill>
-            <a:schemeClr val="accent6">
-              <a:lumMod val="75000"/>
-            </a:schemeClr>
-          </a:solidFill>
-        </p:spPr>
-        <p:style>
-          <a:lnRef idx="2">
-            <a:schemeClr val="accent1">
-              <a:shade val="50000"/>
-            </a:schemeClr>
-          </a:lnRef>
-          <a:fillRef idx="1">
-            <a:schemeClr val="accent1"/>
-          </a:fillRef>
-          <a:effectRef idx="0">
-            <a:schemeClr val="accent1"/>
-          </a:effectRef>
-          <a:fontRef idx="minor">
-            <a:schemeClr val="lt1"/>
-          </a:fontRef>
-        </p:style>
-        <p:txBody>
-          <a:bodyPr rtlCol="0" anchor="ctr"/>
-          <a:lstStyle/>
-          <a:p>
-            <a:pPr algn="ctr"/>
+          <a:p>
             <a:r>
               <a:rPr lang="en-US" dirty="0"/>
-              <a:t>Strategy</a:t>
-            </a:r>
-          </a:p>
-        </p:txBody>
-      </p:sp>
-      <p:sp>
-        <p:nvSpPr>
-          <p:cNvPr id="38" name="Rectangle: Rounded Corners 37">
-            <a:extLst>
-              <a:ext uri="{FF2B5EF4-FFF2-40B4-BE49-F238E27FC236}">
-                <a16:creationId xmlns:a16="http://schemas.microsoft.com/office/drawing/2014/main" id="{F12A870A-76A9-4C8D-BCB7-7344F277CFD7}"/>
-              </a:ext>
-            </a:extLst>
-          </p:cNvPr>
-          <p:cNvSpPr/>
-          <p:nvPr/>
-        </p:nvSpPr>
-        <p:spPr>
-          <a:xfrm>
-            <a:off x="2784446" y="2844325"/>
-            <a:ext cx="1470991" cy="714620"/>
-          </a:xfrm>
-          <a:prstGeom prst="roundRect">
-            <a:avLst/>
-          </a:prstGeom>
-        </p:spPr>
-        <p:style>
-          <a:lnRef idx="2">
-            <a:schemeClr val="accent1">
-              <a:shade val="50000"/>
-            </a:schemeClr>
-          </a:lnRef>
-          <a:fillRef idx="1">
-            <a:schemeClr val="accent1"/>
-          </a:fillRef>
-          <a:effectRef idx="0">
-            <a:schemeClr val="accent1"/>
-          </a:effectRef>
-          <a:fontRef idx="minor">
-            <a:schemeClr val="lt1"/>
-          </a:fontRef>
-        </p:style>
-        <p:txBody>
-          <a:bodyPr rtlCol="0" anchor="ctr"/>
-          <a:lstStyle/>
-          <a:p>
-            <a:pPr algn="ctr"/>
-            <a:r>
-              <a:rPr lang="en-US" sz="1600" dirty="0" err="1"/>
-              <a:t>TradeAction</a:t>
-            </a:r>
-            <a:endParaRPr lang="en-US" sz="1600" dirty="0"/>
-          </a:p>
-        </p:txBody>
-      </p:sp>
-      <p:sp>
-        <p:nvSpPr>
-          <p:cNvPr id="49" name="Rectangle: Rounded Corners 48">
-            <a:extLst>
-              <a:ext uri="{FF2B5EF4-FFF2-40B4-BE49-F238E27FC236}">
-                <a16:creationId xmlns:a16="http://schemas.microsoft.com/office/drawing/2014/main" id="{8C0FC3C5-206D-4CE7-870B-3DF288C040BC}"/>
-              </a:ext>
-            </a:extLst>
-          </p:cNvPr>
-          <p:cNvSpPr/>
-          <p:nvPr/>
-        </p:nvSpPr>
-        <p:spPr>
-          <a:xfrm>
-            <a:off x="10172471" y="4462392"/>
-            <a:ext cx="1484243" cy="574583"/>
-          </a:xfrm>
-          <a:prstGeom prst="roundRect">
-            <a:avLst/>
-          </a:prstGeom>
-        </p:spPr>
-        <p:style>
-          <a:lnRef idx="2">
-            <a:schemeClr val="accent1">
-              <a:shade val="50000"/>
-            </a:schemeClr>
-          </a:lnRef>
-          <a:fillRef idx="1">
-            <a:schemeClr val="accent1"/>
-          </a:fillRef>
-          <a:effectRef idx="0">
-            <a:schemeClr val="accent1"/>
-          </a:effectRef>
-          <a:fontRef idx="minor">
-            <a:schemeClr val="lt1"/>
-          </a:fontRef>
-        </p:style>
-        <p:txBody>
-          <a:bodyPr rtlCol="0" anchor="ctr"/>
-          <a:lstStyle/>
-          <a:p>
-            <a:pPr algn="ctr"/>
-            <a:r>
-              <a:rPr lang="en-US" sz="1600" dirty="0"/>
-              <a:t>Indicator</a:t>
-            </a:r>
-          </a:p>
-          <a:p>
-            <a:pPr algn="ctr"/>
-            <a:r>
-              <a:rPr lang="en-US" sz="1600" dirty="0"/>
-              <a:t>Signals</a:t>
-            </a:r>
-          </a:p>
-        </p:txBody>
-      </p:sp>
-      <p:sp>
-        <p:nvSpPr>
-          <p:cNvPr id="50" name="Rectangle: Rounded Corners 49">
-            <a:extLst>
-              <a:ext uri="{FF2B5EF4-FFF2-40B4-BE49-F238E27FC236}">
-                <a16:creationId xmlns:a16="http://schemas.microsoft.com/office/drawing/2014/main" id="{F2B0387B-A45F-48CD-A80B-5FA52C751288}"/>
-              </a:ext>
-            </a:extLst>
-          </p:cNvPr>
-          <p:cNvSpPr/>
-          <p:nvPr/>
-        </p:nvSpPr>
-        <p:spPr>
-          <a:xfrm>
-            <a:off x="10144763" y="2956884"/>
-            <a:ext cx="1484243" cy="574583"/>
-          </a:xfrm>
-          <a:prstGeom prst="roundRect">
-            <a:avLst/>
-          </a:prstGeom>
-        </p:spPr>
-        <p:style>
-          <a:lnRef idx="2">
-            <a:schemeClr val="accent1">
-              <a:shade val="50000"/>
-            </a:schemeClr>
-          </a:lnRef>
-          <a:fillRef idx="1">
-            <a:schemeClr val="accent1"/>
-          </a:fillRef>
-          <a:effectRef idx="0">
-            <a:schemeClr val="accent1"/>
-          </a:effectRef>
-          <a:fontRef idx="minor">
-            <a:schemeClr val="lt1"/>
-          </a:fontRef>
-        </p:style>
-        <p:txBody>
-          <a:bodyPr rtlCol="0" anchor="ctr"/>
-          <a:lstStyle/>
-          <a:p>
-            <a:pPr algn="ctr"/>
-            <a:r>
-              <a:rPr lang="en-US" sz="1600" dirty="0"/>
-              <a:t>Performance</a:t>
-            </a:r>
-          </a:p>
-          <a:p>
-            <a:pPr algn="ctr"/>
-            <a:r>
-              <a:rPr lang="en-US" sz="1600" dirty="0"/>
-              <a:t>/Rules</a:t>
-            </a:r>
-          </a:p>
-        </p:txBody>
-      </p:sp>
-      <p:sp>
-        <p:nvSpPr>
-          <p:cNvPr id="51" name="Rectangle: Rounded Corners 50">
-            <a:extLst>
-              <a:ext uri="{FF2B5EF4-FFF2-40B4-BE49-F238E27FC236}">
-                <a16:creationId xmlns:a16="http://schemas.microsoft.com/office/drawing/2014/main" id="{2A336638-7115-4FB9-ABD0-6B3E60D52610}"/>
-              </a:ext>
-            </a:extLst>
-          </p:cNvPr>
-          <p:cNvSpPr/>
-          <p:nvPr/>
-        </p:nvSpPr>
-        <p:spPr>
-          <a:xfrm>
-            <a:off x="10125110" y="1496698"/>
-            <a:ext cx="1484243" cy="574583"/>
-          </a:xfrm>
-          <a:prstGeom prst="roundRect">
-            <a:avLst/>
-          </a:prstGeom>
-        </p:spPr>
-        <p:style>
-          <a:lnRef idx="2">
-            <a:schemeClr val="accent1">
-              <a:shade val="50000"/>
-            </a:schemeClr>
-          </a:lnRef>
-          <a:fillRef idx="1">
-            <a:schemeClr val="accent1"/>
-          </a:fillRef>
-          <a:effectRef idx="0">
-            <a:schemeClr val="accent1"/>
-          </a:effectRef>
-          <a:fontRef idx="minor">
-            <a:schemeClr val="lt1"/>
-          </a:fontRef>
-        </p:style>
-        <p:txBody>
-          <a:bodyPr rtlCol="0" anchor="ctr"/>
-          <a:lstStyle/>
-          <a:p>
-            <a:pPr algn="ctr"/>
-            <a:r>
-              <a:rPr lang="en-US" sz="1600" dirty="0"/>
-              <a:t>Commands</a:t>
-            </a:r>
-          </a:p>
-        </p:txBody>
-      </p:sp>
-      <p:sp>
-        <p:nvSpPr>
-          <p:cNvPr id="58" name="Rectangle: Rounded Corners 57">
-            <a:extLst>
-              <a:ext uri="{FF2B5EF4-FFF2-40B4-BE49-F238E27FC236}">
-                <a16:creationId xmlns:a16="http://schemas.microsoft.com/office/drawing/2014/main" id="{AB26037D-154E-4FC3-ADB4-02B15E176F56}"/>
-              </a:ext>
-            </a:extLst>
-          </p:cNvPr>
-          <p:cNvSpPr/>
-          <p:nvPr/>
-        </p:nvSpPr>
-        <p:spPr>
-          <a:xfrm>
-            <a:off x="5270811" y="4133543"/>
-            <a:ext cx="1484243" cy="574583"/>
-          </a:xfrm>
-          <a:prstGeom prst="roundRect">
-            <a:avLst/>
-          </a:prstGeom>
-        </p:spPr>
-        <p:style>
-          <a:lnRef idx="2">
-            <a:schemeClr val="accent1">
-              <a:shade val="50000"/>
-            </a:schemeClr>
-          </a:lnRef>
-          <a:fillRef idx="1">
-            <a:schemeClr val="accent1"/>
-          </a:fillRef>
-          <a:effectRef idx="0">
-            <a:schemeClr val="accent1"/>
-          </a:effectRef>
-          <a:fontRef idx="minor">
-            <a:schemeClr val="lt1"/>
-          </a:fontRef>
-        </p:style>
-        <p:txBody>
-          <a:bodyPr rtlCol="0" anchor="ctr"/>
-          <a:lstStyle/>
-          <a:p>
-            <a:pPr algn="ctr"/>
-            <a:r>
-              <a:rPr lang="en-US" sz="1600" dirty="0"/>
-              <a:t>Liquidate</a:t>
-            </a:r>
-          </a:p>
-        </p:txBody>
-      </p:sp>
-      <p:sp>
-        <p:nvSpPr>
-          <p:cNvPr id="59" name="Rectangle: Rounded Corners 58">
-            <a:extLst>
-              <a:ext uri="{FF2B5EF4-FFF2-40B4-BE49-F238E27FC236}">
-                <a16:creationId xmlns:a16="http://schemas.microsoft.com/office/drawing/2014/main" id="{34410B82-90F6-4AFA-970A-452D6DE7607D}"/>
-              </a:ext>
-            </a:extLst>
-          </p:cNvPr>
-          <p:cNvSpPr/>
-          <p:nvPr/>
-        </p:nvSpPr>
-        <p:spPr>
-          <a:xfrm>
-            <a:off x="5270811" y="5742165"/>
-            <a:ext cx="1484243" cy="574583"/>
-          </a:xfrm>
-          <a:prstGeom prst="roundRect">
-            <a:avLst/>
-          </a:prstGeom>
-        </p:spPr>
-        <p:style>
-          <a:lnRef idx="2">
-            <a:schemeClr val="accent1">
-              <a:shade val="50000"/>
-            </a:schemeClr>
-          </a:lnRef>
-          <a:fillRef idx="1">
-            <a:schemeClr val="accent1"/>
-          </a:fillRef>
-          <a:effectRef idx="0">
-            <a:schemeClr val="accent1"/>
-          </a:effectRef>
-          <a:fontRef idx="minor">
-            <a:schemeClr val="lt1"/>
-          </a:fontRef>
-        </p:style>
-        <p:txBody>
-          <a:bodyPr rtlCol="0" anchor="ctr"/>
-          <a:lstStyle/>
-          <a:p>
-            <a:pPr algn="ctr"/>
-            <a:r>
-              <a:rPr lang="en-US" sz="1600" dirty="0"/>
-              <a:t>Terminate</a:t>
-            </a:r>
-          </a:p>
-        </p:txBody>
-      </p:sp>
-      <p:sp>
-        <p:nvSpPr>
-          <p:cNvPr id="71" name="Oval 70">
-            <a:extLst>
-              <a:ext uri="{FF2B5EF4-FFF2-40B4-BE49-F238E27FC236}">
-                <a16:creationId xmlns:a16="http://schemas.microsoft.com/office/drawing/2014/main" id="{C5891883-CD3C-4315-A48C-F319442C38AE}"/>
-              </a:ext>
-            </a:extLst>
-          </p:cNvPr>
-          <p:cNvSpPr/>
-          <p:nvPr/>
-        </p:nvSpPr>
-        <p:spPr>
-          <a:xfrm>
-            <a:off x="188553" y="4097042"/>
-            <a:ext cx="1315736" cy="820669"/>
-          </a:xfrm>
-          <a:prstGeom prst="ellipse">
-            <a:avLst/>
-          </a:prstGeom>
-        </p:spPr>
-        <p:style>
-          <a:lnRef idx="2">
-            <a:schemeClr val="accent1">
-              <a:shade val="50000"/>
-            </a:schemeClr>
-          </a:lnRef>
-          <a:fillRef idx="1">
-            <a:schemeClr val="accent1"/>
-          </a:fillRef>
-          <a:effectRef idx="0">
-            <a:schemeClr val="accent1"/>
-          </a:effectRef>
-          <a:fontRef idx="minor">
-            <a:schemeClr val="lt1"/>
-          </a:fontRef>
-        </p:style>
-        <p:txBody>
-          <a:bodyPr rtlCol="0" anchor="ctr"/>
-          <a:lstStyle/>
-          <a:p>
-            <a:pPr algn="ctr"/>
-            <a:r>
-              <a:rPr lang="en-US" sz="1600" dirty="0"/>
-              <a:t>Position</a:t>
-            </a:r>
-          </a:p>
-          <a:p>
-            <a:pPr algn="ctr"/>
-            <a:r>
-              <a:rPr lang="en-US" sz="1600" dirty="0" err="1"/>
-              <a:t>Mgmt</a:t>
-            </a:r>
-            <a:endParaRPr lang="en-US" sz="1600" dirty="0"/>
-          </a:p>
-        </p:txBody>
-      </p:sp>
-      <p:sp>
-        <p:nvSpPr>
-          <p:cNvPr id="72" name="Oval 71">
-            <a:extLst>
-              <a:ext uri="{FF2B5EF4-FFF2-40B4-BE49-F238E27FC236}">
-                <a16:creationId xmlns:a16="http://schemas.microsoft.com/office/drawing/2014/main" id="{3B452BEB-4F9D-4624-A2E7-8275E9A0CDC6}"/>
-              </a:ext>
-            </a:extLst>
-          </p:cNvPr>
-          <p:cNvSpPr/>
-          <p:nvPr/>
-        </p:nvSpPr>
-        <p:spPr>
-          <a:xfrm>
-            <a:off x="286023" y="1302806"/>
-            <a:ext cx="1166430" cy="769689"/>
-          </a:xfrm>
-          <a:prstGeom prst="ellipse">
-            <a:avLst/>
-          </a:prstGeom>
-        </p:spPr>
-        <p:style>
-          <a:lnRef idx="2">
-            <a:schemeClr val="accent1">
-              <a:shade val="50000"/>
-            </a:schemeClr>
-          </a:lnRef>
-          <a:fillRef idx="1">
-            <a:schemeClr val="accent1"/>
-          </a:fillRef>
-          <a:effectRef idx="0">
-            <a:schemeClr val="accent1"/>
-          </a:effectRef>
-          <a:fontRef idx="minor">
-            <a:schemeClr val="lt1"/>
-          </a:fontRef>
-        </p:style>
-        <p:txBody>
-          <a:bodyPr rtlCol="0" anchor="ctr"/>
-          <a:lstStyle/>
-          <a:p>
-            <a:pPr algn="ctr"/>
-            <a:r>
-              <a:rPr lang="en-US" sz="1600" dirty="0"/>
-              <a:t>Money </a:t>
-            </a:r>
-            <a:r>
-              <a:rPr lang="en-US" sz="1600" dirty="0" err="1"/>
-              <a:t>Mgmt</a:t>
-            </a:r>
-            <a:endParaRPr lang="en-US" sz="1600" dirty="0"/>
-          </a:p>
-        </p:txBody>
-      </p:sp>
-      <p:sp>
-        <p:nvSpPr>
-          <p:cNvPr id="73" name="Oval 72">
-            <a:extLst>
-              <a:ext uri="{FF2B5EF4-FFF2-40B4-BE49-F238E27FC236}">
-                <a16:creationId xmlns:a16="http://schemas.microsoft.com/office/drawing/2014/main" id="{185A0391-72E3-424E-A94D-CD83EF9E1F01}"/>
-              </a:ext>
-            </a:extLst>
-          </p:cNvPr>
-          <p:cNvSpPr/>
-          <p:nvPr/>
-        </p:nvSpPr>
-        <p:spPr>
-          <a:xfrm>
-            <a:off x="1816702" y="1293571"/>
-            <a:ext cx="1038624" cy="787640"/>
-          </a:xfrm>
-          <a:prstGeom prst="ellipse">
-            <a:avLst/>
-          </a:prstGeom>
-        </p:spPr>
-        <p:style>
-          <a:lnRef idx="2">
-            <a:schemeClr val="accent1">
-              <a:shade val="50000"/>
-            </a:schemeClr>
-          </a:lnRef>
-          <a:fillRef idx="1">
-            <a:schemeClr val="accent1"/>
-          </a:fillRef>
-          <a:effectRef idx="0">
-            <a:schemeClr val="accent1"/>
-          </a:effectRef>
-          <a:fontRef idx="minor">
-            <a:schemeClr val="lt1"/>
-          </a:fontRef>
-        </p:style>
-        <p:txBody>
-          <a:bodyPr rtlCol="0" anchor="ctr"/>
-          <a:lstStyle/>
-          <a:p>
-            <a:pPr algn="ctr"/>
-            <a:r>
-              <a:rPr lang="en-US" sz="1600" dirty="0"/>
-              <a:t>Trade</a:t>
-            </a:r>
-          </a:p>
-          <a:p>
-            <a:pPr algn="ctr"/>
-            <a:r>
-              <a:rPr lang="en-US" sz="1600" dirty="0" err="1"/>
-              <a:t>Mgmt</a:t>
-            </a:r>
-            <a:endParaRPr lang="en-US" sz="1600" dirty="0"/>
-          </a:p>
-        </p:txBody>
-      </p:sp>
-      <p:cxnSp>
-        <p:nvCxnSpPr>
-          <p:cNvPr id="75" name="Straight Arrow Connector 74">
-            <a:extLst>
-              <a:ext uri="{FF2B5EF4-FFF2-40B4-BE49-F238E27FC236}">
-                <a16:creationId xmlns:a16="http://schemas.microsoft.com/office/drawing/2014/main" id="{E3406A20-776B-47B6-90D3-EA75AB0CB0EA}"/>
-              </a:ext>
-            </a:extLst>
-          </p:cNvPr>
-          <p:cNvCxnSpPr>
-            <a:cxnSpLocks/>
-            <a:stCxn id="37" idx="2"/>
-            <a:endCxn id="71" idx="0"/>
-          </p:cNvCxnSpPr>
-          <p:nvPr/>
-        </p:nvCxnSpPr>
-        <p:spPr>
-          <a:xfrm flipH="1">
-            <a:off x="846421" y="3556971"/>
-            <a:ext cx="815152" cy="540071"/>
-          </a:xfrm>
-          <a:prstGeom prst="straightConnector1">
-            <a:avLst/>
-          </a:prstGeom>
-          <a:ln>
-            <a:headEnd type="triangle"/>
-            <a:tailEnd type="triangle"/>
-          </a:ln>
-        </p:spPr>
-        <p:style>
-          <a:lnRef idx="1">
-            <a:schemeClr val="accent1"/>
-          </a:lnRef>
-          <a:fillRef idx="0">
-            <a:schemeClr val="accent1"/>
-          </a:fillRef>
-          <a:effectRef idx="0">
-            <a:schemeClr val="accent1"/>
-          </a:effectRef>
-          <a:fontRef idx="minor">
-            <a:schemeClr val="tx1"/>
-          </a:fontRef>
-        </p:style>
-      </p:cxnSp>
-      <p:cxnSp>
-        <p:nvCxnSpPr>
-          <p:cNvPr id="76" name="Straight Arrow Connector 75">
-            <a:extLst>
-              <a:ext uri="{FF2B5EF4-FFF2-40B4-BE49-F238E27FC236}">
-                <a16:creationId xmlns:a16="http://schemas.microsoft.com/office/drawing/2014/main" id="{A8C3C29B-89B8-4D34-AD95-F658053D788F}"/>
-              </a:ext>
-            </a:extLst>
-          </p:cNvPr>
-          <p:cNvCxnSpPr>
-            <a:cxnSpLocks/>
-            <a:stCxn id="37" idx="0"/>
-            <a:endCxn id="72" idx="4"/>
-          </p:cNvCxnSpPr>
-          <p:nvPr/>
-        </p:nvCxnSpPr>
-        <p:spPr>
-          <a:xfrm flipH="1" flipV="1">
-            <a:off x="869238" y="2072495"/>
-            <a:ext cx="792335" cy="780219"/>
-          </a:xfrm>
-          <a:prstGeom prst="straightConnector1">
-            <a:avLst/>
-          </a:prstGeom>
-          <a:ln>
-            <a:headEnd type="triangle"/>
-            <a:tailEnd type="triangle"/>
-          </a:ln>
-        </p:spPr>
-        <p:style>
-          <a:lnRef idx="1">
-            <a:schemeClr val="accent1"/>
-          </a:lnRef>
-          <a:fillRef idx="0">
-            <a:schemeClr val="accent1"/>
-          </a:fillRef>
-          <a:effectRef idx="0">
-            <a:schemeClr val="accent1"/>
-          </a:effectRef>
-          <a:fontRef idx="minor">
-            <a:schemeClr val="tx1"/>
-          </a:fontRef>
-        </p:style>
-      </p:cxnSp>
-      <p:cxnSp>
-        <p:nvCxnSpPr>
-          <p:cNvPr id="77" name="Straight Arrow Connector 76">
-            <a:extLst>
-              <a:ext uri="{FF2B5EF4-FFF2-40B4-BE49-F238E27FC236}">
-                <a16:creationId xmlns:a16="http://schemas.microsoft.com/office/drawing/2014/main" id="{F4E2DAB9-B250-4E2C-85C0-FF56D58B01F1}"/>
-              </a:ext>
-            </a:extLst>
-          </p:cNvPr>
-          <p:cNvCxnSpPr>
-            <a:cxnSpLocks/>
-            <a:stCxn id="133" idx="0"/>
-            <a:endCxn id="37" idx="2"/>
-          </p:cNvCxnSpPr>
-          <p:nvPr/>
-        </p:nvCxnSpPr>
-        <p:spPr>
-          <a:xfrm flipH="1" flipV="1">
-            <a:off x="1661573" y="3556971"/>
-            <a:ext cx="1238856" cy="602341"/>
-          </a:xfrm>
-          <a:prstGeom prst="straightConnector1">
-            <a:avLst/>
-          </a:prstGeom>
-          <a:ln>
-            <a:headEnd type="triangle"/>
-            <a:tailEnd type="triangle"/>
-          </a:ln>
-        </p:spPr>
-        <p:style>
-          <a:lnRef idx="1">
-            <a:schemeClr val="accent1"/>
-          </a:lnRef>
-          <a:fillRef idx="0">
-            <a:schemeClr val="accent1"/>
-          </a:fillRef>
-          <a:effectRef idx="0">
-            <a:schemeClr val="accent1"/>
-          </a:effectRef>
-          <a:fontRef idx="minor">
-            <a:schemeClr val="tx1"/>
-          </a:fontRef>
-        </p:style>
-      </p:cxnSp>
-      <p:sp>
-        <p:nvSpPr>
-          <p:cNvPr id="92" name="Rectangle 91">
-            <a:extLst>
-              <a:ext uri="{FF2B5EF4-FFF2-40B4-BE49-F238E27FC236}">
-                <a16:creationId xmlns:a16="http://schemas.microsoft.com/office/drawing/2014/main" id="{76A6117F-792D-4F0B-93AA-32C82F89B02F}"/>
-              </a:ext>
-            </a:extLst>
-          </p:cNvPr>
-          <p:cNvSpPr/>
-          <p:nvPr/>
-        </p:nvSpPr>
-        <p:spPr>
-          <a:xfrm>
-            <a:off x="4891154" y="1308682"/>
-            <a:ext cx="2193141" cy="5184191"/>
-          </a:xfrm>
-          <a:prstGeom prst="rect">
-            <a:avLst/>
-          </a:prstGeom>
-          <a:noFill/>
-          <a:ln>
-            <a:solidFill>
-              <a:schemeClr val="accent1">
-                <a:shade val="50000"/>
-              </a:schemeClr>
-            </a:solidFill>
-            <a:prstDash val="dash"/>
-          </a:ln>
-        </p:spPr>
-        <p:style>
-          <a:lnRef idx="2">
-            <a:schemeClr val="accent1">
-              <a:shade val="50000"/>
-            </a:schemeClr>
-          </a:lnRef>
-          <a:fillRef idx="1">
-            <a:schemeClr val="accent1"/>
-          </a:fillRef>
-          <a:effectRef idx="0">
-            <a:schemeClr val="accent1"/>
-          </a:effectRef>
-          <a:fontRef idx="minor">
-            <a:schemeClr val="lt1"/>
-          </a:fontRef>
-        </p:style>
-        <p:txBody>
-          <a:bodyPr rtlCol="0" anchor="ctr"/>
-          <a:lstStyle/>
-          <a:p>
-            <a:pPr algn="ctr"/>
-            <a:endParaRPr lang="en-US"/>
-          </a:p>
-        </p:txBody>
-      </p:sp>
-      <p:sp>
-        <p:nvSpPr>
-          <p:cNvPr id="93" name="Rectangle: Rounded Corners 92">
-            <a:extLst>
-              <a:ext uri="{FF2B5EF4-FFF2-40B4-BE49-F238E27FC236}">
-                <a16:creationId xmlns:a16="http://schemas.microsoft.com/office/drawing/2014/main" id="{8DAA03FB-1A8F-45BA-97AE-4029A8AE266D}"/>
-              </a:ext>
-            </a:extLst>
-          </p:cNvPr>
-          <p:cNvSpPr/>
-          <p:nvPr/>
-        </p:nvSpPr>
-        <p:spPr>
-          <a:xfrm>
-            <a:off x="5291111" y="4961970"/>
-            <a:ext cx="1484243" cy="574583"/>
-          </a:xfrm>
-          <a:prstGeom prst="roundRect">
-            <a:avLst/>
-          </a:prstGeom>
-        </p:spPr>
-        <p:style>
-          <a:lnRef idx="2">
-            <a:schemeClr val="accent1">
-              <a:shade val="50000"/>
-            </a:schemeClr>
-          </a:lnRef>
-          <a:fillRef idx="1">
-            <a:schemeClr val="accent1"/>
-          </a:fillRef>
-          <a:effectRef idx="0">
-            <a:schemeClr val="accent1"/>
-          </a:effectRef>
-          <a:fontRef idx="minor">
-            <a:schemeClr val="lt1"/>
-          </a:fontRef>
-        </p:style>
-        <p:txBody>
-          <a:bodyPr rtlCol="0" anchor="ctr"/>
-          <a:lstStyle/>
-          <a:p>
-            <a:pPr algn="ctr"/>
-            <a:r>
-              <a:rPr lang="en-US" sz="1600" dirty="0" err="1"/>
-              <a:t>ExitOnly</a:t>
-            </a:r>
-            <a:endParaRPr lang="en-US" sz="1600" dirty="0"/>
-          </a:p>
-        </p:txBody>
-      </p:sp>
-      <p:sp>
-        <p:nvSpPr>
-          <p:cNvPr id="94" name="Arrow: Left 93">
-            <a:extLst>
-              <a:ext uri="{FF2B5EF4-FFF2-40B4-BE49-F238E27FC236}">
-                <a16:creationId xmlns:a16="http://schemas.microsoft.com/office/drawing/2014/main" id="{1DC0DD0F-32B9-4D26-9004-6B9D08BD607E}"/>
-              </a:ext>
-            </a:extLst>
-          </p:cNvPr>
-          <p:cNvSpPr/>
-          <p:nvPr/>
-        </p:nvSpPr>
-        <p:spPr>
-          <a:xfrm>
-            <a:off x="4255436" y="2973791"/>
-            <a:ext cx="635717" cy="482889"/>
-          </a:xfrm>
-          <a:prstGeom prst="leftArrow">
-            <a:avLst/>
-          </a:prstGeom>
-        </p:spPr>
-        <p:style>
-          <a:lnRef idx="2">
-            <a:schemeClr val="accent1">
-              <a:shade val="50000"/>
-            </a:schemeClr>
-          </a:lnRef>
-          <a:fillRef idx="1">
-            <a:schemeClr val="accent1"/>
-          </a:fillRef>
-          <a:effectRef idx="0">
-            <a:schemeClr val="accent1"/>
-          </a:effectRef>
-          <a:fontRef idx="minor">
-            <a:schemeClr val="lt1"/>
-          </a:fontRef>
-        </p:style>
-        <p:txBody>
-          <a:bodyPr rtlCol="0" anchor="ctr"/>
-          <a:lstStyle/>
-          <a:p>
-            <a:pPr algn="ctr"/>
-            <a:endParaRPr lang="en-US"/>
-          </a:p>
-        </p:txBody>
-      </p:sp>
-      <p:sp>
-        <p:nvSpPr>
-          <p:cNvPr id="95" name="Arrow: Left 94">
-            <a:extLst>
-              <a:ext uri="{FF2B5EF4-FFF2-40B4-BE49-F238E27FC236}">
-                <a16:creationId xmlns:a16="http://schemas.microsoft.com/office/drawing/2014/main" id="{4DC4B740-3767-473D-B977-C0CA4035EAF5}"/>
-              </a:ext>
-            </a:extLst>
-          </p:cNvPr>
-          <p:cNvSpPr/>
-          <p:nvPr/>
-        </p:nvSpPr>
-        <p:spPr>
-          <a:xfrm>
-            <a:off x="7084295" y="2992415"/>
-            <a:ext cx="647198" cy="474476"/>
-          </a:xfrm>
-          <a:prstGeom prst="leftArrow">
-            <a:avLst/>
-          </a:prstGeom>
-        </p:spPr>
-        <p:style>
-          <a:lnRef idx="2">
-            <a:schemeClr val="accent1">
-              <a:shade val="50000"/>
-            </a:schemeClr>
-          </a:lnRef>
-          <a:fillRef idx="1">
-            <a:schemeClr val="accent1"/>
-          </a:fillRef>
-          <a:effectRef idx="0">
-            <a:schemeClr val="accent1"/>
-          </a:effectRef>
-          <a:fontRef idx="minor">
-            <a:schemeClr val="lt1"/>
-          </a:fontRef>
-        </p:style>
-        <p:txBody>
-          <a:bodyPr rtlCol="0" anchor="ctr"/>
-          <a:lstStyle/>
-          <a:p>
-            <a:pPr algn="ctr"/>
-            <a:endParaRPr lang="en-US"/>
-          </a:p>
-        </p:txBody>
-      </p:sp>
-      <p:cxnSp>
-        <p:nvCxnSpPr>
-          <p:cNvPr id="96" name="Straight Arrow Connector 95">
-            <a:extLst>
-              <a:ext uri="{FF2B5EF4-FFF2-40B4-BE49-F238E27FC236}">
-                <a16:creationId xmlns:a16="http://schemas.microsoft.com/office/drawing/2014/main" id="{B93FB528-9078-4A1B-B186-D38AD705110A}"/>
-              </a:ext>
-            </a:extLst>
-          </p:cNvPr>
-          <p:cNvCxnSpPr>
-            <a:cxnSpLocks/>
-            <a:stCxn id="49" idx="1"/>
-            <a:endCxn id="106" idx="3"/>
-          </p:cNvCxnSpPr>
-          <p:nvPr/>
-        </p:nvCxnSpPr>
-        <p:spPr>
-          <a:xfrm flipH="1" flipV="1">
-            <a:off x="9202483" y="3219120"/>
-            <a:ext cx="969988" cy="1530564"/>
-          </a:xfrm>
-          <a:prstGeom prst="straightConnector1">
-            <a:avLst/>
-          </a:prstGeom>
-          <a:ln>
-            <a:tailEnd type="triangle"/>
-          </a:ln>
-        </p:spPr>
-        <p:style>
-          <a:lnRef idx="1">
-            <a:schemeClr val="accent1"/>
-          </a:lnRef>
-          <a:fillRef idx="0">
-            <a:schemeClr val="accent1"/>
-          </a:fillRef>
-          <a:effectRef idx="0">
-            <a:schemeClr val="accent1"/>
-          </a:effectRef>
-          <a:fontRef idx="minor">
-            <a:schemeClr val="tx1"/>
-          </a:fontRef>
-        </p:style>
-      </p:cxnSp>
-      <p:cxnSp>
-        <p:nvCxnSpPr>
-          <p:cNvPr id="97" name="Straight Arrow Connector 96">
-            <a:extLst>
-              <a:ext uri="{FF2B5EF4-FFF2-40B4-BE49-F238E27FC236}">
-                <a16:creationId xmlns:a16="http://schemas.microsoft.com/office/drawing/2014/main" id="{1CF4A800-7DB0-45B3-9E98-8305C592244F}"/>
-              </a:ext>
-            </a:extLst>
-          </p:cNvPr>
-          <p:cNvCxnSpPr>
-            <a:cxnSpLocks/>
-            <a:endCxn id="106" idx="3"/>
-          </p:cNvCxnSpPr>
-          <p:nvPr/>
-        </p:nvCxnSpPr>
-        <p:spPr>
-          <a:xfrm flipH="1" flipV="1">
-            <a:off x="9202483" y="3219120"/>
-            <a:ext cx="1096064" cy="29006"/>
-          </a:xfrm>
-          <a:prstGeom prst="straightConnector1">
-            <a:avLst/>
-          </a:prstGeom>
-          <a:ln>
-            <a:tailEnd type="triangle"/>
-          </a:ln>
-        </p:spPr>
-        <p:style>
-          <a:lnRef idx="1">
-            <a:schemeClr val="accent1"/>
-          </a:lnRef>
-          <a:fillRef idx="0">
-            <a:schemeClr val="accent1"/>
-          </a:fillRef>
-          <a:effectRef idx="0">
-            <a:schemeClr val="accent1"/>
-          </a:effectRef>
-          <a:fontRef idx="minor">
-            <a:schemeClr val="tx1"/>
-          </a:fontRef>
-        </p:style>
-      </p:cxnSp>
-      <p:cxnSp>
-        <p:nvCxnSpPr>
-          <p:cNvPr id="98" name="Straight Arrow Connector 97">
-            <a:extLst>
-              <a:ext uri="{FF2B5EF4-FFF2-40B4-BE49-F238E27FC236}">
-                <a16:creationId xmlns:a16="http://schemas.microsoft.com/office/drawing/2014/main" id="{23CEECF9-BC13-4D2F-A8C1-1382975CF76B}"/>
-              </a:ext>
-            </a:extLst>
-          </p:cNvPr>
-          <p:cNvCxnSpPr>
-            <a:cxnSpLocks/>
-            <a:stCxn id="51" idx="1"/>
-            <a:endCxn id="106" idx="3"/>
-          </p:cNvCxnSpPr>
-          <p:nvPr/>
-        </p:nvCxnSpPr>
-        <p:spPr>
-          <a:xfrm flipH="1">
-            <a:off x="9202483" y="1783990"/>
-            <a:ext cx="922627" cy="1435130"/>
-          </a:xfrm>
-          <a:prstGeom prst="straightConnector1">
-            <a:avLst/>
-          </a:prstGeom>
-          <a:ln>
-            <a:tailEnd type="triangle"/>
-          </a:ln>
-        </p:spPr>
-        <p:style>
-          <a:lnRef idx="1">
-            <a:schemeClr val="accent1"/>
-          </a:lnRef>
-          <a:fillRef idx="0">
-            <a:schemeClr val="accent1"/>
-          </a:fillRef>
-          <a:effectRef idx="0">
-            <a:schemeClr val="accent1"/>
-          </a:effectRef>
-          <a:fontRef idx="minor">
-            <a:schemeClr val="tx1"/>
-          </a:fontRef>
-        </p:style>
-      </p:cxnSp>
-      <p:sp>
-        <p:nvSpPr>
-          <p:cNvPr id="106" name="Diamond 105">
-            <a:extLst>
-              <a:ext uri="{FF2B5EF4-FFF2-40B4-BE49-F238E27FC236}">
-                <a16:creationId xmlns:a16="http://schemas.microsoft.com/office/drawing/2014/main" id="{711EA771-4913-4CFD-85D5-50B79A85DE4D}"/>
-              </a:ext>
-            </a:extLst>
-          </p:cNvPr>
-          <p:cNvSpPr/>
-          <p:nvPr/>
-        </p:nvSpPr>
-        <p:spPr>
-          <a:xfrm>
-            <a:off x="7718240" y="2862797"/>
-            <a:ext cx="1484243" cy="712646"/>
-          </a:xfrm>
-          <a:prstGeom prst="diamond">
-            <a:avLst/>
-          </a:prstGeom>
-        </p:spPr>
-        <p:style>
-          <a:lnRef idx="2">
-            <a:schemeClr val="accent1">
-              <a:shade val="50000"/>
-            </a:schemeClr>
-          </a:lnRef>
-          <a:fillRef idx="1">
-            <a:schemeClr val="accent1"/>
-          </a:fillRef>
-          <a:effectRef idx="0">
-            <a:schemeClr val="accent1"/>
-          </a:effectRef>
-          <a:fontRef idx="minor">
-            <a:schemeClr val="lt1"/>
-          </a:fontRef>
-        </p:style>
-        <p:txBody>
-          <a:bodyPr rtlCol="0" anchor="ctr"/>
-          <a:lstStyle/>
-          <a:p>
-            <a:pPr algn="ctr"/>
-            <a:r>
-              <a:rPr lang="en-US" sz="1600" dirty="0"/>
-              <a:t>Engine</a:t>
-            </a:r>
-          </a:p>
-        </p:txBody>
-      </p:sp>
-      <p:sp>
-        <p:nvSpPr>
-          <p:cNvPr id="124" name="Cloud 123">
-            <a:extLst>
-              <a:ext uri="{FF2B5EF4-FFF2-40B4-BE49-F238E27FC236}">
-                <a16:creationId xmlns:a16="http://schemas.microsoft.com/office/drawing/2014/main" id="{F209CF20-06C7-4B36-89FA-1EA6B820C810}"/>
-              </a:ext>
-            </a:extLst>
-          </p:cNvPr>
-          <p:cNvSpPr/>
-          <p:nvPr/>
-        </p:nvSpPr>
-        <p:spPr>
-          <a:xfrm>
-            <a:off x="1888278" y="5120890"/>
-            <a:ext cx="2377499" cy="827541"/>
-          </a:xfrm>
-          <a:prstGeom prst="cloud">
-            <a:avLst/>
-          </a:prstGeom>
-          <a:solidFill>
-            <a:schemeClr val="accent5">
-              <a:lumMod val="40000"/>
-              <a:lumOff val="60000"/>
-            </a:schemeClr>
-          </a:solidFill>
-        </p:spPr>
-        <p:style>
-          <a:lnRef idx="2">
-            <a:schemeClr val="accent1">
-              <a:shade val="50000"/>
-            </a:schemeClr>
-          </a:lnRef>
-          <a:fillRef idx="1">
-            <a:schemeClr val="accent1"/>
-          </a:fillRef>
-          <a:effectRef idx="0">
-            <a:schemeClr val="accent1"/>
-          </a:effectRef>
-          <a:fontRef idx="minor">
-            <a:schemeClr val="lt1"/>
-          </a:fontRef>
-        </p:style>
-        <p:txBody>
-          <a:bodyPr rtlCol="0" anchor="ctr"/>
-          <a:lstStyle/>
-          <a:p>
-            <a:pPr algn="ctr"/>
-            <a:r>
-              <a:rPr lang="en-US" dirty="0">
-                <a:solidFill>
-                  <a:schemeClr val="tx1">
-                    <a:lumMod val="75000"/>
-                    <a:lumOff val="25000"/>
-                  </a:schemeClr>
-                </a:solidFill>
-              </a:rPr>
-              <a:t>Internet/Web</a:t>
-            </a:r>
-          </a:p>
-        </p:txBody>
-      </p:sp>
-      <p:pic>
-        <p:nvPicPr>
-          <p:cNvPr id="126" name="Picture 125">
-            <a:extLst>
-              <a:ext uri="{FF2B5EF4-FFF2-40B4-BE49-F238E27FC236}">
-                <a16:creationId xmlns:a16="http://schemas.microsoft.com/office/drawing/2014/main" id="{D1A03DEF-8E49-401A-87D9-72B99CE03E90}"/>
-              </a:ext>
-            </a:extLst>
-          </p:cNvPr>
-          <p:cNvPicPr>
-            <a:picLocks noChangeAspect="1"/>
-          </p:cNvPicPr>
-          <p:nvPr/>
-        </p:nvPicPr>
-        <p:blipFill>
-          <a:blip r:embed="rId2"/>
-          <a:stretch>
-            <a:fillRect/>
-          </a:stretch>
-        </p:blipFill>
-        <p:spPr>
-          <a:xfrm>
-            <a:off x="582260" y="5156653"/>
-            <a:ext cx="506420" cy="765263"/>
-          </a:xfrm>
-          <a:prstGeom prst="rect">
-            <a:avLst/>
-          </a:prstGeom>
-        </p:spPr>
-      </p:pic>
-      <p:cxnSp>
-        <p:nvCxnSpPr>
-          <p:cNvPr id="127" name="Straight Arrow Connector 126">
-            <a:extLst>
-              <a:ext uri="{FF2B5EF4-FFF2-40B4-BE49-F238E27FC236}">
-                <a16:creationId xmlns:a16="http://schemas.microsoft.com/office/drawing/2014/main" id="{6986BC2D-5779-4C7F-8289-6AA8D11385C0}"/>
-              </a:ext>
-            </a:extLst>
-          </p:cNvPr>
-          <p:cNvCxnSpPr>
-            <a:cxnSpLocks/>
-            <a:stCxn id="124" idx="2"/>
-            <a:endCxn id="126" idx="3"/>
-          </p:cNvCxnSpPr>
-          <p:nvPr/>
-        </p:nvCxnSpPr>
-        <p:spPr>
-          <a:xfrm flipH="1">
-            <a:off x="1088680" y="5534661"/>
-            <a:ext cx="806973" cy="4624"/>
-          </a:xfrm>
-          <a:prstGeom prst="straightConnector1">
-            <a:avLst/>
-          </a:prstGeom>
-          <a:ln>
-            <a:headEnd type="triangle"/>
-            <a:tailEnd type="triangle"/>
-          </a:ln>
-        </p:spPr>
-        <p:style>
-          <a:lnRef idx="1">
-            <a:schemeClr val="accent1"/>
-          </a:lnRef>
-          <a:fillRef idx="0">
-            <a:schemeClr val="accent1"/>
-          </a:fillRef>
-          <a:effectRef idx="0">
-            <a:schemeClr val="accent1"/>
-          </a:effectRef>
-          <a:fontRef idx="minor">
-            <a:schemeClr val="tx1"/>
-          </a:fontRef>
-        </p:style>
-      </p:cxnSp>
-      <p:sp>
-        <p:nvSpPr>
-          <p:cNvPr id="133" name="Speech Bubble: Rectangle with Corners Rounded 132">
-            <a:extLst>
-              <a:ext uri="{FF2B5EF4-FFF2-40B4-BE49-F238E27FC236}">
-                <a16:creationId xmlns:a16="http://schemas.microsoft.com/office/drawing/2014/main" id="{626A27AA-B3A0-48B1-91C4-400740FA1A57}"/>
-              </a:ext>
-            </a:extLst>
-          </p:cNvPr>
-          <p:cNvSpPr/>
-          <p:nvPr/>
-        </p:nvSpPr>
-        <p:spPr>
-          <a:xfrm>
-            <a:off x="2014289" y="4159312"/>
-            <a:ext cx="1772279" cy="667355"/>
-          </a:xfrm>
-          <a:prstGeom prst="wedgeRoundRectCallout">
-            <a:avLst>
-              <a:gd name="adj1" fmla="val 11479"/>
-              <a:gd name="adj2" fmla="val 109557"/>
-              <a:gd name="adj3" fmla="val 16667"/>
-            </a:avLst>
-          </a:prstGeom>
-          <a:solidFill>
-            <a:schemeClr val="accent5">
-              <a:lumMod val="40000"/>
-              <a:lumOff val="60000"/>
-            </a:schemeClr>
-          </a:solidFill>
-        </p:spPr>
-        <p:style>
-          <a:lnRef idx="2">
-            <a:schemeClr val="accent1">
-              <a:shade val="50000"/>
-            </a:schemeClr>
-          </a:lnRef>
-          <a:fillRef idx="1">
-            <a:schemeClr val="accent1"/>
-          </a:fillRef>
-          <a:effectRef idx="0">
-            <a:schemeClr val="accent1"/>
-          </a:effectRef>
-          <a:fontRef idx="minor">
-            <a:schemeClr val="lt1"/>
-          </a:fontRef>
-        </p:style>
-        <p:txBody>
-          <a:bodyPr rtlCol="0" anchor="ctr"/>
-          <a:lstStyle/>
-          <a:p>
-            <a:pPr algn="ctr"/>
-            <a:r>
-              <a:rPr lang="en-US" sz="1400" dirty="0">
-                <a:solidFill>
-                  <a:schemeClr val="bg2">
-                    <a:lumMod val="25000"/>
-                  </a:schemeClr>
-                </a:solidFill>
-              </a:rPr>
-              <a:t>Input: Command</a:t>
-            </a:r>
-          </a:p>
-          <a:p>
-            <a:pPr algn="ctr"/>
-            <a:r>
-              <a:rPr lang="en-US" sz="1400" dirty="0">
-                <a:solidFill>
-                  <a:schemeClr val="bg2">
-                    <a:lumMod val="25000"/>
-                  </a:schemeClr>
-                </a:solidFill>
-              </a:rPr>
-              <a:t>Output: Report, Log</a:t>
-            </a:r>
-          </a:p>
-        </p:txBody>
-      </p:sp>
-      <p:sp>
-        <p:nvSpPr>
-          <p:cNvPr id="140" name="TextBox 139">
-            <a:extLst>
-              <a:ext uri="{FF2B5EF4-FFF2-40B4-BE49-F238E27FC236}">
-                <a16:creationId xmlns:a16="http://schemas.microsoft.com/office/drawing/2014/main" id="{C8DC5CC3-F945-4F58-820E-B84C75D88892}"/>
-              </a:ext>
-            </a:extLst>
-          </p:cNvPr>
-          <p:cNvSpPr txBox="1"/>
-          <p:nvPr/>
-        </p:nvSpPr>
-        <p:spPr>
-          <a:xfrm>
-            <a:off x="8136347" y="3596104"/>
-            <a:ext cx="1200600" cy="1169551"/>
-          </a:xfrm>
-          <a:prstGeom prst="rect">
-            <a:avLst/>
-          </a:prstGeom>
-          <a:noFill/>
-        </p:spPr>
-        <p:txBody>
-          <a:bodyPr wrap="square" rtlCol="0">
-            <a:spAutoFit/>
-          </a:bodyPr>
-          <a:lstStyle/>
-          <a:p>
-            <a:r>
-              <a:rPr lang="en-US" sz="1400" dirty="0"/>
-              <a:t>Signals</a:t>
-            </a:r>
-          </a:p>
-          <a:p>
-            <a:r>
-              <a:rPr lang="en-US" sz="1400" dirty="0"/>
-              <a:t>+ Commands</a:t>
-            </a:r>
-          </a:p>
-          <a:p>
-            <a:r>
-              <a:rPr lang="en-US" sz="1400" dirty="0"/>
-              <a:t>+ Events</a:t>
-            </a:r>
-          </a:p>
-          <a:p>
-            <a:r>
-              <a:rPr lang="en-US" sz="1400" dirty="0"/>
-              <a:t>Combined</a:t>
-            </a:r>
-          </a:p>
-          <a:p>
-            <a:endParaRPr lang="en-US" sz="1400" dirty="0"/>
-          </a:p>
-        </p:txBody>
-      </p:sp>
-      <p:sp>
-        <p:nvSpPr>
-          <p:cNvPr id="153" name="TextBox 152">
-            <a:extLst>
-              <a:ext uri="{FF2B5EF4-FFF2-40B4-BE49-F238E27FC236}">
-                <a16:creationId xmlns:a16="http://schemas.microsoft.com/office/drawing/2014/main" id="{39597590-315D-4F10-917A-46DBC6110138}"/>
-              </a:ext>
-            </a:extLst>
-          </p:cNvPr>
-          <p:cNvSpPr txBox="1"/>
-          <p:nvPr/>
-        </p:nvSpPr>
-        <p:spPr>
-          <a:xfrm>
-            <a:off x="412120" y="6020970"/>
-            <a:ext cx="1404582" cy="523220"/>
-          </a:xfrm>
-          <a:prstGeom prst="rect">
-            <a:avLst/>
-          </a:prstGeom>
-          <a:noFill/>
-        </p:spPr>
-        <p:txBody>
-          <a:bodyPr wrap="square" rtlCol="0">
-            <a:spAutoFit/>
-          </a:bodyPr>
-          <a:lstStyle/>
-          <a:p>
-            <a:r>
-              <a:rPr lang="en-US" sz="1400" dirty="0"/>
-              <a:t>Mobile, Laptop,</a:t>
-            </a:r>
-          </a:p>
-          <a:p>
-            <a:r>
-              <a:rPr lang="en-US" sz="1400" dirty="0"/>
-              <a:t>Desktop</a:t>
-            </a:r>
-          </a:p>
-        </p:txBody>
-      </p:sp>
-      <p:sp>
-        <p:nvSpPr>
-          <p:cNvPr id="39" name="Arrow: Left 38">
-            <a:extLst>
-              <a:ext uri="{FF2B5EF4-FFF2-40B4-BE49-F238E27FC236}">
-                <a16:creationId xmlns:a16="http://schemas.microsoft.com/office/drawing/2014/main" id="{062E1260-5E7F-4C81-A10C-2F3D50C8A1B1}"/>
-              </a:ext>
-            </a:extLst>
-          </p:cNvPr>
-          <p:cNvSpPr/>
-          <p:nvPr/>
-        </p:nvSpPr>
-        <p:spPr>
-          <a:xfrm>
-            <a:off x="2180885" y="2960190"/>
-            <a:ext cx="603561" cy="482889"/>
-          </a:xfrm>
-          <a:prstGeom prst="leftArrow">
-            <a:avLst/>
-          </a:prstGeom>
-        </p:spPr>
-        <p:style>
-          <a:lnRef idx="2">
-            <a:schemeClr val="accent1">
-              <a:shade val="50000"/>
-            </a:schemeClr>
-          </a:lnRef>
-          <a:fillRef idx="1">
-            <a:schemeClr val="accent1"/>
-          </a:fillRef>
-          <a:effectRef idx="0">
-            <a:schemeClr val="accent1"/>
-          </a:effectRef>
-          <a:fontRef idx="minor">
-            <a:schemeClr val="lt1"/>
-          </a:fontRef>
-        </p:style>
-        <p:txBody>
-          <a:bodyPr rtlCol="0" anchor="ctr"/>
-          <a:lstStyle/>
-          <a:p>
-            <a:pPr algn="ctr"/>
-            <a:endParaRPr lang="en-US"/>
+              <a:t>What does the </a:t>
+            </a:r>
+            <a:r>
+              <a:rPr lang="en-US" dirty="0" err="1"/>
+              <a:t>FrontEnd</a:t>
+            </a:r>
+            <a:r>
+              <a:rPr lang="en-US" dirty="0"/>
+              <a:t> provide</a:t>
+            </a:r>
+          </a:p>
+          <a:p>
+            <a:pPr lvl="1"/>
+            <a:r>
+              <a:rPr lang="en-US" dirty="0"/>
+              <a:t>Interpret the input from backend</a:t>
+            </a:r>
+          </a:p>
+          <a:p>
+            <a:pPr lvl="1"/>
+            <a:r>
+              <a:rPr lang="en-US" dirty="0"/>
+              <a:t>Indicators/signals to find entry/exit</a:t>
+            </a:r>
+          </a:p>
+          <a:p>
+            <a:pPr lvl="1"/>
+            <a:r>
+              <a:rPr lang="en-US" dirty="0"/>
+              <a:t>Generates trades by combining backend and frontend signals</a:t>
+            </a:r>
+          </a:p>
+          <a:p>
+            <a:pPr lvl="1"/>
+            <a:r>
+              <a:rPr lang="en-US" dirty="0"/>
+              <a:t>Execution</a:t>
+            </a:r>
+          </a:p>
+          <a:p>
+            <a:pPr lvl="1"/>
+            <a:r>
+              <a:rPr lang="en-US" dirty="0"/>
+              <a:t>Performance report</a:t>
+            </a:r>
+          </a:p>
+          <a:p>
+            <a:pPr marL="457200" lvl="1" indent="0">
+              <a:buNone/>
+            </a:pPr>
+            <a:endParaRPr lang="en-US" dirty="0"/>
+          </a:p>
+          <a:p>
+            <a:pPr lvl="1"/>
+            <a:endParaRPr lang="en-US" dirty="0"/>
           </a:p>
         </p:txBody>
       </p:sp>
     </p:spTree>
     <p:extLst>
       <p:ext uri="{BB962C8B-B14F-4D97-AF65-F5344CB8AC3E}">
-        <p14:creationId xmlns:p14="http://schemas.microsoft.com/office/powerpoint/2010/main" val="3234941050"/>
+        <p14:creationId xmlns:p14="http://schemas.microsoft.com/office/powerpoint/2010/main" val="2927064267"/>
       </p:ext>
     </p:extLst>
   </p:cSld>
@@ -8505,7 +7207,7 @@
           <p:cNvPr id="2" name="Title 1">
             <a:extLst>
               <a:ext uri="{FF2B5EF4-FFF2-40B4-BE49-F238E27FC236}">
-                <a16:creationId xmlns:a16="http://schemas.microsoft.com/office/drawing/2014/main" id="{51E6B5EF-4524-41AF-870A-9AAF367EBE40}"/>
+                <a16:creationId xmlns:a16="http://schemas.microsoft.com/office/drawing/2014/main" id="{BC3BA0E8-4F02-4B96-9391-1D4C0C07CFED}"/>
               </a:ext>
             </a:extLst>
           </p:cNvPr>
@@ -8516,88 +7218,1653 @@
             <p:ph type="title"/>
           </p:nvPr>
         </p:nvSpPr>
-        <p:spPr/>
-        <p:txBody>
-          <a:bodyPr/>
-          <a:lstStyle/>
-          <a:p>
+        <p:spPr>
+          <a:xfrm>
+            <a:off x="838200" y="365126"/>
+            <a:ext cx="10515600" cy="840822"/>
+          </a:xfrm>
+        </p:spPr>
+        <p:txBody>
+          <a:bodyPr>
+            <a:normAutofit/>
+          </a:bodyPr>
+          <a:lstStyle/>
+          <a:p>
+            <a:pPr algn="ctr"/>
             <a:r>
               <a:rPr lang="en-US" dirty="0"/>
-              <a:t>Business Model</a:t>
-            </a:r>
-          </a:p>
-        </p:txBody>
-      </p:sp>
-      <p:sp>
-        <p:nvSpPr>
-          <p:cNvPr id="3" name="Content Placeholder 2">
-            <a:extLst>
-              <a:ext uri="{FF2B5EF4-FFF2-40B4-BE49-F238E27FC236}">
-                <a16:creationId xmlns:a16="http://schemas.microsoft.com/office/drawing/2014/main" id="{A39BD6F0-C56E-4B2C-968E-9B9264235BEB}"/>
-              </a:ext>
-            </a:extLst>
-          </p:cNvPr>
-          <p:cNvSpPr>
-            <a:spLocks noGrp="1"/>
-          </p:cNvSpPr>
-          <p:nvPr>
-            <p:ph idx="1"/>
-          </p:nvPr>
-        </p:nvSpPr>
-        <p:spPr/>
-        <p:txBody>
-          <a:bodyPr/>
-          <a:lstStyle/>
-          <a:p>
+              <a:t>Strategy Architecture</a:t>
+            </a:r>
+          </a:p>
+        </p:txBody>
+      </p:sp>
+      <p:sp>
+        <p:nvSpPr>
+          <p:cNvPr id="5" name="Rectangle: Rounded Corners 4">
+            <a:extLst>
+              <a:ext uri="{FF2B5EF4-FFF2-40B4-BE49-F238E27FC236}">
+                <a16:creationId xmlns:a16="http://schemas.microsoft.com/office/drawing/2014/main" id="{A81E8A88-9CA3-4F0F-9F5F-22C52FF97089}"/>
+              </a:ext>
+            </a:extLst>
+          </p:cNvPr>
+          <p:cNvSpPr/>
+          <p:nvPr/>
+        </p:nvSpPr>
+        <p:spPr>
+          <a:xfrm>
+            <a:off x="5270812" y="1804735"/>
+            <a:ext cx="1484243" cy="574583"/>
+          </a:xfrm>
+          <a:prstGeom prst="roundRect">
+            <a:avLst/>
+          </a:prstGeom>
+        </p:spPr>
+        <p:style>
+          <a:lnRef idx="2">
+            <a:schemeClr val="accent1">
+              <a:shade val="50000"/>
+            </a:schemeClr>
+          </a:lnRef>
+          <a:fillRef idx="1">
+            <a:schemeClr val="accent1"/>
+          </a:fillRef>
+          <a:effectRef idx="0">
+            <a:schemeClr val="accent1"/>
+          </a:effectRef>
+          <a:fontRef idx="minor">
+            <a:schemeClr val="lt1"/>
+          </a:fontRef>
+        </p:style>
+        <p:txBody>
+          <a:bodyPr rtlCol="0" anchor="ctr"/>
+          <a:lstStyle/>
+          <a:p>
+            <a:pPr algn="ctr"/>
+            <a:r>
+              <a:rPr lang="en-US" sz="1600" dirty="0"/>
+              <a:t>Entry</a:t>
+            </a:r>
+          </a:p>
+        </p:txBody>
+      </p:sp>
+      <p:sp>
+        <p:nvSpPr>
+          <p:cNvPr id="24" name="Rectangle: Rounded Corners 23">
+            <a:extLst>
+              <a:ext uri="{FF2B5EF4-FFF2-40B4-BE49-F238E27FC236}">
+                <a16:creationId xmlns:a16="http://schemas.microsoft.com/office/drawing/2014/main" id="{5E22DE06-B620-438A-8B8E-67EA92684307}"/>
+              </a:ext>
+            </a:extLst>
+          </p:cNvPr>
+          <p:cNvSpPr/>
+          <p:nvPr/>
+        </p:nvSpPr>
+        <p:spPr>
+          <a:xfrm>
+            <a:off x="5270811" y="2565470"/>
+            <a:ext cx="1484243" cy="574583"/>
+          </a:xfrm>
+          <a:prstGeom prst="roundRect">
+            <a:avLst/>
+          </a:prstGeom>
+        </p:spPr>
+        <p:style>
+          <a:lnRef idx="2">
+            <a:schemeClr val="accent1">
+              <a:shade val="50000"/>
+            </a:schemeClr>
+          </a:lnRef>
+          <a:fillRef idx="1">
+            <a:schemeClr val="accent1"/>
+          </a:fillRef>
+          <a:effectRef idx="0">
+            <a:schemeClr val="accent1"/>
+          </a:effectRef>
+          <a:fontRef idx="minor">
+            <a:schemeClr val="lt1"/>
+          </a:fontRef>
+        </p:style>
+        <p:txBody>
+          <a:bodyPr rtlCol="0" anchor="ctr"/>
+          <a:lstStyle/>
+          <a:p>
+            <a:pPr algn="ctr"/>
+            <a:r>
+              <a:rPr lang="en-US" sz="1600" dirty="0" err="1"/>
+              <a:t>StopLoss</a:t>
+            </a:r>
+            <a:endParaRPr lang="en-US" sz="1600" dirty="0"/>
+          </a:p>
+        </p:txBody>
+      </p:sp>
+      <p:sp>
+        <p:nvSpPr>
+          <p:cNvPr id="28" name="Rectangle: Rounded Corners 27">
+            <a:extLst>
+              <a:ext uri="{FF2B5EF4-FFF2-40B4-BE49-F238E27FC236}">
+                <a16:creationId xmlns:a16="http://schemas.microsoft.com/office/drawing/2014/main" id="{90B09BA0-2F84-45BF-8283-A945C381DD3A}"/>
+              </a:ext>
+            </a:extLst>
+          </p:cNvPr>
+          <p:cNvSpPr/>
+          <p:nvPr/>
+        </p:nvSpPr>
+        <p:spPr>
+          <a:xfrm>
+            <a:off x="5270811" y="3335651"/>
+            <a:ext cx="1484243" cy="574583"/>
+          </a:xfrm>
+          <a:prstGeom prst="roundRect">
+            <a:avLst/>
+          </a:prstGeom>
+        </p:spPr>
+        <p:style>
+          <a:lnRef idx="2">
+            <a:schemeClr val="accent1">
+              <a:shade val="50000"/>
+            </a:schemeClr>
+          </a:lnRef>
+          <a:fillRef idx="1">
+            <a:schemeClr val="accent1"/>
+          </a:fillRef>
+          <a:effectRef idx="0">
+            <a:schemeClr val="accent1"/>
+          </a:effectRef>
+          <a:fontRef idx="minor">
+            <a:schemeClr val="lt1"/>
+          </a:fontRef>
+        </p:style>
+        <p:txBody>
+          <a:bodyPr rtlCol="0" anchor="ctr"/>
+          <a:lstStyle/>
+          <a:p>
+            <a:pPr algn="ctr"/>
+            <a:r>
+              <a:rPr lang="en-US" sz="1600" dirty="0" err="1"/>
+              <a:t>ProfitTarget</a:t>
+            </a:r>
+            <a:endParaRPr lang="en-US" sz="1600" dirty="0"/>
+          </a:p>
+        </p:txBody>
+      </p:sp>
+      <p:cxnSp>
+        <p:nvCxnSpPr>
+          <p:cNvPr id="33" name="Straight Arrow Connector 32">
+            <a:extLst>
+              <a:ext uri="{FF2B5EF4-FFF2-40B4-BE49-F238E27FC236}">
+                <a16:creationId xmlns:a16="http://schemas.microsoft.com/office/drawing/2014/main" id="{D9186CC4-C6B4-4206-BAA9-1FEAA38FE754}"/>
+              </a:ext>
+            </a:extLst>
+          </p:cNvPr>
+          <p:cNvCxnSpPr>
+            <a:cxnSpLocks/>
+            <a:stCxn id="37" idx="0"/>
+            <a:endCxn id="73" idx="4"/>
+          </p:cNvCxnSpPr>
+          <p:nvPr/>
+        </p:nvCxnSpPr>
+        <p:spPr>
+          <a:xfrm flipV="1">
+            <a:off x="1661573" y="2081211"/>
+            <a:ext cx="674441" cy="771503"/>
+          </a:xfrm>
+          <a:prstGeom prst="straightConnector1">
+            <a:avLst/>
+          </a:prstGeom>
+          <a:ln>
+            <a:headEnd type="triangle"/>
+            <a:tailEnd type="triangle"/>
+          </a:ln>
+        </p:spPr>
+        <p:style>
+          <a:lnRef idx="1">
+            <a:schemeClr val="accent1"/>
+          </a:lnRef>
+          <a:fillRef idx="0">
+            <a:schemeClr val="accent1"/>
+          </a:fillRef>
+          <a:effectRef idx="0">
+            <a:schemeClr val="accent1"/>
+          </a:effectRef>
+          <a:fontRef idx="minor">
+            <a:schemeClr val="tx1"/>
+          </a:fontRef>
+        </p:style>
+      </p:cxnSp>
+      <p:sp>
+        <p:nvSpPr>
+          <p:cNvPr id="36" name="TextBox 35">
+            <a:extLst>
+              <a:ext uri="{FF2B5EF4-FFF2-40B4-BE49-F238E27FC236}">
+                <a16:creationId xmlns:a16="http://schemas.microsoft.com/office/drawing/2014/main" id="{AD91650E-0A1B-43AC-ABF1-D7E3AF982AE2}"/>
+              </a:ext>
+            </a:extLst>
+          </p:cNvPr>
+          <p:cNvSpPr txBox="1"/>
+          <p:nvPr/>
+        </p:nvSpPr>
+        <p:spPr>
+          <a:xfrm>
+            <a:off x="5291111" y="1385942"/>
+            <a:ext cx="1463943" cy="369332"/>
+          </a:xfrm>
+          <a:prstGeom prst="rect">
+            <a:avLst/>
+          </a:prstGeom>
+          <a:noFill/>
+        </p:spPr>
+        <p:txBody>
+          <a:bodyPr wrap="square" rtlCol="0">
+            <a:spAutoFit/>
+          </a:bodyPr>
+          <a:lstStyle/>
+          <a:p>
+            <a:r>
+              <a:rPr lang="en-US" dirty="0" err="1"/>
+              <a:t>TradeSignals</a:t>
+            </a:r>
+            <a:endParaRPr lang="en-US" dirty="0"/>
+          </a:p>
+        </p:txBody>
+      </p:sp>
+      <p:sp>
+        <p:nvSpPr>
+          <p:cNvPr id="37" name="Rectangle: Rounded Corners 36">
+            <a:extLst>
+              <a:ext uri="{FF2B5EF4-FFF2-40B4-BE49-F238E27FC236}">
+                <a16:creationId xmlns:a16="http://schemas.microsoft.com/office/drawing/2014/main" id="{F9A1B19B-8D9C-43EA-93DD-2D9694F73BF8}"/>
+              </a:ext>
+            </a:extLst>
+          </p:cNvPr>
+          <p:cNvSpPr/>
+          <p:nvPr/>
+        </p:nvSpPr>
+        <p:spPr>
+          <a:xfrm>
+            <a:off x="1142261" y="2852714"/>
+            <a:ext cx="1038624" cy="704257"/>
+          </a:xfrm>
+          <a:prstGeom prst="roundRect">
+            <a:avLst/>
+          </a:prstGeom>
+          <a:solidFill>
+            <a:schemeClr val="accent6">
+              <a:lumMod val="75000"/>
+            </a:schemeClr>
+          </a:solidFill>
+        </p:spPr>
+        <p:style>
+          <a:lnRef idx="2">
+            <a:schemeClr val="accent1">
+              <a:shade val="50000"/>
+            </a:schemeClr>
+          </a:lnRef>
+          <a:fillRef idx="1">
+            <a:schemeClr val="accent1"/>
+          </a:fillRef>
+          <a:effectRef idx="0">
+            <a:schemeClr val="accent1"/>
+          </a:effectRef>
+          <a:fontRef idx="minor">
+            <a:schemeClr val="lt1"/>
+          </a:fontRef>
+        </p:style>
+        <p:txBody>
+          <a:bodyPr rtlCol="0" anchor="ctr"/>
+          <a:lstStyle/>
+          <a:p>
+            <a:pPr algn="ctr"/>
             <a:r>
               <a:rPr lang="en-US" dirty="0"/>
-              <a:t>Background</a:t>
-            </a:r>
-          </a:p>
-          <a:p>
-            <a:r>
-              <a:rPr lang="en-US" dirty="0"/>
-              <a:t>Target Customers</a:t>
-            </a:r>
-          </a:p>
-          <a:p>
-            <a:pPr lvl="1"/>
-            <a:r>
-              <a:rPr lang="en-US" dirty="0"/>
-              <a:t>Retail Traders</a:t>
-            </a:r>
-          </a:p>
-          <a:p>
-            <a:pPr lvl="1"/>
-            <a:r>
-              <a:rPr lang="en-US" dirty="0"/>
-              <a:t>Institute</a:t>
-            </a:r>
-          </a:p>
-          <a:p>
-            <a:r>
-              <a:rPr lang="en-US" dirty="0"/>
-              <a:t>Outcome Expected</a:t>
-            </a:r>
-          </a:p>
-          <a:p>
-            <a:r>
-              <a:rPr lang="en-US" dirty="0"/>
-              <a:t>Platform</a:t>
-            </a:r>
-          </a:p>
-          <a:p>
-            <a:r>
-              <a:rPr lang="en-US" dirty="0"/>
-              <a:t>Where to Start With</a:t>
-            </a:r>
+              <a:t>Strategy</a:t>
+            </a:r>
+          </a:p>
+        </p:txBody>
+      </p:sp>
+      <p:sp>
+        <p:nvSpPr>
+          <p:cNvPr id="38" name="Rectangle: Rounded Corners 37">
+            <a:extLst>
+              <a:ext uri="{FF2B5EF4-FFF2-40B4-BE49-F238E27FC236}">
+                <a16:creationId xmlns:a16="http://schemas.microsoft.com/office/drawing/2014/main" id="{F12A870A-76A9-4C8D-BCB7-7344F277CFD7}"/>
+              </a:ext>
+            </a:extLst>
+          </p:cNvPr>
+          <p:cNvSpPr/>
+          <p:nvPr/>
+        </p:nvSpPr>
+        <p:spPr>
+          <a:xfrm>
+            <a:off x="2784446" y="2844325"/>
+            <a:ext cx="1470991" cy="714620"/>
+          </a:xfrm>
+          <a:prstGeom prst="roundRect">
+            <a:avLst/>
+          </a:prstGeom>
+        </p:spPr>
+        <p:style>
+          <a:lnRef idx="2">
+            <a:schemeClr val="accent1">
+              <a:shade val="50000"/>
+            </a:schemeClr>
+          </a:lnRef>
+          <a:fillRef idx="1">
+            <a:schemeClr val="accent1"/>
+          </a:fillRef>
+          <a:effectRef idx="0">
+            <a:schemeClr val="accent1"/>
+          </a:effectRef>
+          <a:fontRef idx="minor">
+            <a:schemeClr val="lt1"/>
+          </a:fontRef>
+        </p:style>
+        <p:txBody>
+          <a:bodyPr rtlCol="0" anchor="ctr"/>
+          <a:lstStyle/>
+          <a:p>
+            <a:pPr algn="ctr"/>
+            <a:r>
+              <a:rPr lang="en-US" sz="1600" dirty="0" err="1"/>
+              <a:t>TradeAction</a:t>
+            </a:r>
+            <a:endParaRPr lang="en-US" sz="1600" dirty="0"/>
+          </a:p>
+        </p:txBody>
+      </p:sp>
+      <p:sp>
+        <p:nvSpPr>
+          <p:cNvPr id="49" name="Rectangle: Rounded Corners 48">
+            <a:extLst>
+              <a:ext uri="{FF2B5EF4-FFF2-40B4-BE49-F238E27FC236}">
+                <a16:creationId xmlns:a16="http://schemas.microsoft.com/office/drawing/2014/main" id="{8C0FC3C5-206D-4CE7-870B-3DF288C040BC}"/>
+              </a:ext>
+            </a:extLst>
+          </p:cNvPr>
+          <p:cNvSpPr/>
+          <p:nvPr/>
+        </p:nvSpPr>
+        <p:spPr>
+          <a:xfrm>
+            <a:off x="10172471" y="4462392"/>
+            <a:ext cx="1484243" cy="574583"/>
+          </a:xfrm>
+          <a:prstGeom prst="roundRect">
+            <a:avLst/>
+          </a:prstGeom>
+        </p:spPr>
+        <p:style>
+          <a:lnRef idx="2">
+            <a:schemeClr val="accent1">
+              <a:shade val="50000"/>
+            </a:schemeClr>
+          </a:lnRef>
+          <a:fillRef idx="1">
+            <a:schemeClr val="accent1"/>
+          </a:fillRef>
+          <a:effectRef idx="0">
+            <a:schemeClr val="accent1"/>
+          </a:effectRef>
+          <a:fontRef idx="minor">
+            <a:schemeClr val="lt1"/>
+          </a:fontRef>
+        </p:style>
+        <p:txBody>
+          <a:bodyPr rtlCol="0" anchor="ctr"/>
+          <a:lstStyle/>
+          <a:p>
+            <a:pPr algn="ctr"/>
+            <a:r>
+              <a:rPr lang="en-US" sz="1600" dirty="0"/>
+              <a:t>Indicator</a:t>
+            </a:r>
+          </a:p>
+          <a:p>
+            <a:pPr algn="ctr"/>
+            <a:r>
+              <a:rPr lang="en-US" sz="1600" dirty="0"/>
+              <a:t>Signals</a:t>
+            </a:r>
+          </a:p>
+        </p:txBody>
+      </p:sp>
+      <p:sp>
+        <p:nvSpPr>
+          <p:cNvPr id="50" name="Rectangle: Rounded Corners 49">
+            <a:extLst>
+              <a:ext uri="{FF2B5EF4-FFF2-40B4-BE49-F238E27FC236}">
+                <a16:creationId xmlns:a16="http://schemas.microsoft.com/office/drawing/2014/main" id="{F2B0387B-A45F-48CD-A80B-5FA52C751288}"/>
+              </a:ext>
+            </a:extLst>
+          </p:cNvPr>
+          <p:cNvSpPr/>
+          <p:nvPr/>
+        </p:nvSpPr>
+        <p:spPr>
+          <a:xfrm>
+            <a:off x="10144763" y="2956884"/>
+            <a:ext cx="1484243" cy="574583"/>
+          </a:xfrm>
+          <a:prstGeom prst="roundRect">
+            <a:avLst/>
+          </a:prstGeom>
+        </p:spPr>
+        <p:style>
+          <a:lnRef idx="2">
+            <a:schemeClr val="accent1">
+              <a:shade val="50000"/>
+            </a:schemeClr>
+          </a:lnRef>
+          <a:fillRef idx="1">
+            <a:schemeClr val="accent1"/>
+          </a:fillRef>
+          <a:effectRef idx="0">
+            <a:schemeClr val="accent1"/>
+          </a:effectRef>
+          <a:fontRef idx="minor">
+            <a:schemeClr val="lt1"/>
+          </a:fontRef>
+        </p:style>
+        <p:txBody>
+          <a:bodyPr rtlCol="0" anchor="ctr"/>
+          <a:lstStyle/>
+          <a:p>
+            <a:pPr algn="ctr"/>
+            <a:r>
+              <a:rPr lang="en-US" sz="1600" dirty="0"/>
+              <a:t>Performance</a:t>
+            </a:r>
+          </a:p>
+          <a:p>
+            <a:pPr algn="ctr"/>
+            <a:r>
+              <a:rPr lang="en-US" sz="1600" dirty="0"/>
+              <a:t>/Rules</a:t>
+            </a:r>
+          </a:p>
+        </p:txBody>
+      </p:sp>
+      <p:sp>
+        <p:nvSpPr>
+          <p:cNvPr id="51" name="Rectangle: Rounded Corners 50">
+            <a:extLst>
+              <a:ext uri="{FF2B5EF4-FFF2-40B4-BE49-F238E27FC236}">
+                <a16:creationId xmlns:a16="http://schemas.microsoft.com/office/drawing/2014/main" id="{2A336638-7115-4FB9-ABD0-6B3E60D52610}"/>
+              </a:ext>
+            </a:extLst>
+          </p:cNvPr>
+          <p:cNvSpPr/>
+          <p:nvPr/>
+        </p:nvSpPr>
+        <p:spPr>
+          <a:xfrm>
+            <a:off x="10125110" y="1496698"/>
+            <a:ext cx="1484243" cy="574583"/>
+          </a:xfrm>
+          <a:prstGeom prst="roundRect">
+            <a:avLst/>
+          </a:prstGeom>
+        </p:spPr>
+        <p:style>
+          <a:lnRef idx="2">
+            <a:schemeClr val="accent1">
+              <a:shade val="50000"/>
+            </a:schemeClr>
+          </a:lnRef>
+          <a:fillRef idx="1">
+            <a:schemeClr val="accent1"/>
+          </a:fillRef>
+          <a:effectRef idx="0">
+            <a:schemeClr val="accent1"/>
+          </a:effectRef>
+          <a:fontRef idx="minor">
+            <a:schemeClr val="lt1"/>
+          </a:fontRef>
+        </p:style>
+        <p:txBody>
+          <a:bodyPr rtlCol="0" anchor="ctr"/>
+          <a:lstStyle/>
+          <a:p>
+            <a:pPr algn="ctr"/>
+            <a:r>
+              <a:rPr lang="en-US" sz="1600" dirty="0"/>
+              <a:t>Commands</a:t>
+            </a:r>
+          </a:p>
+        </p:txBody>
+      </p:sp>
+      <p:sp>
+        <p:nvSpPr>
+          <p:cNvPr id="58" name="Rectangle: Rounded Corners 57">
+            <a:extLst>
+              <a:ext uri="{FF2B5EF4-FFF2-40B4-BE49-F238E27FC236}">
+                <a16:creationId xmlns:a16="http://schemas.microsoft.com/office/drawing/2014/main" id="{AB26037D-154E-4FC3-ADB4-02B15E176F56}"/>
+              </a:ext>
+            </a:extLst>
+          </p:cNvPr>
+          <p:cNvSpPr/>
+          <p:nvPr/>
+        </p:nvSpPr>
+        <p:spPr>
+          <a:xfrm>
+            <a:off x="5270811" y="4133543"/>
+            <a:ext cx="1484243" cy="574583"/>
+          </a:xfrm>
+          <a:prstGeom prst="roundRect">
+            <a:avLst/>
+          </a:prstGeom>
+        </p:spPr>
+        <p:style>
+          <a:lnRef idx="2">
+            <a:schemeClr val="accent1">
+              <a:shade val="50000"/>
+            </a:schemeClr>
+          </a:lnRef>
+          <a:fillRef idx="1">
+            <a:schemeClr val="accent1"/>
+          </a:fillRef>
+          <a:effectRef idx="0">
+            <a:schemeClr val="accent1"/>
+          </a:effectRef>
+          <a:fontRef idx="minor">
+            <a:schemeClr val="lt1"/>
+          </a:fontRef>
+        </p:style>
+        <p:txBody>
+          <a:bodyPr rtlCol="0" anchor="ctr"/>
+          <a:lstStyle/>
+          <a:p>
+            <a:pPr algn="ctr"/>
+            <a:r>
+              <a:rPr lang="en-US" sz="1600" dirty="0"/>
+              <a:t>Liquidate</a:t>
+            </a:r>
+          </a:p>
+        </p:txBody>
+      </p:sp>
+      <p:sp>
+        <p:nvSpPr>
+          <p:cNvPr id="59" name="Rectangle: Rounded Corners 58">
+            <a:extLst>
+              <a:ext uri="{FF2B5EF4-FFF2-40B4-BE49-F238E27FC236}">
+                <a16:creationId xmlns:a16="http://schemas.microsoft.com/office/drawing/2014/main" id="{34410B82-90F6-4AFA-970A-452D6DE7607D}"/>
+              </a:ext>
+            </a:extLst>
+          </p:cNvPr>
+          <p:cNvSpPr/>
+          <p:nvPr/>
+        </p:nvSpPr>
+        <p:spPr>
+          <a:xfrm>
+            <a:off x="5270811" y="5742165"/>
+            <a:ext cx="1484243" cy="574583"/>
+          </a:xfrm>
+          <a:prstGeom prst="roundRect">
+            <a:avLst/>
+          </a:prstGeom>
+        </p:spPr>
+        <p:style>
+          <a:lnRef idx="2">
+            <a:schemeClr val="accent1">
+              <a:shade val="50000"/>
+            </a:schemeClr>
+          </a:lnRef>
+          <a:fillRef idx="1">
+            <a:schemeClr val="accent1"/>
+          </a:fillRef>
+          <a:effectRef idx="0">
+            <a:schemeClr val="accent1"/>
+          </a:effectRef>
+          <a:fontRef idx="minor">
+            <a:schemeClr val="lt1"/>
+          </a:fontRef>
+        </p:style>
+        <p:txBody>
+          <a:bodyPr rtlCol="0" anchor="ctr"/>
+          <a:lstStyle/>
+          <a:p>
+            <a:pPr algn="ctr"/>
+            <a:r>
+              <a:rPr lang="en-US" sz="1600" dirty="0"/>
+              <a:t>Terminate</a:t>
+            </a:r>
+          </a:p>
+        </p:txBody>
+      </p:sp>
+      <p:sp>
+        <p:nvSpPr>
+          <p:cNvPr id="71" name="Oval 70">
+            <a:extLst>
+              <a:ext uri="{FF2B5EF4-FFF2-40B4-BE49-F238E27FC236}">
+                <a16:creationId xmlns:a16="http://schemas.microsoft.com/office/drawing/2014/main" id="{C5891883-CD3C-4315-A48C-F319442C38AE}"/>
+              </a:ext>
+            </a:extLst>
+          </p:cNvPr>
+          <p:cNvSpPr/>
+          <p:nvPr/>
+        </p:nvSpPr>
+        <p:spPr>
+          <a:xfrm>
+            <a:off x="188553" y="4097042"/>
+            <a:ext cx="1315736" cy="820669"/>
+          </a:xfrm>
+          <a:prstGeom prst="ellipse">
+            <a:avLst/>
+          </a:prstGeom>
+        </p:spPr>
+        <p:style>
+          <a:lnRef idx="2">
+            <a:schemeClr val="accent1">
+              <a:shade val="50000"/>
+            </a:schemeClr>
+          </a:lnRef>
+          <a:fillRef idx="1">
+            <a:schemeClr val="accent1"/>
+          </a:fillRef>
+          <a:effectRef idx="0">
+            <a:schemeClr val="accent1"/>
+          </a:effectRef>
+          <a:fontRef idx="minor">
+            <a:schemeClr val="lt1"/>
+          </a:fontRef>
+        </p:style>
+        <p:txBody>
+          <a:bodyPr rtlCol="0" anchor="ctr"/>
+          <a:lstStyle/>
+          <a:p>
+            <a:pPr algn="ctr"/>
+            <a:r>
+              <a:rPr lang="en-US" sz="1600" dirty="0"/>
+              <a:t>Position</a:t>
+            </a:r>
+          </a:p>
+          <a:p>
+            <a:pPr algn="ctr"/>
+            <a:r>
+              <a:rPr lang="en-US" sz="1600" dirty="0" err="1"/>
+              <a:t>Mgmt</a:t>
+            </a:r>
+            <a:endParaRPr lang="en-US" sz="1600" dirty="0"/>
+          </a:p>
+        </p:txBody>
+      </p:sp>
+      <p:sp>
+        <p:nvSpPr>
+          <p:cNvPr id="72" name="Oval 71">
+            <a:extLst>
+              <a:ext uri="{FF2B5EF4-FFF2-40B4-BE49-F238E27FC236}">
+                <a16:creationId xmlns:a16="http://schemas.microsoft.com/office/drawing/2014/main" id="{3B452BEB-4F9D-4624-A2E7-8275E9A0CDC6}"/>
+              </a:ext>
+            </a:extLst>
+          </p:cNvPr>
+          <p:cNvSpPr/>
+          <p:nvPr/>
+        </p:nvSpPr>
+        <p:spPr>
+          <a:xfrm>
+            <a:off x="286023" y="1302806"/>
+            <a:ext cx="1166430" cy="769689"/>
+          </a:xfrm>
+          <a:prstGeom prst="ellipse">
+            <a:avLst/>
+          </a:prstGeom>
+        </p:spPr>
+        <p:style>
+          <a:lnRef idx="2">
+            <a:schemeClr val="accent1">
+              <a:shade val="50000"/>
+            </a:schemeClr>
+          </a:lnRef>
+          <a:fillRef idx="1">
+            <a:schemeClr val="accent1"/>
+          </a:fillRef>
+          <a:effectRef idx="0">
+            <a:schemeClr val="accent1"/>
+          </a:effectRef>
+          <a:fontRef idx="minor">
+            <a:schemeClr val="lt1"/>
+          </a:fontRef>
+        </p:style>
+        <p:txBody>
+          <a:bodyPr rtlCol="0" anchor="ctr"/>
+          <a:lstStyle/>
+          <a:p>
+            <a:pPr algn="ctr"/>
+            <a:r>
+              <a:rPr lang="en-US" sz="1600" dirty="0"/>
+              <a:t>Money </a:t>
+            </a:r>
+            <a:r>
+              <a:rPr lang="en-US" sz="1600" dirty="0" err="1"/>
+              <a:t>Mgmt</a:t>
+            </a:r>
+            <a:endParaRPr lang="en-US" sz="1600" dirty="0"/>
+          </a:p>
+        </p:txBody>
+      </p:sp>
+      <p:sp>
+        <p:nvSpPr>
+          <p:cNvPr id="73" name="Oval 72">
+            <a:extLst>
+              <a:ext uri="{FF2B5EF4-FFF2-40B4-BE49-F238E27FC236}">
+                <a16:creationId xmlns:a16="http://schemas.microsoft.com/office/drawing/2014/main" id="{185A0391-72E3-424E-A94D-CD83EF9E1F01}"/>
+              </a:ext>
+            </a:extLst>
+          </p:cNvPr>
+          <p:cNvSpPr/>
+          <p:nvPr/>
+        </p:nvSpPr>
+        <p:spPr>
+          <a:xfrm>
+            <a:off x="1816702" y="1293571"/>
+            <a:ext cx="1038624" cy="787640"/>
+          </a:xfrm>
+          <a:prstGeom prst="ellipse">
+            <a:avLst/>
+          </a:prstGeom>
+        </p:spPr>
+        <p:style>
+          <a:lnRef idx="2">
+            <a:schemeClr val="accent1">
+              <a:shade val="50000"/>
+            </a:schemeClr>
+          </a:lnRef>
+          <a:fillRef idx="1">
+            <a:schemeClr val="accent1"/>
+          </a:fillRef>
+          <a:effectRef idx="0">
+            <a:schemeClr val="accent1"/>
+          </a:effectRef>
+          <a:fontRef idx="minor">
+            <a:schemeClr val="lt1"/>
+          </a:fontRef>
+        </p:style>
+        <p:txBody>
+          <a:bodyPr rtlCol="0" anchor="ctr"/>
+          <a:lstStyle/>
+          <a:p>
+            <a:pPr algn="ctr"/>
+            <a:r>
+              <a:rPr lang="en-US" sz="1600" dirty="0"/>
+              <a:t>Trade</a:t>
+            </a:r>
+          </a:p>
+          <a:p>
+            <a:pPr algn="ctr"/>
+            <a:r>
+              <a:rPr lang="en-US" sz="1600" dirty="0" err="1"/>
+              <a:t>Mgmt</a:t>
+            </a:r>
+            <a:endParaRPr lang="en-US" sz="1600" dirty="0"/>
+          </a:p>
+        </p:txBody>
+      </p:sp>
+      <p:cxnSp>
+        <p:nvCxnSpPr>
+          <p:cNvPr id="75" name="Straight Arrow Connector 74">
+            <a:extLst>
+              <a:ext uri="{FF2B5EF4-FFF2-40B4-BE49-F238E27FC236}">
+                <a16:creationId xmlns:a16="http://schemas.microsoft.com/office/drawing/2014/main" id="{E3406A20-776B-47B6-90D3-EA75AB0CB0EA}"/>
+              </a:ext>
+            </a:extLst>
+          </p:cNvPr>
+          <p:cNvCxnSpPr>
+            <a:cxnSpLocks/>
+            <a:stCxn id="37" idx="2"/>
+            <a:endCxn id="71" idx="0"/>
+          </p:cNvCxnSpPr>
+          <p:nvPr/>
+        </p:nvCxnSpPr>
+        <p:spPr>
+          <a:xfrm flipH="1">
+            <a:off x="846421" y="3556971"/>
+            <a:ext cx="815152" cy="540071"/>
+          </a:xfrm>
+          <a:prstGeom prst="straightConnector1">
+            <a:avLst/>
+          </a:prstGeom>
+          <a:ln>
+            <a:headEnd type="triangle"/>
+            <a:tailEnd type="triangle"/>
+          </a:ln>
+        </p:spPr>
+        <p:style>
+          <a:lnRef idx="1">
+            <a:schemeClr val="accent1"/>
+          </a:lnRef>
+          <a:fillRef idx="0">
+            <a:schemeClr val="accent1"/>
+          </a:fillRef>
+          <a:effectRef idx="0">
+            <a:schemeClr val="accent1"/>
+          </a:effectRef>
+          <a:fontRef idx="minor">
+            <a:schemeClr val="tx1"/>
+          </a:fontRef>
+        </p:style>
+      </p:cxnSp>
+      <p:cxnSp>
+        <p:nvCxnSpPr>
+          <p:cNvPr id="76" name="Straight Arrow Connector 75">
+            <a:extLst>
+              <a:ext uri="{FF2B5EF4-FFF2-40B4-BE49-F238E27FC236}">
+                <a16:creationId xmlns:a16="http://schemas.microsoft.com/office/drawing/2014/main" id="{A8C3C29B-89B8-4D34-AD95-F658053D788F}"/>
+              </a:ext>
+            </a:extLst>
+          </p:cNvPr>
+          <p:cNvCxnSpPr>
+            <a:cxnSpLocks/>
+            <a:stCxn id="37" idx="0"/>
+            <a:endCxn id="72" idx="4"/>
+          </p:cNvCxnSpPr>
+          <p:nvPr/>
+        </p:nvCxnSpPr>
+        <p:spPr>
+          <a:xfrm flipH="1" flipV="1">
+            <a:off x="869238" y="2072495"/>
+            <a:ext cx="792335" cy="780219"/>
+          </a:xfrm>
+          <a:prstGeom prst="straightConnector1">
+            <a:avLst/>
+          </a:prstGeom>
+          <a:ln>
+            <a:headEnd type="triangle"/>
+            <a:tailEnd type="triangle"/>
+          </a:ln>
+        </p:spPr>
+        <p:style>
+          <a:lnRef idx="1">
+            <a:schemeClr val="accent1"/>
+          </a:lnRef>
+          <a:fillRef idx="0">
+            <a:schemeClr val="accent1"/>
+          </a:fillRef>
+          <a:effectRef idx="0">
+            <a:schemeClr val="accent1"/>
+          </a:effectRef>
+          <a:fontRef idx="minor">
+            <a:schemeClr val="tx1"/>
+          </a:fontRef>
+        </p:style>
+      </p:cxnSp>
+      <p:cxnSp>
+        <p:nvCxnSpPr>
+          <p:cNvPr id="77" name="Straight Arrow Connector 76">
+            <a:extLst>
+              <a:ext uri="{FF2B5EF4-FFF2-40B4-BE49-F238E27FC236}">
+                <a16:creationId xmlns:a16="http://schemas.microsoft.com/office/drawing/2014/main" id="{F4E2DAB9-B250-4E2C-85C0-FF56D58B01F1}"/>
+              </a:ext>
+            </a:extLst>
+          </p:cNvPr>
+          <p:cNvCxnSpPr>
+            <a:cxnSpLocks/>
+            <a:stCxn id="133" idx="0"/>
+            <a:endCxn id="37" idx="2"/>
+          </p:cNvCxnSpPr>
+          <p:nvPr/>
+        </p:nvCxnSpPr>
+        <p:spPr>
+          <a:xfrm flipH="1" flipV="1">
+            <a:off x="1661573" y="3556971"/>
+            <a:ext cx="1238856" cy="602341"/>
+          </a:xfrm>
+          <a:prstGeom prst="straightConnector1">
+            <a:avLst/>
+          </a:prstGeom>
+          <a:ln>
+            <a:headEnd type="triangle"/>
+            <a:tailEnd type="triangle"/>
+          </a:ln>
+        </p:spPr>
+        <p:style>
+          <a:lnRef idx="1">
+            <a:schemeClr val="accent1"/>
+          </a:lnRef>
+          <a:fillRef idx="0">
+            <a:schemeClr val="accent1"/>
+          </a:fillRef>
+          <a:effectRef idx="0">
+            <a:schemeClr val="accent1"/>
+          </a:effectRef>
+          <a:fontRef idx="minor">
+            <a:schemeClr val="tx1"/>
+          </a:fontRef>
+        </p:style>
+      </p:cxnSp>
+      <p:sp>
+        <p:nvSpPr>
+          <p:cNvPr id="92" name="Rectangle 91">
+            <a:extLst>
+              <a:ext uri="{FF2B5EF4-FFF2-40B4-BE49-F238E27FC236}">
+                <a16:creationId xmlns:a16="http://schemas.microsoft.com/office/drawing/2014/main" id="{76A6117F-792D-4F0B-93AA-32C82F89B02F}"/>
+              </a:ext>
+            </a:extLst>
+          </p:cNvPr>
+          <p:cNvSpPr/>
+          <p:nvPr/>
+        </p:nvSpPr>
+        <p:spPr>
+          <a:xfrm>
+            <a:off x="4891154" y="1308682"/>
+            <a:ext cx="2193141" cy="5184191"/>
+          </a:xfrm>
+          <a:prstGeom prst="rect">
+            <a:avLst/>
+          </a:prstGeom>
+          <a:noFill/>
+          <a:ln>
+            <a:solidFill>
+              <a:schemeClr val="accent1">
+                <a:shade val="50000"/>
+              </a:schemeClr>
+            </a:solidFill>
+            <a:prstDash val="dash"/>
+          </a:ln>
+        </p:spPr>
+        <p:style>
+          <a:lnRef idx="2">
+            <a:schemeClr val="accent1">
+              <a:shade val="50000"/>
+            </a:schemeClr>
+          </a:lnRef>
+          <a:fillRef idx="1">
+            <a:schemeClr val="accent1"/>
+          </a:fillRef>
+          <a:effectRef idx="0">
+            <a:schemeClr val="accent1"/>
+          </a:effectRef>
+          <a:fontRef idx="minor">
+            <a:schemeClr val="lt1"/>
+          </a:fontRef>
+        </p:style>
+        <p:txBody>
+          <a:bodyPr rtlCol="0" anchor="ctr"/>
+          <a:lstStyle/>
+          <a:p>
+            <a:pPr algn="ctr"/>
+            <a:endParaRPr lang="en-US"/>
+          </a:p>
+        </p:txBody>
+      </p:sp>
+      <p:sp>
+        <p:nvSpPr>
+          <p:cNvPr id="93" name="Rectangle: Rounded Corners 92">
+            <a:extLst>
+              <a:ext uri="{FF2B5EF4-FFF2-40B4-BE49-F238E27FC236}">
+                <a16:creationId xmlns:a16="http://schemas.microsoft.com/office/drawing/2014/main" id="{8DAA03FB-1A8F-45BA-97AE-4029A8AE266D}"/>
+              </a:ext>
+            </a:extLst>
+          </p:cNvPr>
+          <p:cNvSpPr/>
+          <p:nvPr/>
+        </p:nvSpPr>
+        <p:spPr>
+          <a:xfrm>
+            <a:off x="5291111" y="4961970"/>
+            <a:ext cx="1484243" cy="574583"/>
+          </a:xfrm>
+          <a:prstGeom prst="roundRect">
+            <a:avLst/>
+          </a:prstGeom>
+        </p:spPr>
+        <p:style>
+          <a:lnRef idx="2">
+            <a:schemeClr val="accent1">
+              <a:shade val="50000"/>
+            </a:schemeClr>
+          </a:lnRef>
+          <a:fillRef idx="1">
+            <a:schemeClr val="accent1"/>
+          </a:fillRef>
+          <a:effectRef idx="0">
+            <a:schemeClr val="accent1"/>
+          </a:effectRef>
+          <a:fontRef idx="minor">
+            <a:schemeClr val="lt1"/>
+          </a:fontRef>
+        </p:style>
+        <p:txBody>
+          <a:bodyPr rtlCol="0" anchor="ctr"/>
+          <a:lstStyle/>
+          <a:p>
+            <a:pPr algn="ctr"/>
+            <a:r>
+              <a:rPr lang="en-US" sz="1600" dirty="0" err="1"/>
+              <a:t>ExitOnly</a:t>
+            </a:r>
+            <a:endParaRPr lang="en-US" sz="1600" dirty="0"/>
+          </a:p>
+        </p:txBody>
+      </p:sp>
+      <p:sp>
+        <p:nvSpPr>
+          <p:cNvPr id="94" name="Arrow: Left 93">
+            <a:extLst>
+              <a:ext uri="{FF2B5EF4-FFF2-40B4-BE49-F238E27FC236}">
+                <a16:creationId xmlns:a16="http://schemas.microsoft.com/office/drawing/2014/main" id="{1DC0DD0F-32B9-4D26-9004-6B9D08BD607E}"/>
+              </a:ext>
+            </a:extLst>
+          </p:cNvPr>
+          <p:cNvSpPr/>
+          <p:nvPr/>
+        </p:nvSpPr>
+        <p:spPr>
+          <a:xfrm>
+            <a:off x="4255436" y="2973791"/>
+            <a:ext cx="635717" cy="482889"/>
+          </a:xfrm>
+          <a:prstGeom prst="leftArrow">
+            <a:avLst/>
+          </a:prstGeom>
+        </p:spPr>
+        <p:style>
+          <a:lnRef idx="2">
+            <a:schemeClr val="accent1">
+              <a:shade val="50000"/>
+            </a:schemeClr>
+          </a:lnRef>
+          <a:fillRef idx="1">
+            <a:schemeClr val="accent1"/>
+          </a:fillRef>
+          <a:effectRef idx="0">
+            <a:schemeClr val="accent1"/>
+          </a:effectRef>
+          <a:fontRef idx="minor">
+            <a:schemeClr val="lt1"/>
+          </a:fontRef>
+        </p:style>
+        <p:txBody>
+          <a:bodyPr rtlCol="0" anchor="ctr"/>
+          <a:lstStyle/>
+          <a:p>
+            <a:pPr algn="ctr"/>
+            <a:endParaRPr lang="en-US"/>
+          </a:p>
+        </p:txBody>
+      </p:sp>
+      <p:sp>
+        <p:nvSpPr>
+          <p:cNvPr id="95" name="Arrow: Left 94">
+            <a:extLst>
+              <a:ext uri="{FF2B5EF4-FFF2-40B4-BE49-F238E27FC236}">
+                <a16:creationId xmlns:a16="http://schemas.microsoft.com/office/drawing/2014/main" id="{4DC4B740-3767-473D-B977-C0CA4035EAF5}"/>
+              </a:ext>
+            </a:extLst>
+          </p:cNvPr>
+          <p:cNvSpPr/>
+          <p:nvPr/>
+        </p:nvSpPr>
+        <p:spPr>
+          <a:xfrm>
+            <a:off x="7084295" y="2992415"/>
+            <a:ext cx="647198" cy="474476"/>
+          </a:xfrm>
+          <a:prstGeom prst="leftArrow">
+            <a:avLst/>
+          </a:prstGeom>
+        </p:spPr>
+        <p:style>
+          <a:lnRef idx="2">
+            <a:schemeClr val="accent1">
+              <a:shade val="50000"/>
+            </a:schemeClr>
+          </a:lnRef>
+          <a:fillRef idx="1">
+            <a:schemeClr val="accent1"/>
+          </a:fillRef>
+          <a:effectRef idx="0">
+            <a:schemeClr val="accent1"/>
+          </a:effectRef>
+          <a:fontRef idx="minor">
+            <a:schemeClr val="lt1"/>
+          </a:fontRef>
+        </p:style>
+        <p:txBody>
+          <a:bodyPr rtlCol="0" anchor="ctr"/>
+          <a:lstStyle/>
+          <a:p>
+            <a:pPr algn="ctr"/>
+            <a:endParaRPr lang="en-US"/>
+          </a:p>
+        </p:txBody>
+      </p:sp>
+      <p:cxnSp>
+        <p:nvCxnSpPr>
+          <p:cNvPr id="96" name="Straight Arrow Connector 95">
+            <a:extLst>
+              <a:ext uri="{FF2B5EF4-FFF2-40B4-BE49-F238E27FC236}">
+                <a16:creationId xmlns:a16="http://schemas.microsoft.com/office/drawing/2014/main" id="{B93FB528-9078-4A1B-B186-D38AD705110A}"/>
+              </a:ext>
+            </a:extLst>
+          </p:cNvPr>
+          <p:cNvCxnSpPr>
+            <a:cxnSpLocks/>
+            <a:stCxn id="49" idx="1"/>
+            <a:endCxn id="106" idx="3"/>
+          </p:cNvCxnSpPr>
+          <p:nvPr/>
+        </p:nvCxnSpPr>
+        <p:spPr>
+          <a:xfrm flipH="1" flipV="1">
+            <a:off x="9202483" y="3219120"/>
+            <a:ext cx="969988" cy="1530564"/>
+          </a:xfrm>
+          <a:prstGeom prst="straightConnector1">
+            <a:avLst/>
+          </a:prstGeom>
+          <a:ln>
+            <a:tailEnd type="triangle"/>
+          </a:ln>
+        </p:spPr>
+        <p:style>
+          <a:lnRef idx="1">
+            <a:schemeClr val="accent1"/>
+          </a:lnRef>
+          <a:fillRef idx="0">
+            <a:schemeClr val="accent1"/>
+          </a:fillRef>
+          <a:effectRef idx="0">
+            <a:schemeClr val="accent1"/>
+          </a:effectRef>
+          <a:fontRef idx="minor">
+            <a:schemeClr val="tx1"/>
+          </a:fontRef>
+        </p:style>
+      </p:cxnSp>
+      <p:cxnSp>
+        <p:nvCxnSpPr>
+          <p:cNvPr id="97" name="Straight Arrow Connector 96">
+            <a:extLst>
+              <a:ext uri="{FF2B5EF4-FFF2-40B4-BE49-F238E27FC236}">
+                <a16:creationId xmlns:a16="http://schemas.microsoft.com/office/drawing/2014/main" id="{1CF4A800-7DB0-45B3-9E98-8305C592244F}"/>
+              </a:ext>
+            </a:extLst>
+          </p:cNvPr>
+          <p:cNvCxnSpPr>
+            <a:cxnSpLocks/>
+            <a:endCxn id="106" idx="3"/>
+          </p:cNvCxnSpPr>
+          <p:nvPr/>
+        </p:nvCxnSpPr>
+        <p:spPr>
+          <a:xfrm flipH="1" flipV="1">
+            <a:off x="9202483" y="3219120"/>
+            <a:ext cx="1096064" cy="29006"/>
+          </a:xfrm>
+          <a:prstGeom prst="straightConnector1">
+            <a:avLst/>
+          </a:prstGeom>
+          <a:ln>
+            <a:tailEnd type="triangle"/>
+          </a:ln>
+        </p:spPr>
+        <p:style>
+          <a:lnRef idx="1">
+            <a:schemeClr val="accent1"/>
+          </a:lnRef>
+          <a:fillRef idx="0">
+            <a:schemeClr val="accent1"/>
+          </a:fillRef>
+          <a:effectRef idx="0">
+            <a:schemeClr val="accent1"/>
+          </a:effectRef>
+          <a:fontRef idx="minor">
+            <a:schemeClr val="tx1"/>
+          </a:fontRef>
+        </p:style>
+      </p:cxnSp>
+      <p:cxnSp>
+        <p:nvCxnSpPr>
+          <p:cNvPr id="98" name="Straight Arrow Connector 97">
+            <a:extLst>
+              <a:ext uri="{FF2B5EF4-FFF2-40B4-BE49-F238E27FC236}">
+                <a16:creationId xmlns:a16="http://schemas.microsoft.com/office/drawing/2014/main" id="{23CEECF9-BC13-4D2F-A8C1-1382975CF76B}"/>
+              </a:ext>
+            </a:extLst>
+          </p:cNvPr>
+          <p:cNvCxnSpPr>
+            <a:cxnSpLocks/>
+            <a:stCxn id="51" idx="1"/>
+            <a:endCxn id="106" idx="3"/>
+          </p:cNvCxnSpPr>
+          <p:nvPr/>
+        </p:nvCxnSpPr>
+        <p:spPr>
+          <a:xfrm flipH="1">
+            <a:off x="9202483" y="1783990"/>
+            <a:ext cx="922627" cy="1435130"/>
+          </a:xfrm>
+          <a:prstGeom prst="straightConnector1">
+            <a:avLst/>
+          </a:prstGeom>
+          <a:ln>
+            <a:tailEnd type="triangle"/>
+          </a:ln>
+        </p:spPr>
+        <p:style>
+          <a:lnRef idx="1">
+            <a:schemeClr val="accent1"/>
+          </a:lnRef>
+          <a:fillRef idx="0">
+            <a:schemeClr val="accent1"/>
+          </a:fillRef>
+          <a:effectRef idx="0">
+            <a:schemeClr val="accent1"/>
+          </a:effectRef>
+          <a:fontRef idx="minor">
+            <a:schemeClr val="tx1"/>
+          </a:fontRef>
+        </p:style>
+      </p:cxnSp>
+      <p:sp>
+        <p:nvSpPr>
+          <p:cNvPr id="106" name="Diamond 105">
+            <a:extLst>
+              <a:ext uri="{FF2B5EF4-FFF2-40B4-BE49-F238E27FC236}">
+                <a16:creationId xmlns:a16="http://schemas.microsoft.com/office/drawing/2014/main" id="{711EA771-4913-4CFD-85D5-50B79A85DE4D}"/>
+              </a:ext>
+            </a:extLst>
+          </p:cNvPr>
+          <p:cNvSpPr/>
+          <p:nvPr/>
+        </p:nvSpPr>
+        <p:spPr>
+          <a:xfrm>
+            <a:off x="7718240" y="2862797"/>
+            <a:ext cx="1484243" cy="712646"/>
+          </a:xfrm>
+          <a:prstGeom prst="diamond">
+            <a:avLst/>
+          </a:prstGeom>
+        </p:spPr>
+        <p:style>
+          <a:lnRef idx="2">
+            <a:schemeClr val="accent1">
+              <a:shade val="50000"/>
+            </a:schemeClr>
+          </a:lnRef>
+          <a:fillRef idx="1">
+            <a:schemeClr val="accent1"/>
+          </a:fillRef>
+          <a:effectRef idx="0">
+            <a:schemeClr val="accent1"/>
+          </a:effectRef>
+          <a:fontRef idx="minor">
+            <a:schemeClr val="lt1"/>
+          </a:fontRef>
+        </p:style>
+        <p:txBody>
+          <a:bodyPr rtlCol="0" anchor="ctr"/>
+          <a:lstStyle/>
+          <a:p>
+            <a:pPr algn="ctr"/>
+            <a:r>
+              <a:rPr lang="en-US" sz="1600" dirty="0"/>
+              <a:t>Engine</a:t>
+            </a:r>
+          </a:p>
+        </p:txBody>
+      </p:sp>
+      <p:sp>
+        <p:nvSpPr>
+          <p:cNvPr id="124" name="Cloud 123">
+            <a:extLst>
+              <a:ext uri="{FF2B5EF4-FFF2-40B4-BE49-F238E27FC236}">
+                <a16:creationId xmlns:a16="http://schemas.microsoft.com/office/drawing/2014/main" id="{F209CF20-06C7-4B36-89FA-1EA6B820C810}"/>
+              </a:ext>
+            </a:extLst>
+          </p:cNvPr>
+          <p:cNvSpPr/>
+          <p:nvPr/>
+        </p:nvSpPr>
+        <p:spPr>
+          <a:xfrm>
+            <a:off x="1888278" y="5120890"/>
+            <a:ext cx="2377499" cy="827541"/>
+          </a:xfrm>
+          <a:prstGeom prst="cloud">
+            <a:avLst/>
+          </a:prstGeom>
+          <a:solidFill>
+            <a:schemeClr val="accent5">
+              <a:lumMod val="40000"/>
+              <a:lumOff val="60000"/>
+            </a:schemeClr>
+          </a:solidFill>
+        </p:spPr>
+        <p:style>
+          <a:lnRef idx="2">
+            <a:schemeClr val="accent1">
+              <a:shade val="50000"/>
+            </a:schemeClr>
+          </a:lnRef>
+          <a:fillRef idx="1">
+            <a:schemeClr val="accent1"/>
+          </a:fillRef>
+          <a:effectRef idx="0">
+            <a:schemeClr val="accent1"/>
+          </a:effectRef>
+          <a:fontRef idx="minor">
+            <a:schemeClr val="lt1"/>
+          </a:fontRef>
+        </p:style>
+        <p:txBody>
+          <a:bodyPr rtlCol="0" anchor="ctr"/>
+          <a:lstStyle/>
+          <a:p>
+            <a:pPr algn="ctr"/>
+            <a:r>
+              <a:rPr lang="en-US" dirty="0">
+                <a:solidFill>
+                  <a:schemeClr val="tx1">
+                    <a:lumMod val="75000"/>
+                    <a:lumOff val="25000"/>
+                  </a:schemeClr>
+                </a:solidFill>
+              </a:rPr>
+              <a:t>Internet/Web</a:t>
+            </a:r>
+          </a:p>
+        </p:txBody>
+      </p:sp>
+      <p:pic>
+        <p:nvPicPr>
+          <p:cNvPr id="126" name="Picture 125">
+            <a:extLst>
+              <a:ext uri="{FF2B5EF4-FFF2-40B4-BE49-F238E27FC236}">
+                <a16:creationId xmlns:a16="http://schemas.microsoft.com/office/drawing/2014/main" id="{D1A03DEF-8E49-401A-87D9-72B99CE03E90}"/>
+              </a:ext>
+            </a:extLst>
+          </p:cNvPr>
+          <p:cNvPicPr>
+            <a:picLocks noChangeAspect="1"/>
+          </p:cNvPicPr>
+          <p:nvPr/>
+        </p:nvPicPr>
+        <p:blipFill>
+          <a:blip r:embed="rId2"/>
+          <a:stretch>
+            <a:fillRect/>
+          </a:stretch>
+        </p:blipFill>
+        <p:spPr>
+          <a:xfrm>
+            <a:off x="582260" y="5156653"/>
+            <a:ext cx="506420" cy="765263"/>
+          </a:xfrm>
+          <a:prstGeom prst="rect">
+            <a:avLst/>
+          </a:prstGeom>
+        </p:spPr>
+      </p:pic>
+      <p:cxnSp>
+        <p:nvCxnSpPr>
+          <p:cNvPr id="127" name="Straight Arrow Connector 126">
+            <a:extLst>
+              <a:ext uri="{FF2B5EF4-FFF2-40B4-BE49-F238E27FC236}">
+                <a16:creationId xmlns:a16="http://schemas.microsoft.com/office/drawing/2014/main" id="{6986BC2D-5779-4C7F-8289-6AA8D11385C0}"/>
+              </a:ext>
+            </a:extLst>
+          </p:cNvPr>
+          <p:cNvCxnSpPr>
+            <a:cxnSpLocks/>
+            <a:stCxn id="124" idx="2"/>
+            <a:endCxn id="126" idx="3"/>
+          </p:cNvCxnSpPr>
+          <p:nvPr/>
+        </p:nvCxnSpPr>
+        <p:spPr>
+          <a:xfrm flipH="1">
+            <a:off x="1088680" y="5534661"/>
+            <a:ext cx="806973" cy="4624"/>
+          </a:xfrm>
+          <a:prstGeom prst="straightConnector1">
+            <a:avLst/>
+          </a:prstGeom>
+          <a:ln>
+            <a:headEnd type="triangle"/>
+            <a:tailEnd type="triangle"/>
+          </a:ln>
+        </p:spPr>
+        <p:style>
+          <a:lnRef idx="1">
+            <a:schemeClr val="accent1"/>
+          </a:lnRef>
+          <a:fillRef idx="0">
+            <a:schemeClr val="accent1"/>
+          </a:fillRef>
+          <a:effectRef idx="0">
+            <a:schemeClr val="accent1"/>
+          </a:effectRef>
+          <a:fontRef idx="minor">
+            <a:schemeClr val="tx1"/>
+          </a:fontRef>
+        </p:style>
+      </p:cxnSp>
+      <p:sp>
+        <p:nvSpPr>
+          <p:cNvPr id="133" name="Speech Bubble: Rectangle with Corners Rounded 132">
+            <a:extLst>
+              <a:ext uri="{FF2B5EF4-FFF2-40B4-BE49-F238E27FC236}">
+                <a16:creationId xmlns:a16="http://schemas.microsoft.com/office/drawing/2014/main" id="{626A27AA-B3A0-48B1-91C4-400740FA1A57}"/>
+              </a:ext>
+            </a:extLst>
+          </p:cNvPr>
+          <p:cNvSpPr/>
+          <p:nvPr/>
+        </p:nvSpPr>
+        <p:spPr>
+          <a:xfrm>
+            <a:off x="2014289" y="4159312"/>
+            <a:ext cx="1772279" cy="667355"/>
+          </a:xfrm>
+          <a:prstGeom prst="wedgeRoundRectCallout">
+            <a:avLst>
+              <a:gd name="adj1" fmla="val 11479"/>
+              <a:gd name="adj2" fmla="val 109557"/>
+              <a:gd name="adj3" fmla="val 16667"/>
+            </a:avLst>
+          </a:prstGeom>
+          <a:solidFill>
+            <a:schemeClr val="accent5">
+              <a:lumMod val="40000"/>
+              <a:lumOff val="60000"/>
+            </a:schemeClr>
+          </a:solidFill>
+        </p:spPr>
+        <p:style>
+          <a:lnRef idx="2">
+            <a:schemeClr val="accent1">
+              <a:shade val="50000"/>
+            </a:schemeClr>
+          </a:lnRef>
+          <a:fillRef idx="1">
+            <a:schemeClr val="accent1"/>
+          </a:fillRef>
+          <a:effectRef idx="0">
+            <a:schemeClr val="accent1"/>
+          </a:effectRef>
+          <a:fontRef idx="minor">
+            <a:schemeClr val="lt1"/>
+          </a:fontRef>
+        </p:style>
+        <p:txBody>
+          <a:bodyPr rtlCol="0" anchor="ctr"/>
+          <a:lstStyle/>
+          <a:p>
+            <a:pPr algn="ctr"/>
+            <a:r>
+              <a:rPr lang="en-US" sz="1400" dirty="0">
+                <a:solidFill>
+                  <a:schemeClr val="bg2">
+                    <a:lumMod val="25000"/>
+                  </a:schemeClr>
+                </a:solidFill>
+              </a:rPr>
+              <a:t>Input: Command</a:t>
+            </a:r>
+          </a:p>
+          <a:p>
+            <a:pPr algn="ctr"/>
+            <a:r>
+              <a:rPr lang="en-US" sz="1400" dirty="0">
+                <a:solidFill>
+                  <a:schemeClr val="bg2">
+                    <a:lumMod val="25000"/>
+                  </a:schemeClr>
+                </a:solidFill>
+              </a:rPr>
+              <a:t>Output: Report, Log</a:t>
+            </a:r>
+          </a:p>
+        </p:txBody>
+      </p:sp>
+      <p:sp>
+        <p:nvSpPr>
+          <p:cNvPr id="140" name="TextBox 139">
+            <a:extLst>
+              <a:ext uri="{FF2B5EF4-FFF2-40B4-BE49-F238E27FC236}">
+                <a16:creationId xmlns:a16="http://schemas.microsoft.com/office/drawing/2014/main" id="{C8DC5CC3-F945-4F58-820E-B84C75D88892}"/>
+              </a:ext>
+            </a:extLst>
+          </p:cNvPr>
+          <p:cNvSpPr txBox="1"/>
+          <p:nvPr/>
+        </p:nvSpPr>
+        <p:spPr>
+          <a:xfrm>
+            <a:off x="8136347" y="3596104"/>
+            <a:ext cx="1200600" cy="1169551"/>
+          </a:xfrm>
+          <a:prstGeom prst="rect">
+            <a:avLst/>
+          </a:prstGeom>
+          <a:noFill/>
+        </p:spPr>
+        <p:txBody>
+          <a:bodyPr wrap="square" rtlCol="0">
+            <a:spAutoFit/>
+          </a:bodyPr>
+          <a:lstStyle/>
+          <a:p>
+            <a:r>
+              <a:rPr lang="en-US" sz="1400" dirty="0"/>
+              <a:t>Signals</a:t>
+            </a:r>
+          </a:p>
+          <a:p>
+            <a:r>
+              <a:rPr lang="en-US" sz="1400" dirty="0"/>
+              <a:t>+ Commands</a:t>
+            </a:r>
+          </a:p>
+          <a:p>
+            <a:r>
+              <a:rPr lang="en-US" sz="1400" dirty="0"/>
+              <a:t>+ Events</a:t>
+            </a:r>
+          </a:p>
+          <a:p>
+            <a:r>
+              <a:rPr lang="en-US" sz="1400" dirty="0"/>
+              <a:t>Combined</a:t>
+            </a:r>
+          </a:p>
+          <a:p>
+            <a:endParaRPr lang="en-US" sz="1400" dirty="0"/>
+          </a:p>
+        </p:txBody>
+      </p:sp>
+      <p:sp>
+        <p:nvSpPr>
+          <p:cNvPr id="153" name="TextBox 152">
+            <a:extLst>
+              <a:ext uri="{FF2B5EF4-FFF2-40B4-BE49-F238E27FC236}">
+                <a16:creationId xmlns:a16="http://schemas.microsoft.com/office/drawing/2014/main" id="{39597590-315D-4F10-917A-46DBC6110138}"/>
+              </a:ext>
+            </a:extLst>
+          </p:cNvPr>
+          <p:cNvSpPr txBox="1"/>
+          <p:nvPr/>
+        </p:nvSpPr>
+        <p:spPr>
+          <a:xfrm>
+            <a:off x="412120" y="6020970"/>
+            <a:ext cx="1404582" cy="523220"/>
+          </a:xfrm>
+          <a:prstGeom prst="rect">
+            <a:avLst/>
+          </a:prstGeom>
+          <a:noFill/>
+        </p:spPr>
+        <p:txBody>
+          <a:bodyPr wrap="square" rtlCol="0">
+            <a:spAutoFit/>
+          </a:bodyPr>
+          <a:lstStyle/>
+          <a:p>
+            <a:r>
+              <a:rPr lang="en-US" sz="1400" dirty="0"/>
+              <a:t>Mobile, Laptop,</a:t>
+            </a:r>
+          </a:p>
+          <a:p>
+            <a:r>
+              <a:rPr lang="en-US" sz="1400" dirty="0"/>
+              <a:t>Desktop</a:t>
+            </a:r>
+          </a:p>
+        </p:txBody>
+      </p:sp>
+      <p:sp>
+        <p:nvSpPr>
+          <p:cNvPr id="39" name="Arrow: Left 38">
+            <a:extLst>
+              <a:ext uri="{FF2B5EF4-FFF2-40B4-BE49-F238E27FC236}">
+                <a16:creationId xmlns:a16="http://schemas.microsoft.com/office/drawing/2014/main" id="{062E1260-5E7F-4C81-A10C-2F3D50C8A1B1}"/>
+              </a:ext>
+            </a:extLst>
+          </p:cNvPr>
+          <p:cNvSpPr/>
+          <p:nvPr/>
+        </p:nvSpPr>
+        <p:spPr>
+          <a:xfrm>
+            <a:off x="2180885" y="2960190"/>
+            <a:ext cx="603561" cy="482889"/>
+          </a:xfrm>
+          <a:prstGeom prst="leftArrow">
+            <a:avLst/>
+          </a:prstGeom>
+        </p:spPr>
+        <p:style>
+          <a:lnRef idx="2">
+            <a:schemeClr val="accent1">
+              <a:shade val="50000"/>
+            </a:schemeClr>
+          </a:lnRef>
+          <a:fillRef idx="1">
+            <a:schemeClr val="accent1"/>
+          </a:fillRef>
+          <a:effectRef idx="0">
+            <a:schemeClr val="accent1"/>
+          </a:effectRef>
+          <a:fontRef idx="minor">
+            <a:schemeClr val="lt1"/>
+          </a:fontRef>
+        </p:style>
+        <p:txBody>
+          <a:bodyPr rtlCol="0" anchor="ctr"/>
+          <a:lstStyle/>
+          <a:p>
+            <a:pPr algn="ctr"/>
+            <a:endParaRPr lang="en-US"/>
           </a:p>
         </p:txBody>
       </p:sp>
     </p:spTree>
     <p:extLst>
       <p:ext uri="{BB962C8B-B14F-4D97-AF65-F5344CB8AC3E}">
-        <p14:creationId xmlns:p14="http://schemas.microsoft.com/office/powerpoint/2010/main" val="1969466987"/>
+        <p14:creationId xmlns:p14="http://schemas.microsoft.com/office/powerpoint/2010/main" val="3234941050"/>
       </p:ext>
     </p:extLst>
   </p:cSld>
@@ -8629,7 +8896,7 @@
           <p:cNvPr id="2" name="Title 1">
             <a:extLst>
               <a:ext uri="{FF2B5EF4-FFF2-40B4-BE49-F238E27FC236}">
-                <a16:creationId xmlns:a16="http://schemas.microsoft.com/office/drawing/2014/main" id="{E6721D10-A0F4-4623-84A5-3A414F463587}"/>
+                <a16:creationId xmlns:a16="http://schemas.microsoft.com/office/drawing/2014/main" id="{51E6B5EF-4524-41AF-870A-9AAF367EBE40}"/>
               </a:ext>
             </a:extLst>
           </p:cNvPr>
@@ -8647,7 +8914,7 @@
           <a:p>
             <a:r>
               <a:rPr lang="en-US" dirty="0"/>
-              <a:t>Background</a:t>
+              <a:t>Business Model</a:t>
             </a:r>
           </a:p>
         </p:txBody>
@@ -8657,7 +8924,7 @@
           <p:cNvPr id="3" name="Content Placeholder 2">
             <a:extLst>
               <a:ext uri="{FF2B5EF4-FFF2-40B4-BE49-F238E27FC236}">
-                <a16:creationId xmlns:a16="http://schemas.microsoft.com/office/drawing/2014/main" id="{8A1760D6-7562-4888-9592-6E8C036553F9}"/>
+                <a16:creationId xmlns:a16="http://schemas.microsoft.com/office/drawing/2014/main" id="{A39BD6F0-C56E-4B2C-968E-9B9264235BEB}"/>
               </a:ext>
             </a:extLst>
           </p:cNvPr>
@@ -8675,89 +8942,53 @@
           <a:p>
             <a:r>
               <a:rPr lang="en-US" dirty="0"/>
-              <a:t>The Evolution of Technology in Trading Financial Markets</a:t>
+              <a:t>Background</a:t>
+            </a:r>
+          </a:p>
+          <a:p>
+            <a:r>
+              <a:rPr lang="en-US" dirty="0"/>
+              <a:t>Target Customers</a:t>
             </a:r>
           </a:p>
           <a:p>
             <a:pPr lvl="1"/>
             <a:r>
               <a:rPr lang="en-US" dirty="0"/>
-              <a:t>Open-outcry</a:t>
+              <a:t>Retail Traders</a:t>
             </a:r>
           </a:p>
           <a:p>
             <a:pPr lvl="1"/>
             <a:r>
               <a:rPr lang="en-US" dirty="0"/>
-              <a:t>Computer assistance (Analysis &amp; Research)</a:t>
-            </a:r>
-          </a:p>
-          <a:p>
-            <a:pPr lvl="1"/>
+              <a:t>Institute</a:t>
+            </a:r>
+          </a:p>
+          <a:p>
             <a:r>
               <a:rPr lang="en-US" dirty="0"/>
-              <a:t>Electronic online trading</a:t>
-            </a:r>
-          </a:p>
-          <a:p>
-            <a:pPr lvl="1"/>
+              <a:t>Outcome Expected</a:t>
+            </a:r>
+          </a:p>
+          <a:p>
             <a:r>
               <a:rPr lang="en-US" dirty="0"/>
-              <a:t>Algo, AI, and more…</a:t>
-            </a:r>
-          </a:p>
-          <a:p>
-            <a:pPr marL="457200" lvl="1" indent="0">
-              <a:buNone/>
-            </a:pPr>
-            <a:endParaRPr lang="en-US" dirty="0"/>
-          </a:p>
-          <a:p>
-            <a:pPr marL="457200" lvl="1" indent="0">
-              <a:buNone/>
-            </a:pPr>
+              <a:t>Platform</a:t>
+            </a:r>
+          </a:p>
+          <a:p>
             <a:r>
               <a:rPr lang="en-US" dirty="0"/>
-              <a:t>Open-outcry -&gt; computer/online -&gt; Algo/AI</a:t>
-            </a:r>
-          </a:p>
-          <a:p>
-            <a:pPr marL="457200" lvl="1" indent="0">
-              <a:buNone/>
-            </a:pPr>
-            <a:r>
-              <a:rPr lang="en-US" dirty="0"/>
-              <a:t>What will be needed from the traders for transition to Algo/AI today?</a:t>
-            </a:r>
-          </a:p>
-          <a:p>
-            <a:pPr marL="457200" lvl="1" indent="0">
-              <a:buNone/>
-            </a:pPr>
-            <a:r>
-              <a:rPr lang="en-US" dirty="0"/>
-              <a:t>Why hiring a freelancer will not work as expected?</a:t>
-            </a:r>
-          </a:p>
-          <a:p>
-            <a:pPr marL="457200" lvl="1" indent="0">
-              <a:buNone/>
-            </a:pPr>
-            <a:r>
-              <a:rPr lang="en-US" dirty="0"/>
-              <a:t>What is the proper way to provide the support/service to customers?</a:t>
-            </a:r>
-          </a:p>
-          <a:p>
-            <a:pPr lvl="1"/>
-            <a:endParaRPr lang="en-US" dirty="0"/>
+              <a:t>Where to Start With</a:t>
+            </a:r>
           </a:p>
         </p:txBody>
       </p:sp>
     </p:spTree>
     <p:extLst>
       <p:ext uri="{BB962C8B-B14F-4D97-AF65-F5344CB8AC3E}">
-        <p14:creationId xmlns:p14="http://schemas.microsoft.com/office/powerpoint/2010/main" val="1679883263"/>
+        <p14:creationId xmlns:p14="http://schemas.microsoft.com/office/powerpoint/2010/main" val="1969466987"/>
       </p:ext>
     </p:extLst>
   </p:cSld>
@@ -8789,7 +9020,7 @@
           <p:cNvPr id="2" name="Title 1">
             <a:extLst>
               <a:ext uri="{FF2B5EF4-FFF2-40B4-BE49-F238E27FC236}">
-                <a16:creationId xmlns:a16="http://schemas.microsoft.com/office/drawing/2014/main" id="{72A82A2D-371C-4CB1-9410-DB7D7792A196}"/>
+                <a16:creationId xmlns:a16="http://schemas.microsoft.com/office/drawing/2014/main" id="{E6721D10-A0F4-4623-84A5-3A414F463587}"/>
               </a:ext>
             </a:extLst>
           </p:cNvPr>
@@ -8807,7 +9038,7 @@
           <a:p>
             <a:r>
               <a:rPr lang="en-US" dirty="0"/>
-              <a:t>Target Customers</a:t>
+              <a:t>Background</a:t>
             </a:r>
           </a:p>
         </p:txBody>
@@ -8817,7 +9048,7 @@
           <p:cNvPr id="3" name="Content Placeholder 2">
             <a:extLst>
               <a:ext uri="{FF2B5EF4-FFF2-40B4-BE49-F238E27FC236}">
-                <a16:creationId xmlns:a16="http://schemas.microsoft.com/office/drawing/2014/main" id="{BA0C9968-5771-4CAC-9938-CA774D061CFE}"/>
+                <a16:creationId xmlns:a16="http://schemas.microsoft.com/office/drawing/2014/main" id="{8A1760D6-7562-4888-9592-6E8C036553F9}"/>
               </a:ext>
             </a:extLst>
           </p:cNvPr>
@@ -8830,77 +9061,94 @@
         </p:nvSpPr>
         <p:spPr/>
         <p:txBody>
-          <a:bodyPr>
-            <a:normAutofit fontScale="92500" lnSpcReduction="10000"/>
-          </a:bodyPr>
+          <a:bodyPr/>
           <a:lstStyle/>
           <a:p>
             <a:r>
               <a:rPr lang="en-US" dirty="0"/>
-              <a:t>Retail Traders</a:t>
+              <a:t>The Evolution of Technology in Trading Financial Markets</a:t>
             </a:r>
           </a:p>
           <a:p>
             <a:pPr lvl="1"/>
             <a:r>
-              <a:rPr lang="en-US" dirty="0" err="1"/>
-              <a:t>Ninjatrader</a:t>
-            </a:r>
-            <a:r>
               <a:rPr lang="en-US" dirty="0"/>
-              <a:t> Framework  (easy to develop customized strategies, free of charge, only charge for registration) – Beginner Programmers</a:t>
+              <a:t>Open-outcry</a:t>
             </a:r>
           </a:p>
           <a:p>
             <a:pPr lvl="1"/>
             <a:r>
               <a:rPr lang="en-US" dirty="0"/>
-              <a:t>Subscription/ Proprietary Strategies/Training  (paid service) – Non-Programmers</a:t>
+              <a:t>Computer assistance (Analysis &amp; Research)</a:t>
             </a:r>
           </a:p>
           <a:p>
             <a:pPr lvl="1"/>
             <a:r>
               <a:rPr lang="en-US" dirty="0"/>
-              <a:t>Programming service (paid service, work for non-programmers, charge a share) – Contractor Programmers</a:t>
-            </a:r>
-          </a:p>
-          <a:p>
+              <a:t>Electronic online trading</a:t>
+            </a:r>
+          </a:p>
+          <a:p>
+            <a:pPr lvl="1"/>
+            <a:r>
+              <a:rPr lang="en-US" dirty="0"/>
+              <a:t>Algo, AI, and more…</a:t>
+            </a:r>
+          </a:p>
+          <a:p>
+            <a:pPr marL="457200" lvl="1" indent="0">
+              <a:buNone/>
+            </a:pPr>
             <a:endParaRPr lang="en-US" dirty="0"/>
           </a:p>
           <a:p>
+            <a:pPr marL="457200" lvl="1" indent="0">
+              <a:buNone/>
+            </a:pPr>
             <a:r>
               <a:rPr lang="en-US" dirty="0"/>
-              <a:t>Institute</a:t>
+              <a:t>Open-outcry -&gt; computer/online -&gt; Algo/AI</a:t>
+            </a:r>
+          </a:p>
+          <a:p>
+            <a:pPr marL="457200" lvl="1" indent="0">
+              <a:buNone/>
+            </a:pPr>
+            <a:r>
+              <a:rPr lang="en-US" dirty="0"/>
+              <a:t>What will be needed from the traders for transition to Algo/AI today?</a:t>
+            </a:r>
+          </a:p>
+          <a:p>
+            <a:pPr marL="457200" lvl="1" indent="0">
+              <a:buNone/>
+            </a:pPr>
+            <a:r>
+              <a:rPr lang="en-US" dirty="0"/>
+              <a:t>Why hiring a freelancer will not work as expected?</a:t>
+            </a:r>
+          </a:p>
+          <a:p>
+            <a:pPr marL="457200" lvl="1" indent="0">
+              <a:buNone/>
+            </a:pPr>
+            <a:r>
+              <a:rPr lang="en-US" dirty="0"/>
+              <a:t>What is the proper way to provide the support/service to customers?</a:t>
             </a:r>
           </a:p>
           <a:p>
             <a:pPr lvl="1"/>
-            <a:r>
-              <a:rPr lang="en-US" dirty="0"/>
-              <a:t>Subscription/Proprietary Strategies (Sale or paid subscription)</a:t>
-            </a:r>
-          </a:p>
-          <a:p>
-            <a:pPr lvl="2"/>
-            <a:r>
-              <a:rPr lang="en-US" dirty="0"/>
-              <a:t>The subscription/purchase includes frontend and backend, the frontend can be reverse engineered but not the backend. The day to day trading needs to pull data and instructions from backend to the frontend to make the trades work</a:t>
-            </a:r>
-          </a:p>
-          <a:p>
-            <a:pPr lvl="1"/>
-            <a:r>
-              <a:rPr lang="en-US" dirty="0"/>
-              <a:t>Programming service (paid)</a:t>
-            </a:r>
+            <a:endParaRPr lang="en-US" dirty="0"/>
           </a:p>
         </p:txBody>
       </p:sp>
     </p:spTree>
     <p:extLst>
       <p:ext uri="{BB962C8B-B14F-4D97-AF65-F5344CB8AC3E}">
-        <p14:creationId xmlns:p14="http://schemas.microsoft.com/office/powerpoint/2010/main" val="1221307754"/>
+        <p14:creationId xmlns:p14="http://schemas.microsoft.com/office/powerpoint/2010/main" val="1679883263"/>
       </p:ext>
     </p:extLst>
   </p:cSld>
@@ -8932,7 +9180,7 @@
           <p:cNvPr id="2" name="Title 1">
             <a:extLst>
               <a:ext uri="{FF2B5EF4-FFF2-40B4-BE49-F238E27FC236}">
-                <a16:creationId xmlns:a16="http://schemas.microsoft.com/office/drawing/2014/main" id="{2E2990C7-598B-49F9-8BB5-42C7FF725FB6}"/>
+                <a16:creationId xmlns:a16="http://schemas.microsoft.com/office/drawing/2014/main" id="{72A82A2D-371C-4CB1-9410-DB7D7792A196}"/>
               </a:ext>
             </a:extLst>
           </p:cNvPr>
@@ -8950,7 +9198,7 @@
           <a:p>
             <a:r>
               <a:rPr lang="en-US" dirty="0"/>
-              <a:t>Outcome Expected</a:t>
+              <a:t>Target Customers</a:t>
             </a:r>
           </a:p>
         </p:txBody>
@@ -8960,7 +9208,7 @@
           <p:cNvPr id="3" name="Content Placeholder 2">
             <a:extLst>
               <a:ext uri="{FF2B5EF4-FFF2-40B4-BE49-F238E27FC236}">
-                <a16:creationId xmlns:a16="http://schemas.microsoft.com/office/drawing/2014/main" id="{BD4EC978-F8A1-420B-A166-CB508118212C}"/>
+                <a16:creationId xmlns:a16="http://schemas.microsoft.com/office/drawing/2014/main" id="{BA0C9968-5771-4CAC-9938-CA774D061CFE}"/>
               </a:ext>
             </a:extLst>
           </p:cNvPr>
@@ -8973,68 +9221,69 @@
         </p:nvSpPr>
         <p:spPr/>
         <p:txBody>
-          <a:bodyPr/>
+          <a:bodyPr>
+            <a:normAutofit fontScale="92500" lnSpcReduction="10000"/>
+          </a:bodyPr>
           <a:lstStyle/>
           <a:p>
             <a:r>
               <a:rPr lang="en-US" dirty="0"/>
-              <a:t>Platform and Technologies</a:t>
+              <a:t>Retail Traders</a:t>
             </a:r>
           </a:p>
           <a:p>
             <a:pPr lvl="1"/>
-            <a:r>
-              <a:rPr lang="en-US" dirty="0"/>
-              <a:t>Product: </a:t>
-            </a:r>
             <a:r>
               <a:rPr lang="en-US" dirty="0" err="1"/>
               <a:t>Ninjatrader</a:t>
             </a:r>
             <a:r>
               <a:rPr lang="en-US" dirty="0"/>
-              <a:t> framework</a:t>
+              <a:t> Framework  (easy to develop customized strategies, free of charge, only charge for registration) – Beginner Programmers</a:t>
             </a:r>
           </a:p>
           <a:p>
             <a:pPr lvl="1"/>
             <a:r>
               <a:rPr lang="en-US" dirty="0"/>
-              <a:t>Proprietary strategies (Sale &amp; Subscription)</a:t>
+              <a:t>Subscription/ Proprietary Strategies/Training  (paid service) – Non-Programmers</a:t>
             </a:r>
           </a:p>
           <a:p>
             <a:pPr lvl="1"/>
             <a:r>
               <a:rPr lang="en-US" dirty="0"/>
-              <a:t>Community (Programming service and Support, Training)</a:t>
-            </a:r>
+              <a:t>Programming service (paid service, work for non-programmers, charge a share) – Contractor Programmers</a:t>
+            </a:r>
+          </a:p>
+          <a:p>
+            <a:endParaRPr lang="en-US" dirty="0"/>
           </a:p>
           <a:p>
             <a:r>
               <a:rPr lang="en-US" dirty="0"/>
-              <a:t>Income</a:t>
+              <a:t>Institute</a:t>
             </a:r>
           </a:p>
           <a:p>
             <a:pPr lvl="1"/>
             <a:r>
               <a:rPr lang="en-US" dirty="0"/>
-              <a:t>Registration</a:t>
+              <a:t>Subscription/Proprietary Strategies (Sale or paid subscription)</a:t>
+            </a:r>
+          </a:p>
+          <a:p>
+            <a:pPr lvl="2"/>
+            <a:r>
+              <a:rPr lang="en-US" dirty="0"/>
+              <a:t>The subscription/purchase includes frontend and backend, the frontend can be reverse engineered but not the backend. The day to day trading needs to pull data and instructions from backend to the frontend to make the trades work</a:t>
             </a:r>
           </a:p>
           <a:p>
             <a:pPr lvl="1"/>
             <a:r>
               <a:rPr lang="en-US" dirty="0"/>
-              <a:t>Proprietary Strategies Sale &amp; Subscription</a:t>
-            </a:r>
-          </a:p>
-          <a:p>
-            <a:pPr lvl="1"/>
-            <a:r>
-              <a:rPr lang="en-US" dirty="0"/>
-              <a:t>Share of Programming service, Paid training and Support</a:t>
+              <a:t>Programming service (paid)</a:t>
             </a:r>
           </a:p>
         </p:txBody>
@@ -9042,7 +9291,7 @@
     </p:spTree>
     <p:extLst>
       <p:ext uri="{BB962C8B-B14F-4D97-AF65-F5344CB8AC3E}">
-        <p14:creationId xmlns:p14="http://schemas.microsoft.com/office/powerpoint/2010/main" val="2566743075"/>
+        <p14:creationId xmlns:p14="http://schemas.microsoft.com/office/powerpoint/2010/main" val="1221307754"/>
       </p:ext>
     </p:extLst>
   </p:cSld>
@@ -9074,7 +9323,7 @@
           <p:cNvPr id="2" name="Title 1">
             <a:extLst>
               <a:ext uri="{FF2B5EF4-FFF2-40B4-BE49-F238E27FC236}">
-                <a16:creationId xmlns:a16="http://schemas.microsoft.com/office/drawing/2014/main" id="{D42E29B7-F40C-42C7-821F-B4877657B3EE}"/>
+                <a16:creationId xmlns:a16="http://schemas.microsoft.com/office/drawing/2014/main" id="{2E2990C7-598B-49F9-8BB5-42C7FF725FB6}"/>
               </a:ext>
             </a:extLst>
           </p:cNvPr>
@@ -9092,7 +9341,7 @@
           <a:p>
             <a:r>
               <a:rPr lang="en-US" dirty="0"/>
-              <a:t>Platform</a:t>
+              <a:t>Outcome Expected</a:t>
             </a:r>
           </a:p>
         </p:txBody>
@@ -9102,7 +9351,7 @@
           <p:cNvPr id="3" name="Content Placeholder 2">
             <a:extLst>
               <a:ext uri="{FF2B5EF4-FFF2-40B4-BE49-F238E27FC236}">
-                <a16:creationId xmlns:a16="http://schemas.microsoft.com/office/drawing/2014/main" id="{87CBA6D3-865F-41F7-8929-1708D7EED29A}"/>
+                <a16:creationId xmlns:a16="http://schemas.microsoft.com/office/drawing/2014/main" id="{BD4EC978-F8A1-420B-A166-CB508118212C}"/>
               </a:ext>
             </a:extLst>
           </p:cNvPr>
@@ -9120,29 +9369,14 @@
           <a:p>
             <a:r>
               <a:rPr lang="en-US" dirty="0"/>
-              <a:t>Community Based Platform (Algo Trader’s Community)</a:t>
+              <a:t>Platform and Technologies</a:t>
             </a:r>
           </a:p>
           <a:p>
             <a:pPr lvl="1"/>
             <a:r>
               <a:rPr lang="en-US" dirty="0"/>
-              <a:t>Customers join with a small </a:t>
-            </a:r>
-            <a:r>
-              <a:rPr lang="en-US" dirty="0">
-                <a:solidFill>
-                  <a:srgbClr val="FF0000"/>
-                </a:solidFill>
-              </a:rPr>
-              <a:t>registration fee</a:t>
-            </a:r>
-          </a:p>
-          <a:p>
-            <a:pPr lvl="1"/>
-            <a:r>
-              <a:rPr lang="en-US" dirty="0"/>
-              <a:t>Free </a:t>
+              <a:t>Product: </a:t>
             </a:r>
             <a:r>
               <a:rPr lang="en-US" dirty="0" err="1"/>
@@ -9150,73 +9384,48 @@
             </a:r>
             <a:r>
               <a:rPr lang="en-US" dirty="0"/>
-              <a:t> Framework (Add </a:t>
-            </a:r>
-            <a:r>
-              <a:rPr lang="en-US" dirty="0" err="1"/>
-              <a:t>Tradestation</a:t>
-            </a:r>
+              <a:t> framework</a:t>
+            </a:r>
+          </a:p>
+          <a:p>
+            <a:pPr lvl="1"/>
             <a:r>
               <a:rPr lang="en-US" dirty="0"/>
-              <a:t> later)</a:t>
+              <a:t>Proprietary strategies (Sale &amp; Subscription)</a:t>
             </a:r>
           </a:p>
           <a:p>
             <a:pPr lvl="1"/>
             <a:r>
               <a:rPr lang="en-US" dirty="0"/>
-              <a:t>Free training materials/seminar</a:t>
+              <a:t>Community (Programming service and Support, Training)</a:t>
+            </a:r>
+          </a:p>
+          <a:p>
+            <a:r>
+              <a:rPr lang="en-US" dirty="0"/>
+              <a:t>Income</a:t>
             </a:r>
           </a:p>
           <a:p>
             <a:pPr lvl="1"/>
             <a:r>
-              <a:rPr lang="en-US" dirty="0">
-                <a:solidFill>
-                  <a:srgbClr val="FF0000"/>
-                </a:solidFill>
-              </a:rPr>
-              <a:t>Paid subscription for proprietary strategies</a:t>
+              <a:rPr lang="en-US" dirty="0"/>
+              <a:t>Registration</a:t>
             </a:r>
           </a:p>
           <a:p>
             <a:pPr lvl="1"/>
             <a:r>
-              <a:rPr lang="en-US" dirty="0">
-                <a:solidFill>
-                  <a:srgbClr val="FF0000"/>
-                </a:solidFill>
-              </a:rPr>
-              <a:t>Paid one-on-one coaching or support</a:t>
+              <a:rPr lang="en-US" dirty="0"/>
+              <a:t>Proprietary Strategies Sale &amp; Subscription</a:t>
             </a:r>
           </a:p>
           <a:p>
             <a:pPr lvl="1"/>
             <a:r>
               <a:rPr lang="en-US" dirty="0"/>
-              <a:t>Chance to hire contractor programmer with lower cost and more support</a:t>
-            </a:r>
-          </a:p>
-          <a:p>
-            <a:pPr lvl="1"/>
-            <a:r>
-              <a:rPr lang="en-US" dirty="0"/>
-              <a:t>Chance to become a contractor programmer</a:t>
-            </a:r>
-          </a:p>
-          <a:p>
-            <a:pPr lvl="1"/>
-            <a:r>
-              <a:rPr lang="en-US" dirty="0"/>
-              <a:t>Manage programming service, </a:t>
-            </a:r>
-            <a:r>
-              <a:rPr lang="en-US" dirty="0">
-                <a:solidFill>
-                  <a:srgbClr val="FF0000"/>
-                </a:solidFill>
-              </a:rPr>
-              <a:t>charge a fee from the contract</a:t>
+              <a:t>Share of Programming service, Paid training and Support</a:t>
             </a:r>
           </a:p>
         </p:txBody>
@@ -9224,7 +9433,7 @@
     </p:spTree>
     <p:extLst>
       <p:ext uri="{BB962C8B-B14F-4D97-AF65-F5344CB8AC3E}">
-        <p14:creationId xmlns:p14="http://schemas.microsoft.com/office/powerpoint/2010/main" val="4069655234"/>
+        <p14:creationId xmlns:p14="http://schemas.microsoft.com/office/powerpoint/2010/main" val="2566743075"/>
       </p:ext>
     </p:extLst>
   </p:cSld>

</xml_diff>